<commit_message>
improving market map with regions highlighted
</commit_message>
<xml_diff>
--- a/results-presentations/markets-descriptive-analysis.pptx
+++ b/results-presentations/markets-descriptive-analysis.pptx
@@ -5,27 +5,28 @@
     <p:sldMasterId id="2147483648" r:id="rId1"/>
   </p:sldMasterIdLst>
   <p:notesMasterIdLst>
-    <p:notesMasterId r:id="rId20"/>
+    <p:notesMasterId r:id="rId21"/>
   </p:notesMasterIdLst>
   <p:sldIdLst>
     <p:sldId id="256" r:id="rId2"/>
     <p:sldId id="259" r:id="rId3"/>
     <p:sldId id="272" r:id="rId4"/>
-    <p:sldId id="273" r:id="rId5"/>
-    <p:sldId id="257" r:id="rId6"/>
-    <p:sldId id="274" r:id="rId7"/>
-    <p:sldId id="258" r:id="rId8"/>
-    <p:sldId id="271" r:id="rId9"/>
-    <p:sldId id="260" r:id="rId10"/>
-    <p:sldId id="266" r:id="rId11"/>
-    <p:sldId id="268" r:id="rId12"/>
-    <p:sldId id="269" r:id="rId13"/>
-    <p:sldId id="265" r:id="rId14"/>
-    <p:sldId id="270" r:id="rId15"/>
-    <p:sldId id="264" r:id="rId16"/>
-    <p:sldId id="261" r:id="rId17"/>
-    <p:sldId id="262" r:id="rId18"/>
-    <p:sldId id="263" r:id="rId19"/>
+    <p:sldId id="257" r:id="rId5"/>
+    <p:sldId id="276" r:id="rId6"/>
+    <p:sldId id="275" r:id="rId7"/>
+    <p:sldId id="274" r:id="rId8"/>
+    <p:sldId id="258" r:id="rId9"/>
+    <p:sldId id="271" r:id="rId10"/>
+    <p:sldId id="260" r:id="rId11"/>
+    <p:sldId id="266" r:id="rId12"/>
+    <p:sldId id="268" r:id="rId13"/>
+    <p:sldId id="269" r:id="rId14"/>
+    <p:sldId id="265" r:id="rId15"/>
+    <p:sldId id="270" r:id="rId16"/>
+    <p:sldId id="264" r:id="rId17"/>
+    <p:sldId id="261" r:id="rId18"/>
+    <p:sldId id="262" r:id="rId19"/>
+    <p:sldId id="263" r:id="rId20"/>
   </p:sldIdLst>
   <p:sldSz cx="12192000" cy="6858000"/>
   <p:notesSz cx="6858000" cy="9144000"/>
@@ -135,7 +136,7 @@
 <file path=ppt/revisionInfo.xml><?xml version="1.0" encoding="utf-8"?>
 <p1510:revInfo xmlns:a="http://schemas.openxmlformats.org/drawingml/2006/main" xmlns:r="http://schemas.openxmlformats.org/officeDocument/2006/relationships" xmlns:p1510="http://schemas.microsoft.com/office/powerpoint/2015/10/main">
   <p1510:revLst>
-    <p1510:client id="{9FA17360-167E-9443-9251-DAE6C10F48BB}" v="55" dt="2023-03-02T16:41:45.567"/>
+    <p1510:client id="{9FA17360-167E-9443-9251-DAE6C10F48BB}" v="62" dt="2023-03-02T22:09:45.632"/>
   </p1510:revLst>
 </p1510:revInfo>
 </file>
@@ -145,7 +146,7 @@
   <pc:docChgLst>
     <pc:chgData name="Savagar, Bethan Alice" userId="dc0b6509-dca5-46f6-b355-e03f7348faa9" providerId="ADAL" clId="{9FA17360-167E-9443-9251-DAE6C10F48BB}"/>
     <pc:docChg chg="undo custSel addSld delSld modSld sldOrd">
-      <pc:chgData name="Savagar, Bethan Alice" userId="dc0b6509-dca5-46f6-b355-e03f7348faa9" providerId="ADAL" clId="{9FA17360-167E-9443-9251-DAE6C10F48BB}" dt="2023-03-02T16:49:21.669" v="2041" actId="14100"/>
+      <pc:chgData name="Savagar, Bethan Alice" userId="dc0b6509-dca5-46f6-b355-e03f7348faa9" providerId="ADAL" clId="{9FA17360-167E-9443-9251-DAE6C10F48BB}" dt="2023-03-02T22:11:26.227" v="2200" actId="113"/>
       <pc:docMkLst>
         <pc:docMk/>
       </pc:docMkLst>
@@ -1040,8 +1041,8 @@
           </ac:inkMkLst>
         </pc:inkChg>
       </pc:sldChg>
-      <pc:sldChg chg="modSp new mod">
-        <pc:chgData name="Savagar, Bethan Alice" userId="dc0b6509-dca5-46f6-b355-e03f7348faa9" providerId="ADAL" clId="{9FA17360-167E-9443-9251-DAE6C10F48BB}" dt="2023-03-02T15:42:01.850" v="1662" actId="20577"/>
+      <pc:sldChg chg="modSp new del mod">
+        <pc:chgData name="Savagar, Bethan Alice" userId="dc0b6509-dca5-46f6-b355-e03f7348faa9" providerId="ADAL" clId="{9FA17360-167E-9443-9251-DAE6C10F48BB}" dt="2023-03-02T21:40:13.691" v="2042" actId="2696"/>
         <pc:sldMkLst>
           <pc:docMk/>
           <pc:sldMk cId="3593166571" sldId="273"/>
@@ -1099,6 +1100,132 @@
             <pc:docMk/>
             <pc:sldMk cId="3476979857" sldId="274"/>
             <ac:picMk id="5" creationId="{96C841E6-FE54-63EF-F8F9-64AF8965C975}"/>
+          </ac:picMkLst>
+        </pc:picChg>
+      </pc:sldChg>
+      <pc:sldChg chg="addSp delSp modSp add mod">
+        <pc:chgData name="Savagar, Bethan Alice" userId="dc0b6509-dca5-46f6-b355-e03f7348faa9" providerId="ADAL" clId="{9FA17360-167E-9443-9251-DAE6C10F48BB}" dt="2023-03-02T22:11:21.548" v="2199" actId="113"/>
+        <pc:sldMkLst>
+          <pc:docMk/>
+          <pc:sldMk cId="3851111758" sldId="275"/>
+        </pc:sldMkLst>
+        <pc:spChg chg="del">
+          <ac:chgData name="Savagar, Bethan Alice" userId="dc0b6509-dca5-46f6-b355-e03f7348faa9" providerId="ADAL" clId="{9FA17360-167E-9443-9251-DAE6C10F48BB}" dt="2023-03-02T21:40:26.800" v="2045" actId="478"/>
+          <ac:spMkLst>
+            <pc:docMk/>
+            <pc:sldMk cId="3851111758" sldId="275"/>
+            <ac:spMk id="3" creationId="{318194F6-BEF6-B507-CF6A-03842E7B66C2}"/>
+          </ac:spMkLst>
+        </pc:spChg>
+        <pc:spChg chg="del">
+          <ac:chgData name="Savagar, Bethan Alice" userId="dc0b6509-dca5-46f6-b355-e03f7348faa9" providerId="ADAL" clId="{9FA17360-167E-9443-9251-DAE6C10F48BB}" dt="2023-03-02T21:40:26.800" v="2045" actId="478"/>
+          <ac:spMkLst>
+            <pc:docMk/>
+            <pc:sldMk cId="3851111758" sldId="275"/>
+            <ac:spMk id="4" creationId="{2EEE236F-51B7-14E2-D2DA-A31DFF79FA88}"/>
+          </ac:spMkLst>
+        </pc:spChg>
+        <pc:spChg chg="del">
+          <ac:chgData name="Savagar, Bethan Alice" userId="dc0b6509-dca5-46f6-b355-e03f7348faa9" providerId="ADAL" clId="{9FA17360-167E-9443-9251-DAE6C10F48BB}" dt="2023-03-02T21:40:26.800" v="2045" actId="478"/>
+          <ac:spMkLst>
+            <pc:docMk/>
+            <pc:sldMk cId="3851111758" sldId="275"/>
+            <ac:spMk id="5" creationId="{7922B561-3CE6-00FE-FBC0-CF28A3A5F620}"/>
+          </ac:spMkLst>
+        </pc:spChg>
+        <pc:spChg chg="del">
+          <ac:chgData name="Savagar, Bethan Alice" userId="dc0b6509-dca5-46f6-b355-e03f7348faa9" providerId="ADAL" clId="{9FA17360-167E-9443-9251-DAE6C10F48BB}" dt="2023-03-02T21:40:26.800" v="2045" actId="478"/>
+          <ac:spMkLst>
+            <pc:docMk/>
+            <pc:sldMk cId="3851111758" sldId="275"/>
+            <ac:spMk id="7" creationId="{741C0332-5A10-E331-03B3-0AD8FED9CF05}"/>
+          </ac:spMkLst>
+        </pc:spChg>
+        <pc:spChg chg="del">
+          <ac:chgData name="Savagar, Bethan Alice" userId="dc0b6509-dca5-46f6-b355-e03f7348faa9" providerId="ADAL" clId="{9FA17360-167E-9443-9251-DAE6C10F48BB}" dt="2023-03-02T21:40:26.800" v="2045" actId="478"/>
+          <ac:spMkLst>
+            <pc:docMk/>
+            <pc:sldMk cId="3851111758" sldId="275"/>
+            <ac:spMk id="8" creationId="{245B433E-FAB5-65F6-1431-A8A943BA8453}"/>
+          </ac:spMkLst>
+        </pc:spChg>
+        <pc:spChg chg="del">
+          <ac:chgData name="Savagar, Bethan Alice" userId="dc0b6509-dca5-46f6-b355-e03f7348faa9" providerId="ADAL" clId="{9FA17360-167E-9443-9251-DAE6C10F48BB}" dt="2023-03-02T21:40:26.800" v="2045" actId="478"/>
+          <ac:spMkLst>
+            <pc:docMk/>
+            <pc:sldMk cId="3851111758" sldId="275"/>
+            <ac:spMk id="9" creationId="{F4972910-7043-445A-D8F6-740EF2CC94A2}"/>
+          </ac:spMkLst>
+        </pc:spChg>
+        <pc:spChg chg="add mod">
+          <ac:chgData name="Savagar, Bethan Alice" userId="dc0b6509-dca5-46f6-b355-e03f7348faa9" providerId="ADAL" clId="{9FA17360-167E-9443-9251-DAE6C10F48BB}" dt="2023-03-02T21:40:50.958" v="2065" actId="1076"/>
+          <ac:spMkLst>
+            <pc:docMk/>
+            <pc:sldMk cId="3851111758" sldId="275"/>
+            <ac:spMk id="10" creationId="{3FE5550D-FF2F-E23E-B0B8-1DB1C4CBC63B}"/>
+          </ac:spMkLst>
+        </pc:spChg>
+        <pc:spChg chg="add mod">
+          <ac:chgData name="Savagar, Bethan Alice" userId="dc0b6509-dca5-46f6-b355-e03f7348faa9" providerId="ADAL" clId="{9FA17360-167E-9443-9251-DAE6C10F48BB}" dt="2023-03-02T22:11:21.548" v="2199" actId="113"/>
+          <ac:spMkLst>
+            <pc:docMk/>
+            <pc:sldMk cId="3851111758" sldId="275"/>
+            <ac:spMk id="12" creationId="{58CD0C4D-21E1-0D8E-3D89-DB337FA4644C}"/>
+          </ac:spMkLst>
+        </pc:spChg>
+        <pc:graphicFrameChg chg="mod modGraphic">
+          <ac:chgData name="Savagar, Bethan Alice" userId="dc0b6509-dca5-46f6-b355-e03f7348faa9" providerId="ADAL" clId="{9FA17360-167E-9443-9251-DAE6C10F48BB}" dt="2023-03-02T22:04:05.866" v="2069" actId="14100"/>
+          <ac:graphicFrameMkLst>
+            <pc:docMk/>
+            <pc:sldMk cId="3851111758" sldId="275"/>
+            <ac:graphicFrameMk id="2" creationId="{BE45730D-5E19-81A6-F1BE-0CD26B902348}"/>
+          </ac:graphicFrameMkLst>
+        </pc:graphicFrameChg>
+        <pc:picChg chg="del">
+          <ac:chgData name="Savagar, Bethan Alice" userId="dc0b6509-dca5-46f6-b355-e03f7348faa9" providerId="ADAL" clId="{9FA17360-167E-9443-9251-DAE6C10F48BB}" dt="2023-03-02T21:40:23.917" v="2044" actId="478"/>
+          <ac:picMkLst>
+            <pc:docMk/>
+            <pc:sldMk cId="3851111758" sldId="275"/>
+            <ac:picMk id="6" creationId="{CAD9EB43-214E-22BA-25E6-ACE39F693DDE}"/>
+          </ac:picMkLst>
+        </pc:picChg>
+        <pc:picChg chg="add mod">
+          <ac:chgData name="Savagar, Bethan Alice" userId="dc0b6509-dca5-46f6-b355-e03f7348faa9" providerId="ADAL" clId="{9FA17360-167E-9443-9251-DAE6C10F48BB}" dt="2023-03-02T22:04:02.271" v="2068" actId="1076"/>
+          <ac:picMkLst>
+            <pc:docMk/>
+            <pc:sldMk cId="3851111758" sldId="275"/>
+            <ac:picMk id="11" creationId="{E80F9512-D09D-A71C-2CBB-204F2A4209AC}"/>
+          </ac:picMkLst>
+        </pc:picChg>
+      </pc:sldChg>
+      <pc:sldChg chg="addSp modSp new mod">
+        <pc:chgData name="Savagar, Bethan Alice" userId="dc0b6509-dca5-46f6-b355-e03f7348faa9" providerId="ADAL" clId="{9FA17360-167E-9443-9251-DAE6C10F48BB}" dt="2023-03-02T22:11:26.227" v="2200" actId="113"/>
+        <pc:sldMkLst>
+          <pc:docMk/>
+          <pc:sldMk cId="1052102471" sldId="276"/>
+        </pc:sldMkLst>
+        <pc:spChg chg="add mod">
+          <ac:chgData name="Savagar, Bethan Alice" userId="dc0b6509-dca5-46f6-b355-e03f7348faa9" providerId="ADAL" clId="{9FA17360-167E-9443-9251-DAE6C10F48BB}" dt="2023-03-02T22:08:12.911" v="2076" actId="1037"/>
+          <ac:spMkLst>
+            <pc:docMk/>
+            <pc:sldMk cId="1052102471" sldId="276"/>
+            <ac:spMk id="3" creationId="{EDBE2688-0C13-F5A8-200A-C80AE04777D5}"/>
+          </ac:spMkLst>
+        </pc:spChg>
+        <pc:spChg chg="add mod">
+          <ac:chgData name="Savagar, Bethan Alice" userId="dc0b6509-dca5-46f6-b355-e03f7348faa9" providerId="ADAL" clId="{9FA17360-167E-9443-9251-DAE6C10F48BB}" dt="2023-03-02T22:11:26.227" v="2200" actId="113"/>
+          <ac:spMkLst>
+            <pc:docMk/>
+            <pc:sldMk cId="1052102471" sldId="276"/>
+            <ac:spMk id="4" creationId="{C7A8FD41-2695-25F3-48B2-9B1CAB005063}"/>
+          </ac:spMkLst>
+        </pc:spChg>
+        <pc:picChg chg="add mod">
+          <ac:chgData name="Savagar, Bethan Alice" userId="dc0b6509-dca5-46f6-b355-e03f7348faa9" providerId="ADAL" clId="{9FA17360-167E-9443-9251-DAE6C10F48BB}" dt="2023-03-02T22:08:38.512" v="2079" actId="1076"/>
+          <ac:picMkLst>
+            <pc:docMk/>
+            <pc:sldMk cId="1052102471" sldId="276"/>
+            <ac:picMk id="2" creationId="{12480DC4-77D4-359C-EEC1-B639EFDE7384}"/>
           </ac:picMkLst>
         </pc:picChg>
       </pc:sldChg>
@@ -1875,7 +2002,7 @@
           <a:p>
             <a:fld id="{EDD5B931-01B2-7F4E-98D6-17CE49A98483}" type="slidenum">
               <a:rPr lang="en-US" smtClean="0"/>
-              <a:t>5</a:t>
+              <a:t>4</a:t>
             </a:fld>
             <a:endParaRPr lang="en-US"/>
           </a:p>
@@ -1895,6 +2022,107 @@
 </file>
 
 <file path=ppt/notesSlides/notesSlide2.xml><?xml version="1.0" encoding="utf-8"?>
+<p:notes xmlns:a="http://schemas.openxmlformats.org/drawingml/2006/main" xmlns:r="http://schemas.openxmlformats.org/officeDocument/2006/relationships" xmlns:p="http://schemas.openxmlformats.org/presentationml/2006/main">
+  <p:cSld>
+    <p:spTree>
+      <p:nvGrpSpPr>
+        <p:cNvPr id="1" name=""/>
+        <p:cNvGrpSpPr/>
+        <p:nvPr/>
+      </p:nvGrpSpPr>
+      <p:grpSpPr>
+        <a:xfrm>
+          <a:off x="0" y="0"/>
+          <a:ext cx="0" cy="0"/>
+          <a:chOff x="0" y="0"/>
+          <a:chExt cx="0" cy="0"/>
+        </a:xfrm>
+      </p:grpSpPr>
+      <p:sp>
+        <p:nvSpPr>
+          <p:cNvPr id="2" name="Slide Image Placeholder 1"/>
+          <p:cNvSpPr>
+            <a:spLocks noGrp="1" noRot="1" noChangeAspect="1"/>
+          </p:cNvSpPr>
+          <p:nvPr>
+            <p:ph type="sldImg"/>
+          </p:nvPr>
+        </p:nvSpPr>
+        <p:spPr/>
+      </p:sp>
+      <p:sp>
+        <p:nvSpPr>
+          <p:cNvPr id="3" name="Notes Placeholder 2"/>
+          <p:cNvSpPr>
+            <a:spLocks noGrp="1"/>
+          </p:cNvSpPr>
+          <p:nvPr>
+            <p:ph type="body" idx="1"/>
+          </p:nvPr>
+        </p:nvSpPr>
+        <p:spPr/>
+        <p:txBody>
+          <a:bodyPr/>
+          <a:lstStyle/>
+          <a:p>
+            <a:r>
+              <a:rPr lang="en-US" dirty="0"/>
+              <a:t>Highlight districts surveyed – BS has done this crudely using info from field design and matching </a:t>
+            </a:r>
+            <a:r>
+              <a:rPr lang="en-US" dirty="0" err="1"/>
+              <a:t>colours</a:t>
+            </a:r>
+            <a:r>
+              <a:rPr lang="en-US" dirty="0"/>
+              <a:t> on the map – needs proper analysis</a:t>
+            </a:r>
+          </a:p>
+          <a:p>
+            <a:r>
+              <a:rPr lang="en-US" dirty="0"/>
+              <a:t>Probably need a map which has a different administrative level highlighted</a:t>
+            </a:r>
+          </a:p>
+        </p:txBody>
+      </p:sp>
+      <p:sp>
+        <p:nvSpPr>
+          <p:cNvPr id="4" name="Slide Number Placeholder 3"/>
+          <p:cNvSpPr>
+            <a:spLocks noGrp="1"/>
+          </p:cNvSpPr>
+          <p:nvPr>
+            <p:ph type="sldNum" sz="quarter" idx="5"/>
+          </p:nvPr>
+        </p:nvSpPr>
+        <p:spPr/>
+        <p:txBody>
+          <a:bodyPr/>
+          <a:lstStyle/>
+          <a:p>
+            <a:fld id="{EDD5B931-01B2-7F4E-98D6-17CE49A98483}" type="slidenum">
+              <a:rPr lang="en-US" smtClean="0"/>
+              <a:t>6</a:t>
+            </a:fld>
+            <a:endParaRPr lang="en-US"/>
+          </a:p>
+        </p:txBody>
+      </p:sp>
+    </p:spTree>
+    <p:extLst>
+      <p:ext uri="{BB962C8B-B14F-4D97-AF65-F5344CB8AC3E}">
+        <p14:creationId xmlns:p14="http://schemas.microsoft.com/office/powerpoint/2010/main" val="456312366"/>
+      </p:ext>
+    </p:extLst>
+  </p:cSld>
+  <p:clrMapOvr>
+    <a:masterClrMapping/>
+  </p:clrMapOvr>
+</p:notes>
+</file>
+
+<file path=ppt/notesSlides/notesSlide3.xml><?xml version="1.0" encoding="utf-8"?>
 <p:notes xmlns:a="http://schemas.openxmlformats.org/drawingml/2006/main" xmlns:r="http://schemas.openxmlformats.org/officeDocument/2006/relationships" xmlns:p="http://schemas.openxmlformats.org/presentationml/2006/main">
   <p:cSld>
     <p:spTree>
@@ -1959,7 +2187,7 @@
           <a:p>
             <a:fld id="{EDD5B931-01B2-7F4E-98D6-17CE49A98483}" type="slidenum">
               <a:rPr lang="en-US" smtClean="0"/>
-              <a:t>6</a:t>
+              <a:t>7</a:t>
             </a:fld>
             <a:endParaRPr lang="en-US"/>
           </a:p>
@@ -1978,7 +2206,7 @@
 </p:notes>
 </file>
 
-<file path=ppt/notesSlides/notesSlide3.xml><?xml version="1.0" encoding="utf-8"?>
+<file path=ppt/notesSlides/notesSlide4.xml><?xml version="1.0" encoding="utf-8"?>
 <p:notes xmlns:a="http://schemas.openxmlformats.org/drawingml/2006/main" xmlns:r="http://schemas.openxmlformats.org/officeDocument/2006/relationships" xmlns:p="http://schemas.openxmlformats.org/presentationml/2006/main">
   <p:cSld>
     <p:spTree>
@@ -2046,7 +2274,7 @@
           <a:p>
             <a:fld id="{EDD5B931-01B2-7F4E-98D6-17CE49A98483}" type="slidenum">
               <a:rPr lang="en-US" smtClean="0"/>
-              <a:t>7</a:t>
+              <a:t>8</a:t>
             </a:fld>
             <a:endParaRPr lang="en-US"/>
           </a:p>
@@ -2056,133 +2284,6 @@
     <p:extLst>
       <p:ext uri="{BB962C8B-B14F-4D97-AF65-F5344CB8AC3E}">
         <p14:creationId xmlns:p14="http://schemas.microsoft.com/office/powerpoint/2010/main" val="1379315255"/>
-      </p:ext>
-    </p:extLst>
-  </p:cSld>
-  <p:clrMapOvr>
-    <a:masterClrMapping/>
-  </p:clrMapOvr>
-</p:notes>
-</file>
-
-<file path=ppt/notesSlides/notesSlide4.xml><?xml version="1.0" encoding="utf-8"?>
-<p:notes xmlns:a="http://schemas.openxmlformats.org/drawingml/2006/main" xmlns:r="http://schemas.openxmlformats.org/officeDocument/2006/relationships" xmlns:p="http://schemas.openxmlformats.org/presentationml/2006/main">
-  <p:cSld>
-    <p:spTree>
-      <p:nvGrpSpPr>
-        <p:cNvPr id="1" name=""/>
-        <p:cNvGrpSpPr/>
-        <p:nvPr/>
-      </p:nvGrpSpPr>
-      <p:grpSpPr>
-        <a:xfrm>
-          <a:off x="0" y="0"/>
-          <a:ext cx="0" cy="0"/>
-          <a:chOff x="0" y="0"/>
-          <a:chExt cx="0" cy="0"/>
-        </a:xfrm>
-      </p:grpSpPr>
-      <p:sp>
-        <p:nvSpPr>
-          <p:cNvPr id="2" name="Slide Image Placeholder 1"/>
-          <p:cNvSpPr>
-            <a:spLocks noGrp="1" noRot="1" noChangeAspect="1"/>
-          </p:cNvSpPr>
-          <p:nvPr>
-            <p:ph type="sldImg"/>
-          </p:nvPr>
-        </p:nvSpPr>
-        <p:spPr/>
-      </p:sp>
-      <p:sp>
-        <p:nvSpPr>
-          <p:cNvPr id="3" name="Notes Placeholder 2"/>
-          <p:cNvSpPr>
-            <a:spLocks noGrp="1"/>
-          </p:cNvSpPr>
-          <p:nvPr>
-            <p:ph type="body" idx="1"/>
-          </p:nvPr>
-        </p:nvSpPr>
-        <p:spPr/>
-        <p:txBody>
-          <a:bodyPr/>
-          <a:lstStyle/>
-          <a:p>
-            <a:r>
-              <a:rPr lang="en-US" dirty="0"/>
-              <a:t>Table = if </a:t>
-            </a:r>
-            <a:r>
-              <a:rPr lang="en-US" dirty="0" err="1"/>
-              <a:t>placetype</a:t>
-            </a:r>
-            <a:r>
-              <a:rPr lang="en-US" dirty="0"/>
-              <a:t> is “other” please specify. </a:t>
-            </a:r>
-          </a:p>
-          <a:p>
-            <a:endParaRPr lang="en-US" dirty="0"/>
-          </a:p>
-          <a:p>
-            <a:r>
-              <a:rPr lang="en-US" dirty="0"/>
-              <a:t>e.g. “he comes to buy”, “</a:t>
-            </a:r>
-            <a:r>
-              <a:rPr lang="en-GB" dirty="0">
-                <a:effectLst/>
-              </a:rPr>
-              <a:t>He buys livestock from breeders on the way before bringing them to the auction”</a:t>
-            </a:r>
-          </a:p>
-          <a:p>
-            <a:br>
-              <a:rPr lang="en-GB" b="0" i="0" dirty="0">
-                <a:solidFill>
-                  <a:srgbClr val="202124"/>
-                </a:solidFill>
-                <a:effectLst/>
-                <a:latin typeface="arial" panose="020B0604020202020204" pitchFamily="34" charset="0"/>
-              </a:rPr>
-            </a:br>
-            <a:endParaRPr lang="en-GB" dirty="0">
-              <a:effectLst/>
-            </a:endParaRPr>
-          </a:p>
-          <a:p>
-            <a:endParaRPr lang="en-US" dirty="0"/>
-          </a:p>
-        </p:txBody>
-      </p:sp>
-      <p:sp>
-        <p:nvSpPr>
-          <p:cNvPr id="4" name="Slide Number Placeholder 3"/>
-          <p:cNvSpPr>
-            <a:spLocks noGrp="1"/>
-          </p:cNvSpPr>
-          <p:nvPr>
-            <p:ph type="sldNum" sz="quarter" idx="5"/>
-          </p:nvPr>
-        </p:nvSpPr>
-        <p:spPr/>
-        <p:txBody>
-          <a:bodyPr/>
-          <a:lstStyle/>
-          <a:p>
-            <a:fld id="{EDD5B931-01B2-7F4E-98D6-17CE49A98483}" type="slidenum">
-              <a:rPr lang="en-US" smtClean="0"/>
-              <a:t>16</a:t>
-            </a:fld>
-            <a:endParaRPr lang="en-US"/>
-          </a:p>
-        </p:txBody>
-      </p:sp>
-    </p:spTree>
-    <p:extLst>
-      <p:ext uri="{BB962C8B-B14F-4D97-AF65-F5344CB8AC3E}">
-        <p14:creationId xmlns:p14="http://schemas.microsoft.com/office/powerpoint/2010/main" val="2975500320"/>
       </p:ext>
     </p:extLst>
   </p:cSld>
@@ -2301,6 +2402,133 @@
             <a:fld id="{EDD5B931-01B2-7F4E-98D6-17CE49A98483}" type="slidenum">
               <a:rPr lang="en-US" smtClean="0"/>
               <a:t>17</a:t>
+            </a:fld>
+            <a:endParaRPr lang="en-US"/>
+          </a:p>
+        </p:txBody>
+      </p:sp>
+    </p:spTree>
+    <p:extLst>
+      <p:ext uri="{BB962C8B-B14F-4D97-AF65-F5344CB8AC3E}">
+        <p14:creationId xmlns:p14="http://schemas.microsoft.com/office/powerpoint/2010/main" val="2975500320"/>
+      </p:ext>
+    </p:extLst>
+  </p:cSld>
+  <p:clrMapOvr>
+    <a:masterClrMapping/>
+  </p:clrMapOvr>
+</p:notes>
+</file>
+
+<file path=ppt/notesSlides/notesSlide6.xml><?xml version="1.0" encoding="utf-8"?>
+<p:notes xmlns:a="http://schemas.openxmlformats.org/drawingml/2006/main" xmlns:r="http://schemas.openxmlformats.org/officeDocument/2006/relationships" xmlns:p="http://schemas.openxmlformats.org/presentationml/2006/main">
+  <p:cSld>
+    <p:spTree>
+      <p:nvGrpSpPr>
+        <p:cNvPr id="1" name=""/>
+        <p:cNvGrpSpPr/>
+        <p:nvPr/>
+      </p:nvGrpSpPr>
+      <p:grpSpPr>
+        <a:xfrm>
+          <a:off x="0" y="0"/>
+          <a:ext cx="0" cy="0"/>
+          <a:chOff x="0" y="0"/>
+          <a:chExt cx="0" cy="0"/>
+        </a:xfrm>
+      </p:grpSpPr>
+      <p:sp>
+        <p:nvSpPr>
+          <p:cNvPr id="2" name="Slide Image Placeholder 1"/>
+          <p:cNvSpPr>
+            <a:spLocks noGrp="1" noRot="1" noChangeAspect="1"/>
+          </p:cNvSpPr>
+          <p:nvPr>
+            <p:ph type="sldImg"/>
+          </p:nvPr>
+        </p:nvSpPr>
+        <p:spPr/>
+      </p:sp>
+      <p:sp>
+        <p:nvSpPr>
+          <p:cNvPr id="3" name="Notes Placeholder 2"/>
+          <p:cNvSpPr>
+            <a:spLocks noGrp="1"/>
+          </p:cNvSpPr>
+          <p:nvPr>
+            <p:ph type="body" idx="1"/>
+          </p:nvPr>
+        </p:nvSpPr>
+        <p:spPr/>
+        <p:txBody>
+          <a:bodyPr/>
+          <a:lstStyle/>
+          <a:p>
+            <a:r>
+              <a:rPr lang="en-US" dirty="0"/>
+              <a:t>Table = if </a:t>
+            </a:r>
+            <a:r>
+              <a:rPr lang="en-US" dirty="0" err="1"/>
+              <a:t>placetype</a:t>
+            </a:r>
+            <a:r>
+              <a:rPr lang="en-US" dirty="0"/>
+              <a:t> is “other” please specify. </a:t>
+            </a:r>
+          </a:p>
+          <a:p>
+            <a:endParaRPr lang="en-US" dirty="0"/>
+          </a:p>
+          <a:p>
+            <a:r>
+              <a:rPr lang="en-US" dirty="0"/>
+              <a:t>e.g. “he comes to buy”, “</a:t>
+            </a:r>
+            <a:r>
+              <a:rPr lang="en-GB" dirty="0">
+                <a:effectLst/>
+              </a:rPr>
+              <a:t>He buys livestock from breeders on the way before bringing them to the auction”</a:t>
+            </a:r>
+          </a:p>
+          <a:p>
+            <a:br>
+              <a:rPr lang="en-GB" b="0" i="0" dirty="0">
+                <a:solidFill>
+                  <a:srgbClr val="202124"/>
+                </a:solidFill>
+                <a:effectLst/>
+                <a:latin typeface="arial" panose="020B0604020202020204" pitchFamily="34" charset="0"/>
+              </a:rPr>
+            </a:br>
+            <a:endParaRPr lang="en-GB" dirty="0">
+              <a:effectLst/>
+            </a:endParaRPr>
+          </a:p>
+          <a:p>
+            <a:endParaRPr lang="en-US" dirty="0"/>
+          </a:p>
+        </p:txBody>
+      </p:sp>
+      <p:sp>
+        <p:nvSpPr>
+          <p:cNvPr id="4" name="Slide Number Placeholder 3"/>
+          <p:cNvSpPr>
+            <a:spLocks noGrp="1"/>
+          </p:cNvSpPr>
+          <p:nvPr>
+            <p:ph type="sldNum" sz="quarter" idx="5"/>
+          </p:nvPr>
+        </p:nvSpPr>
+        <p:spPr/>
+        <p:txBody>
+          <a:bodyPr/>
+          <a:lstStyle/>
+          <a:p>
+            <a:fld id="{EDD5B931-01B2-7F4E-98D6-17CE49A98483}" type="slidenum">
+              <a:rPr lang="en-US" smtClean="0"/>
+              <a:t>18</a:t>
             </a:fld>
             <a:endParaRPr lang="en-US"/>
           </a:p>
@@ -5639,6 +5867,220 @@
       </p:grpSpPr>
       <p:sp>
         <p:nvSpPr>
+          <p:cNvPr id="2" name="Title 1">
+            <a:extLst>
+              <a:ext uri="{FF2B5EF4-FFF2-40B4-BE49-F238E27FC236}">
+                <a16:creationId xmlns:a16="http://schemas.microsoft.com/office/drawing/2014/main" id="{A7404919-255D-D502-BC6D-24A58C076AE5}"/>
+              </a:ext>
+            </a:extLst>
+          </p:cNvPr>
+          <p:cNvSpPr>
+            <a:spLocks noGrp="1"/>
+          </p:cNvSpPr>
+          <p:nvPr>
+            <p:ph type="title"/>
+          </p:nvPr>
+        </p:nvSpPr>
+        <p:spPr/>
+        <p:txBody>
+          <a:bodyPr/>
+          <a:lstStyle/>
+          <a:p>
+            <a:endParaRPr lang="en-US"/>
+          </a:p>
+        </p:txBody>
+      </p:sp>
+      <p:sp>
+        <p:nvSpPr>
+          <p:cNvPr id="3" name="Content Placeholder 2">
+            <a:extLst>
+              <a:ext uri="{FF2B5EF4-FFF2-40B4-BE49-F238E27FC236}">
+                <a16:creationId xmlns:a16="http://schemas.microsoft.com/office/drawing/2014/main" id="{4690B8C9-5459-EABC-AFFF-3122F9420A69}"/>
+              </a:ext>
+            </a:extLst>
+          </p:cNvPr>
+          <p:cNvSpPr>
+            <a:spLocks noGrp="1"/>
+          </p:cNvSpPr>
+          <p:nvPr>
+            <p:ph idx="1"/>
+          </p:nvPr>
+        </p:nvSpPr>
+        <p:spPr/>
+        <p:txBody>
+          <a:bodyPr>
+            <a:normAutofit/>
+          </a:bodyPr>
+          <a:lstStyle/>
+          <a:p>
+            <a:r>
+              <a:rPr lang="en-US" dirty="0"/>
+              <a:t>Overview: Market Survey C: </a:t>
+            </a:r>
+            <a:r>
+              <a:rPr lang="en-US" dirty="0" err="1"/>
+              <a:t>buyer&amp;seller</a:t>
+            </a:r>
+            <a:r>
+              <a:rPr lang="en-US" dirty="0"/>
+              <a:t> questionnaire</a:t>
+            </a:r>
+          </a:p>
+          <a:p>
+            <a:pPr marL="342900" lvl="0" indent="-342900">
+              <a:buFont typeface="Symbol" pitchFamily="2" charset="2"/>
+              <a:buChar char=""/>
+            </a:pPr>
+            <a:r>
+              <a:rPr lang="en-US" sz="1800" dirty="0">
+                <a:effectLst/>
+                <a:latin typeface="Calibri" panose="020F0502020204030204" pitchFamily="34" charset="0"/>
+                <a:ea typeface="Calibri" panose="020F0502020204030204" pitchFamily="34" charset="0"/>
+                <a:cs typeface="Calibri" panose="020F0502020204030204" pitchFamily="34" charset="0"/>
+              </a:rPr>
+              <a:t>The tool aims to collect individual data on trading practices and market networks</a:t>
+            </a:r>
+            <a:endParaRPr lang="en-GB" sz="1800" dirty="0">
+              <a:effectLst/>
+              <a:latin typeface="Calibri" panose="020F0502020204030204" pitchFamily="34" charset="0"/>
+              <a:ea typeface="Calibri" panose="020F0502020204030204" pitchFamily="34" charset="0"/>
+              <a:cs typeface="Arial" panose="020B0604020202020204" pitchFamily="34" charset="0"/>
+            </a:endParaRPr>
+          </a:p>
+          <a:p>
+            <a:pPr marL="342900" lvl="0" indent="-342900">
+              <a:buFont typeface="Symbol" pitchFamily="2" charset="2"/>
+              <a:buChar char=""/>
+            </a:pPr>
+            <a:r>
+              <a:rPr lang="en-US" sz="1800" dirty="0">
+                <a:effectLst/>
+                <a:latin typeface="Calibri" panose="020F0502020204030204" pitchFamily="34" charset="0"/>
+                <a:ea typeface="Calibri" panose="020F0502020204030204" pitchFamily="34" charset="0"/>
+                <a:cs typeface="Calibri" panose="020F0502020204030204" pitchFamily="34" charset="0"/>
+              </a:rPr>
+              <a:t>Participants: In each market </a:t>
+            </a:r>
+            <a:r>
+              <a:rPr lang="en-US" sz="1800" dirty="0">
+                <a:effectLst/>
+                <a:highlight>
+                  <a:srgbClr val="FFFF00"/>
+                </a:highlight>
+                <a:latin typeface="Calibri" panose="020F0502020204030204" pitchFamily="34" charset="0"/>
+                <a:ea typeface="Calibri" panose="020F0502020204030204" pitchFamily="34" charset="0"/>
+                <a:cs typeface="Calibri" panose="020F0502020204030204" pitchFamily="34" charset="0"/>
+              </a:rPr>
+              <a:t>a minimum of 20 people need to be interview, or 10% of people buying and/or selling</a:t>
+            </a:r>
+            <a:r>
+              <a:rPr lang="en-US" sz="1800" dirty="0">
+                <a:effectLst/>
+                <a:latin typeface="Calibri" panose="020F0502020204030204" pitchFamily="34" charset="0"/>
+                <a:ea typeface="Calibri" panose="020F0502020204030204" pitchFamily="34" charset="0"/>
+                <a:cs typeface="Calibri" panose="020F0502020204030204" pitchFamily="34" charset="0"/>
+              </a:rPr>
+              <a:t>, depending on the size of the market</a:t>
+            </a:r>
+            <a:endParaRPr lang="en-GB" sz="1800" dirty="0">
+              <a:effectLst/>
+              <a:latin typeface="Calibri" panose="020F0502020204030204" pitchFamily="34" charset="0"/>
+              <a:ea typeface="Calibri" panose="020F0502020204030204" pitchFamily="34" charset="0"/>
+              <a:cs typeface="Arial" panose="020B0604020202020204" pitchFamily="34" charset="0"/>
+            </a:endParaRPr>
+          </a:p>
+          <a:p>
+            <a:pPr marL="342900" lvl="0" indent="-342900">
+              <a:buFont typeface="Symbol" pitchFamily="2" charset="2"/>
+              <a:buChar char=""/>
+            </a:pPr>
+            <a:r>
+              <a:rPr lang="en-US" sz="1800" dirty="0">
+                <a:effectLst/>
+                <a:latin typeface="Calibri" panose="020F0502020204030204" pitchFamily="34" charset="0"/>
+                <a:ea typeface="Calibri" panose="020F0502020204030204" pitchFamily="34" charset="0"/>
+                <a:cs typeface="Calibri" panose="020F0502020204030204" pitchFamily="34" charset="0"/>
+              </a:rPr>
+              <a:t>Interviews takes 5-10 minutes and need to be carried out in the marketplace</a:t>
+            </a:r>
+            <a:endParaRPr lang="en-GB" sz="1800" dirty="0">
+              <a:effectLst/>
+              <a:latin typeface="Calibri" panose="020F0502020204030204" pitchFamily="34" charset="0"/>
+              <a:ea typeface="Calibri" panose="020F0502020204030204" pitchFamily="34" charset="0"/>
+              <a:cs typeface="Arial" panose="020B0604020202020204" pitchFamily="34" charset="0"/>
+            </a:endParaRPr>
+          </a:p>
+          <a:p>
+            <a:pPr marL="342900" lvl="0" indent="-342900">
+              <a:buFont typeface="Symbol" pitchFamily="2" charset="2"/>
+              <a:buChar char=""/>
+            </a:pPr>
+            <a:r>
+              <a:rPr lang="en-US" sz="1800" dirty="0">
+                <a:effectLst/>
+                <a:latin typeface="Calibri" panose="020F0502020204030204" pitchFamily="34" charset="0"/>
+                <a:ea typeface="Calibri" panose="020F0502020204030204" pitchFamily="34" charset="0"/>
+                <a:cs typeface="Calibri" panose="020F0502020204030204" pitchFamily="34" charset="0"/>
+              </a:rPr>
+              <a:t>Data collection in the market: The transect walk method:</a:t>
+            </a:r>
+          </a:p>
+          <a:p>
+            <a:pPr marL="800100" lvl="1" indent="-342900">
+              <a:buFont typeface="Symbol" pitchFamily="2" charset="2"/>
+              <a:buChar char=""/>
+            </a:pPr>
+            <a:r>
+              <a:rPr lang="en-GB" sz="800" i="1" dirty="0">
+                <a:effectLst/>
+              </a:rPr>
+              <a:t>The people to be interviewed should be selected randomly or systematically to obtain a representative sample of all types of buyer and sellers and to avoid bias. The research team for each country should discuss how their markets are laid out and make a plan of how to obtain an unbiased sample. If the markets are laid out in a rectangular enclosure, then the field team should walk a transect from one corner of the market, diagonally across the market area to the opposite corner, interviewing every person buying and selling that they meet along the transect. Having completed one transect, if more interviews are required, a second transect can be made starting in a different corner. However, if the market is circular with all the people buying and selling arranged around the edge with very few in the middle, then the team can start at one point and move around the edge of the circle, interviewing everyone that they meet. Having completed the transects or circle, it may become clear that some key types of buyers or sellers have been missed e.g. sometimes the commercial traders are very busy and moving quickly in the market place so the team has not managed to meet many during the transect. In this case, they can be purposively tracked down for interview in addition to the 20 people/10% people interviewed in the main market area. </a:t>
+            </a:r>
+            <a:endParaRPr lang="en-US" dirty="0"/>
+          </a:p>
+          <a:p>
+            <a:r>
+              <a:rPr lang="en-US" dirty="0"/>
+              <a:t>Total observations: 3310</a:t>
+            </a:r>
+          </a:p>
+          <a:p>
+            <a:endParaRPr lang="en-US" dirty="0"/>
+          </a:p>
+        </p:txBody>
+      </p:sp>
+    </p:spTree>
+    <p:extLst>
+      <p:ext uri="{BB962C8B-B14F-4D97-AF65-F5344CB8AC3E}">
+        <p14:creationId xmlns:p14="http://schemas.microsoft.com/office/powerpoint/2010/main" val="2322920798"/>
+      </p:ext>
+    </p:extLst>
+  </p:cSld>
+  <p:clrMapOvr>
+    <a:masterClrMapping/>
+  </p:clrMapOvr>
+</p:sld>
+</file>
+
+<file path=ppt/slides/slide11.xml><?xml version="1.0" encoding="utf-8"?>
+<p:sld xmlns:a="http://schemas.openxmlformats.org/drawingml/2006/main" xmlns:r="http://schemas.openxmlformats.org/officeDocument/2006/relationships" xmlns:p="http://schemas.openxmlformats.org/presentationml/2006/main">
+  <p:cSld>
+    <p:spTree>
+      <p:nvGrpSpPr>
+        <p:cNvPr id="1" name=""/>
+        <p:cNvGrpSpPr/>
+        <p:nvPr/>
+      </p:nvGrpSpPr>
+      <p:grpSpPr>
+        <a:xfrm>
+          <a:off x="0" y="0"/>
+          <a:ext cx="0" cy="0"/>
+          <a:chOff x="0" y="0"/>
+          <a:chExt cx="0" cy="0"/>
+        </a:xfrm>
+      </p:grpSpPr>
+      <p:sp>
+        <p:nvSpPr>
           <p:cNvPr id="4" name="Title 3">
             <a:extLst>
               <a:ext uri="{FF2B5EF4-FFF2-40B4-BE49-F238E27FC236}">
@@ -5703,7 +6145,7 @@
 </p:sld>
 </file>
 
-<file path=ppt/slides/slide11.xml><?xml version="1.0" encoding="utf-8"?>
+<file path=ppt/slides/slide12.xml><?xml version="1.0" encoding="utf-8"?>
 <p:sld xmlns:a="http://schemas.openxmlformats.org/drawingml/2006/main" xmlns:r="http://schemas.openxmlformats.org/officeDocument/2006/relationships" xmlns:p="http://schemas.openxmlformats.org/presentationml/2006/main">
   <p:cSld>
     <p:bg>
@@ -11601,7 +12043,7 @@
 </p:sld>
 </file>
 
-<file path=ppt/slides/slide12.xml><?xml version="1.0" encoding="utf-8"?>
+<file path=ppt/slides/slide13.xml><?xml version="1.0" encoding="utf-8"?>
 <p:sld xmlns:a="http://schemas.openxmlformats.org/drawingml/2006/main" xmlns:r="http://schemas.openxmlformats.org/officeDocument/2006/relationships" xmlns:p="http://schemas.openxmlformats.org/presentationml/2006/main">
   <p:cSld>
     <p:spTree>
@@ -11797,7 +12239,7 @@
 </p:sld>
 </file>
 
-<file path=ppt/slides/slide13.xml><?xml version="1.0" encoding="utf-8"?>
+<file path=ppt/slides/slide14.xml><?xml version="1.0" encoding="utf-8"?>
 <p:sld xmlns:a="http://schemas.openxmlformats.org/drawingml/2006/main" xmlns:r="http://schemas.openxmlformats.org/officeDocument/2006/relationships" xmlns:p="http://schemas.openxmlformats.org/presentationml/2006/main">
   <p:cSld>
     <p:spTree>
@@ -11880,7 +12322,7 @@
 </p:sld>
 </file>
 
-<file path=ppt/slides/slide14.xml><?xml version="1.0" encoding="utf-8"?>
+<file path=ppt/slides/slide15.xml><?xml version="1.0" encoding="utf-8"?>
 <p:sld xmlns:a="http://schemas.openxmlformats.org/drawingml/2006/main" xmlns:r="http://schemas.openxmlformats.org/officeDocument/2006/relationships" xmlns:p="http://schemas.openxmlformats.org/presentationml/2006/main">
   <p:cSld>
     <p:bg>
@@ -15707,7 +16149,7 @@
 </p:sld>
 </file>
 
-<file path=ppt/slides/slide15.xml><?xml version="1.0" encoding="utf-8"?>
+<file path=ppt/slides/slide16.xml><?xml version="1.0" encoding="utf-8"?>
 <p:sld xmlns:a="http://schemas.openxmlformats.org/drawingml/2006/main" xmlns:r="http://schemas.openxmlformats.org/officeDocument/2006/relationships" xmlns:p="http://schemas.openxmlformats.org/presentationml/2006/main">
   <p:cSld>
     <p:spTree>
@@ -15835,7 +16277,7 @@
 </p:sld>
 </file>
 
-<file path=ppt/slides/slide16.xml><?xml version="1.0" encoding="utf-8"?>
+<file path=ppt/slides/slide17.xml><?xml version="1.0" encoding="utf-8"?>
 <p:sld xmlns:a="http://schemas.openxmlformats.org/drawingml/2006/main" xmlns:r="http://schemas.openxmlformats.org/officeDocument/2006/relationships" xmlns:p="http://schemas.openxmlformats.org/presentationml/2006/main">
   <p:cSld>
     <p:spTree>
@@ -15998,7 +16440,7 @@
 </p:sld>
 </file>
 
-<file path=ppt/slides/slide17.xml><?xml version="1.0" encoding="utf-8"?>
+<file path=ppt/slides/slide18.xml><?xml version="1.0" encoding="utf-8"?>
 <p:sld xmlns:a="http://schemas.openxmlformats.org/drawingml/2006/main" xmlns:r="http://schemas.openxmlformats.org/officeDocument/2006/relationships" xmlns:p="http://schemas.openxmlformats.org/presentationml/2006/main">
   <p:cSld>
     <p:spTree>
@@ -16290,7 +16732,7 @@
 </p:sld>
 </file>
 
-<file path=ppt/slides/slide18.xml><?xml version="1.0" encoding="utf-8"?>
+<file path=ppt/slides/slide19.xml><?xml version="1.0" encoding="utf-8"?>
 <p:sld xmlns:a="http://schemas.openxmlformats.org/drawingml/2006/main" xmlns:r="http://schemas.openxmlformats.org/officeDocument/2006/relationships" xmlns:p="http://schemas.openxmlformats.org/presentationml/2006/main">
   <p:cSld>
     <p:spTree>
@@ -17300,86 +17742,6 @@
           <a:chExt cx="0" cy="0"/>
         </a:xfrm>
       </p:grpSpPr>
-      <p:sp>
-        <p:nvSpPr>
-          <p:cNvPr id="2" name="Title 1">
-            <a:extLst>
-              <a:ext uri="{FF2B5EF4-FFF2-40B4-BE49-F238E27FC236}">
-                <a16:creationId xmlns:a16="http://schemas.microsoft.com/office/drawing/2014/main" id="{3C0C5055-7900-0A67-B32E-ED9F21C7A39B}"/>
-              </a:ext>
-            </a:extLst>
-          </p:cNvPr>
-          <p:cNvSpPr>
-            <a:spLocks noGrp="1"/>
-          </p:cNvSpPr>
-          <p:nvPr>
-            <p:ph type="title"/>
-          </p:nvPr>
-        </p:nvSpPr>
-        <p:spPr/>
-        <p:txBody>
-          <a:bodyPr/>
-          <a:lstStyle/>
-          <a:p>
-            <a:endParaRPr lang="en-US" dirty="0"/>
-          </a:p>
-        </p:txBody>
-      </p:sp>
-      <p:sp>
-        <p:nvSpPr>
-          <p:cNvPr id="3" name="Content Placeholder 2">
-            <a:extLst>
-              <a:ext uri="{FF2B5EF4-FFF2-40B4-BE49-F238E27FC236}">
-                <a16:creationId xmlns:a16="http://schemas.microsoft.com/office/drawing/2014/main" id="{0C14CF20-B21B-36D5-2ECF-2D31E667E5B6}"/>
-              </a:ext>
-            </a:extLst>
-          </p:cNvPr>
-          <p:cNvSpPr>
-            <a:spLocks noGrp="1"/>
-          </p:cNvSpPr>
-          <p:nvPr>
-            <p:ph idx="1"/>
-          </p:nvPr>
-        </p:nvSpPr>
-        <p:spPr/>
-        <p:txBody>
-          <a:bodyPr/>
-          <a:lstStyle/>
-          <a:p>
-            <a:endParaRPr lang="en-US"/>
-          </a:p>
-        </p:txBody>
-      </p:sp>
-    </p:spTree>
-    <p:extLst>
-      <p:ext uri="{BB962C8B-B14F-4D97-AF65-F5344CB8AC3E}">
-        <p14:creationId xmlns:p14="http://schemas.microsoft.com/office/powerpoint/2010/main" val="3593166571"/>
-      </p:ext>
-    </p:extLst>
-  </p:cSld>
-  <p:clrMapOvr>
-    <a:masterClrMapping/>
-  </p:clrMapOvr>
-</p:sld>
-</file>
-
-<file path=ppt/slides/slide5.xml><?xml version="1.0" encoding="utf-8"?>
-<p:sld xmlns:a="http://schemas.openxmlformats.org/drawingml/2006/main" xmlns:r="http://schemas.openxmlformats.org/officeDocument/2006/relationships" xmlns:p="http://schemas.openxmlformats.org/presentationml/2006/main">
-  <p:cSld>
-    <p:spTree>
-      <p:nvGrpSpPr>
-        <p:cNvPr id="1" name=""/>
-        <p:cNvGrpSpPr/>
-        <p:nvPr/>
-      </p:nvGrpSpPr>
-      <p:grpSpPr>
-        <a:xfrm>
-          <a:off x="0" y="0"/>
-          <a:ext cx="0" cy="0"/>
-          <a:chOff x="0" y="0"/>
-          <a:chExt cx="0" cy="0"/>
-        </a:xfrm>
-      </p:grpSpPr>
       <p:pic>
         <p:nvPicPr>
           <p:cNvPr id="6" name="Picture 5">
@@ -18439,7 +18801,971 @@
 </p:sld>
 </file>
 
+<file path=ppt/slides/slide5.xml><?xml version="1.0" encoding="utf-8"?>
+<p:sld xmlns:a="http://schemas.openxmlformats.org/drawingml/2006/main" xmlns:r="http://schemas.openxmlformats.org/officeDocument/2006/relationships" xmlns:p="http://schemas.openxmlformats.org/presentationml/2006/main">
+  <p:cSld>
+    <p:spTree>
+      <p:nvGrpSpPr>
+        <p:cNvPr id="1" name=""/>
+        <p:cNvGrpSpPr/>
+        <p:nvPr/>
+      </p:nvGrpSpPr>
+      <p:grpSpPr>
+        <a:xfrm>
+          <a:off x="0" y="0"/>
+          <a:ext cx="0" cy="0"/>
+          <a:chOff x="0" y="0"/>
+          <a:chExt cx="0" cy="0"/>
+        </a:xfrm>
+      </p:grpSpPr>
+      <p:pic>
+        <p:nvPicPr>
+          <p:cNvPr id="2" name="Picture 1">
+            <a:extLst>
+              <a:ext uri="{FF2B5EF4-FFF2-40B4-BE49-F238E27FC236}">
+                <a16:creationId xmlns:a16="http://schemas.microsoft.com/office/drawing/2014/main" id="{12480DC4-77D4-359C-EEC1-B639EFDE7384}"/>
+              </a:ext>
+            </a:extLst>
+          </p:cNvPr>
+          <p:cNvPicPr>
+            <a:picLocks noChangeAspect="1"/>
+          </p:cNvPicPr>
+          <p:nvPr/>
+        </p:nvPicPr>
+        <p:blipFill>
+          <a:blip r:embed="rId2"/>
+          <a:stretch>
+            <a:fillRect/>
+          </a:stretch>
+        </p:blipFill>
+        <p:spPr>
+          <a:xfrm>
+            <a:off x="3765550" y="755650"/>
+            <a:ext cx="6896100" cy="5346700"/>
+          </a:xfrm>
+          <a:prstGeom prst="rect">
+            <a:avLst/>
+          </a:prstGeom>
+        </p:spPr>
+      </p:pic>
+      <p:sp>
+        <p:nvSpPr>
+          <p:cNvPr id="3" name="TextBox 2">
+            <a:extLst>
+              <a:ext uri="{FF2B5EF4-FFF2-40B4-BE49-F238E27FC236}">
+                <a16:creationId xmlns:a16="http://schemas.microsoft.com/office/drawing/2014/main" id="{EDBE2688-0C13-F5A8-200A-C80AE04777D5}"/>
+              </a:ext>
+            </a:extLst>
+          </p:cNvPr>
+          <p:cNvSpPr txBox="1"/>
+          <p:nvPr/>
+        </p:nvSpPr>
+        <p:spPr>
+          <a:xfrm>
+            <a:off x="10023323" y="6307494"/>
+            <a:ext cx="1996751" cy="369332"/>
+          </a:xfrm>
+          <a:prstGeom prst="rect">
+            <a:avLst/>
+          </a:prstGeom>
+          <a:noFill/>
+        </p:spPr>
+        <p:txBody>
+          <a:bodyPr wrap="square" rtlCol="0">
+            <a:spAutoFit/>
+          </a:bodyPr>
+          <a:lstStyle/>
+          <a:p>
+            <a:r>
+              <a:rPr lang="en-US" dirty="0"/>
+              <a:t>Updated: 02/03/23</a:t>
+            </a:r>
+          </a:p>
+        </p:txBody>
+      </p:sp>
+      <p:sp>
+        <p:nvSpPr>
+          <p:cNvPr id="4" name="TextBox 3">
+            <a:extLst>
+              <a:ext uri="{FF2B5EF4-FFF2-40B4-BE49-F238E27FC236}">
+                <a16:creationId xmlns:a16="http://schemas.microsoft.com/office/drawing/2014/main" id="{C7A8FD41-2695-25F3-48B2-9B1CAB005063}"/>
+              </a:ext>
+            </a:extLst>
+          </p:cNvPr>
+          <p:cNvSpPr txBox="1"/>
+          <p:nvPr/>
+        </p:nvSpPr>
+        <p:spPr>
+          <a:xfrm>
+            <a:off x="388256" y="755650"/>
+            <a:ext cx="3377294" cy="646331"/>
+          </a:xfrm>
+          <a:prstGeom prst="rect">
+            <a:avLst/>
+          </a:prstGeom>
+          <a:noFill/>
+        </p:spPr>
+        <p:txBody>
+          <a:bodyPr wrap="square" rtlCol="0">
+            <a:spAutoFit/>
+          </a:bodyPr>
+          <a:lstStyle/>
+          <a:p>
+            <a:r>
+              <a:rPr lang="en-US" b="1" dirty="0"/>
+              <a:t>Districts targeted for data collection</a:t>
+            </a:r>
+          </a:p>
+        </p:txBody>
+      </p:sp>
+    </p:spTree>
+    <p:extLst>
+      <p:ext uri="{BB962C8B-B14F-4D97-AF65-F5344CB8AC3E}">
+        <p14:creationId xmlns:p14="http://schemas.microsoft.com/office/powerpoint/2010/main" val="1052102471"/>
+      </p:ext>
+    </p:extLst>
+  </p:cSld>
+  <p:clrMapOvr>
+    <a:masterClrMapping/>
+  </p:clrMapOvr>
+</p:sld>
+</file>
+
 <file path=ppt/slides/slide6.xml><?xml version="1.0" encoding="utf-8"?>
+<p:sld xmlns:a="http://schemas.openxmlformats.org/drawingml/2006/main" xmlns:r="http://schemas.openxmlformats.org/officeDocument/2006/relationships" xmlns:p="http://schemas.openxmlformats.org/presentationml/2006/main">
+  <p:cSld>
+    <p:spTree>
+      <p:nvGrpSpPr>
+        <p:cNvPr id="1" name=""/>
+        <p:cNvGrpSpPr/>
+        <p:nvPr/>
+      </p:nvGrpSpPr>
+      <p:grpSpPr>
+        <a:xfrm>
+          <a:off x="0" y="0"/>
+          <a:ext cx="0" cy="0"/>
+          <a:chOff x="0" y="0"/>
+          <a:chExt cx="0" cy="0"/>
+        </a:xfrm>
+      </p:grpSpPr>
+      <p:graphicFrame>
+        <p:nvGraphicFramePr>
+          <p:cNvPr id="2" name="Table 1">
+            <a:extLst>
+              <a:ext uri="{FF2B5EF4-FFF2-40B4-BE49-F238E27FC236}">
+                <a16:creationId xmlns:a16="http://schemas.microsoft.com/office/drawing/2014/main" id="{BE45730D-5E19-81A6-F1BE-0CD26B902348}"/>
+              </a:ext>
+            </a:extLst>
+          </p:cNvPr>
+          <p:cNvGraphicFramePr>
+            <a:graphicFrameLocks noGrp="1"/>
+          </p:cNvGraphicFramePr>
+          <p:nvPr>
+            <p:extLst>
+              <p:ext uri="{D42A27DB-BD31-4B8C-83A1-F6EECF244321}">
+                <p14:modId xmlns:p14="http://schemas.microsoft.com/office/powerpoint/2010/main" val="1720027423"/>
+              </p:ext>
+            </p:extLst>
+          </p:nvPr>
+        </p:nvGraphicFramePr>
+        <p:xfrm>
+          <a:off x="8297333" y="1612900"/>
+          <a:ext cx="3716867" cy="3088640"/>
+        </p:xfrm>
+        <a:graphic>
+          <a:graphicData uri="http://schemas.openxmlformats.org/drawingml/2006/table">
+            <a:tbl>
+              <a:tblPr firstRow="1" firstCol="1" bandRow="1">
+                <a:tableStyleId>{9D7B26C5-4107-4FEC-AEDC-1716B250A1EF}</a:tableStyleId>
+              </a:tblPr>
+              <a:tblGrid>
+                <a:gridCol w="830315">
+                  <a:extLst>
+                    <a:ext uri="{9D8B030D-6E8A-4147-A177-3AD203B41FA5}">
+                      <a16:colId xmlns:a16="http://schemas.microsoft.com/office/drawing/2014/main" val="849713813"/>
+                    </a:ext>
+                  </a:extLst>
+                </a:gridCol>
+                <a:gridCol w="2886552">
+                  <a:extLst>
+                    <a:ext uri="{9D8B030D-6E8A-4147-A177-3AD203B41FA5}">
+                      <a16:colId xmlns:a16="http://schemas.microsoft.com/office/drawing/2014/main" val="2617540059"/>
+                    </a:ext>
+                  </a:extLst>
+                </a:gridCol>
+              </a:tblGrid>
+              <a:tr h="203200">
+                <a:tc>
+                  <a:txBody>
+                    <a:bodyPr/>
+                    <a:lstStyle/>
+                    <a:p>
+                      <a:r>
+                        <a:rPr lang="en-GB" sz="1200" dirty="0">
+                          <a:effectLst/>
+                          <a:latin typeface="Calibri" panose="020F0502020204030204" pitchFamily="34" charset="0"/>
+                          <a:ea typeface="Calibri" panose="020F0502020204030204" pitchFamily="34" charset="0"/>
+                          <a:cs typeface="Times New Roman" panose="02020603050405020304" pitchFamily="18" charset="0"/>
+                        </a:rPr>
+                        <a:t>Region</a:t>
+                      </a:r>
+                    </a:p>
+                  </a:txBody>
+                  <a:tcPr marL="68580" marR="68580" marT="0" marB="0" anchor="b"/>
+                </a:tc>
+                <a:tc>
+                  <a:txBody>
+                    <a:bodyPr/>
+                    <a:lstStyle/>
+                    <a:p>
+                      <a:r>
+                        <a:rPr lang="en-GB" sz="1200" dirty="0">
+                          <a:effectLst/>
+                          <a:latin typeface="Calibri" panose="020F0502020204030204" pitchFamily="34" charset="0"/>
+                          <a:ea typeface="Calibri" panose="020F0502020204030204" pitchFamily="34" charset="0"/>
+                          <a:cs typeface="Times New Roman" panose="02020603050405020304" pitchFamily="18" charset="0"/>
+                        </a:rPr>
+                        <a:t>Location (study site) </a:t>
+                      </a:r>
+                    </a:p>
+                  </a:txBody>
+                  <a:tcPr marL="68580" marR="68580" marT="0" marB="0"/>
+                </a:tc>
+                <a:extLst>
+                  <a:ext uri="{0D108BD9-81ED-4DB2-BD59-A6C34878D82A}">
+                    <a16:rowId xmlns:a16="http://schemas.microsoft.com/office/drawing/2014/main" val="832168746"/>
+                  </a:ext>
+                </a:extLst>
+              </a:tr>
+              <a:tr h="203200">
+                <a:tc>
+                  <a:txBody>
+                    <a:bodyPr/>
+                    <a:lstStyle/>
+                    <a:p>
+                      <a:r>
+                        <a:rPr lang="en-GB" sz="1200" dirty="0">
+                          <a:effectLst/>
+                        </a:rPr>
+                        <a:t>KATAVI</a:t>
+                      </a:r>
+                      <a:endParaRPr lang="en-GB" sz="1200" dirty="0">
+                        <a:effectLst/>
+                        <a:latin typeface="Calibri" panose="020F0502020204030204" pitchFamily="34" charset="0"/>
+                        <a:ea typeface="Calibri" panose="020F0502020204030204" pitchFamily="34" charset="0"/>
+                        <a:cs typeface="Times New Roman" panose="02020603050405020304" pitchFamily="18" charset="0"/>
+                      </a:endParaRPr>
+                    </a:p>
+                  </a:txBody>
+                  <a:tcPr marL="68580" marR="68580" marT="0" marB="0" anchor="b"/>
+                </a:tc>
+                <a:tc>
+                  <a:txBody>
+                    <a:bodyPr/>
+                    <a:lstStyle/>
+                    <a:p>
+                      <a:r>
+                        <a:rPr lang="en-GB" sz="1200" dirty="0">
+                          <a:effectLst/>
+                        </a:rPr>
+                        <a:t>West. </a:t>
+                      </a:r>
+                      <a:r>
+                        <a:rPr lang="en-GB" sz="1200" b="1" dirty="0" err="1">
+                          <a:effectLst/>
+                        </a:rPr>
+                        <a:t>Mpimbwe</a:t>
+                      </a:r>
+                      <a:r>
+                        <a:rPr lang="en-GB" sz="1200" dirty="0">
+                          <a:effectLst/>
+                        </a:rPr>
+                        <a:t> district in this region</a:t>
+                      </a:r>
+                      <a:endParaRPr lang="en-GB" sz="1200" dirty="0">
+                        <a:effectLst/>
+                        <a:latin typeface="Calibri" panose="020F0502020204030204" pitchFamily="34" charset="0"/>
+                        <a:ea typeface="Calibri" panose="020F0502020204030204" pitchFamily="34" charset="0"/>
+                        <a:cs typeface="Times New Roman" panose="02020603050405020304" pitchFamily="18" charset="0"/>
+                      </a:endParaRPr>
+                    </a:p>
+                  </a:txBody>
+                  <a:tcPr marL="68580" marR="68580" marT="0" marB="0"/>
+                </a:tc>
+                <a:extLst>
+                  <a:ext uri="{0D108BD9-81ED-4DB2-BD59-A6C34878D82A}">
+                    <a16:rowId xmlns:a16="http://schemas.microsoft.com/office/drawing/2014/main" val="2900729276"/>
+                  </a:ext>
+                </a:extLst>
+              </a:tr>
+              <a:tr h="203200">
+                <a:tc>
+                  <a:txBody>
+                    <a:bodyPr/>
+                    <a:lstStyle/>
+                    <a:p>
+                      <a:r>
+                        <a:rPr lang="en-GB" sz="1200">
+                          <a:effectLst/>
+                        </a:rPr>
+                        <a:t>SIMIYU</a:t>
+                      </a:r>
+                      <a:endParaRPr lang="en-GB" sz="1200">
+                        <a:effectLst/>
+                        <a:latin typeface="Calibri" panose="020F0502020204030204" pitchFamily="34" charset="0"/>
+                        <a:ea typeface="Calibri" panose="020F0502020204030204" pitchFamily="34" charset="0"/>
+                        <a:cs typeface="Times New Roman" panose="02020603050405020304" pitchFamily="18" charset="0"/>
+                      </a:endParaRPr>
+                    </a:p>
+                  </a:txBody>
+                  <a:tcPr marL="68580" marR="68580" marT="0" marB="0" anchor="b"/>
+                </a:tc>
+                <a:tc>
+                  <a:txBody>
+                    <a:bodyPr/>
+                    <a:lstStyle/>
+                    <a:p>
+                      <a:r>
+                        <a:rPr lang="en-GB" sz="1200" dirty="0">
+                          <a:effectLst/>
+                        </a:rPr>
+                        <a:t>North. </a:t>
+                      </a:r>
+                      <a:r>
+                        <a:rPr lang="en-GB" sz="1200" b="1" dirty="0" err="1">
+                          <a:effectLst/>
+                        </a:rPr>
+                        <a:t>Bariadi</a:t>
+                      </a:r>
+                      <a:r>
+                        <a:rPr lang="en-GB" sz="1200" dirty="0">
+                          <a:effectLst/>
+                        </a:rPr>
+                        <a:t> is the regional capital.</a:t>
+                      </a:r>
+                      <a:endParaRPr lang="en-GB" sz="1200" dirty="0">
+                        <a:effectLst/>
+                        <a:latin typeface="Calibri" panose="020F0502020204030204" pitchFamily="34" charset="0"/>
+                        <a:ea typeface="Calibri" panose="020F0502020204030204" pitchFamily="34" charset="0"/>
+                        <a:cs typeface="Times New Roman" panose="02020603050405020304" pitchFamily="18" charset="0"/>
+                      </a:endParaRPr>
+                    </a:p>
+                  </a:txBody>
+                  <a:tcPr marL="68580" marR="68580" marT="0" marB="0"/>
+                </a:tc>
+                <a:extLst>
+                  <a:ext uri="{0D108BD9-81ED-4DB2-BD59-A6C34878D82A}">
+                    <a16:rowId xmlns:a16="http://schemas.microsoft.com/office/drawing/2014/main" val="2626066860"/>
+                  </a:ext>
+                </a:extLst>
+              </a:tr>
+              <a:tr h="203200">
+                <a:tc>
+                  <a:txBody>
+                    <a:bodyPr/>
+                    <a:lstStyle/>
+                    <a:p>
+                      <a:r>
+                        <a:rPr lang="en-GB" sz="1200">
+                          <a:effectLst/>
+                        </a:rPr>
+                        <a:t>MBEYA</a:t>
+                      </a:r>
+                      <a:endParaRPr lang="en-GB" sz="1200">
+                        <a:effectLst/>
+                        <a:latin typeface="Calibri" panose="020F0502020204030204" pitchFamily="34" charset="0"/>
+                        <a:ea typeface="Calibri" panose="020F0502020204030204" pitchFamily="34" charset="0"/>
+                        <a:cs typeface="Times New Roman" panose="02020603050405020304" pitchFamily="18" charset="0"/>
+                      </a:endParaRPr>
+                    </a:p>
+                  </a:txBody>
+                  <a:tcPr marL="68580" marR="68580" marT="0" marB="0" anchor="b"/>
+                </a:tc>
+                <a:tc>
+                  <a:txBody>
+                    <a:bodyPr/>
+                    <a:lstStyle/>
+                    <a:p>
+                      <a:r>
+                        <a:rPr lang="en-GB" sz="1200" dirty="0">
+                          <a:effectLst/>
+                        </a:rPr>
+                        <a:t>West/South-West. </a:t>
+                      </a:r>
+                      <a:r>
+                        <a:rPr lang="en-GB" sz="1200" b="1" dirty="0" err="1">
+                          <a:effectLst/>
+                        </a:rPr>
+                        <a:t>Mbarali</a:t>
+                      </a:r>
+                      <a:r>
+                        <a:rPr lang="en-GB" sz="1200" dirty="0">
+                          <a:effectLst/>
+                        </a:rPr>
+                        <a:t> District in this region.</a:t>
+                      </a:r>
+                      <a:endParaRPr lang="en-GB" sz="1200" dirty="0">
+                        <a:effectLst/>
+                        <a:latin typeface="Calibri" panose="020F0502020204030204" pitchFamily="34" charset="0"/>
+                        <a:ea typeface="Calibri" panose="020F0502020204030204" pitchFamily="34" charset="0"/>
+                        <a:cs typeface="Times New Roman" panose="02020603050405020304" pitchFamily="18" charset="0"/>
+                      </a:endParaRPr>
+                    </a:p>
+                  </a:txBody>
+                  <a:tcPr marL="68580" marR="68580" marT="0" marB="0"/>
+                </a:tc>
+                <a:extLst>
+                  <a:ext uri="{0D108BD9-81ED-4DB2-BD59-A6C34878D82A}">
+                    <a16:rowId xmlns:a16="http://schemas.microsoft.com/office/drawing/2014/main" val="630493423"/>
+                  </a:ext>
+                </a:extLst>
+              </a:tr>
+              <a:tr h="203200">
+                <a:tc>
+                  <a:txBody>
+                    <a:bodyPr/>
+                    <a:lstStyle/>
+                    <a:p>
+                      <a:r>
+                        <a:rPr lang="en-GB" sz="1200">
+                          <a:effectLst/>
+                        </a:rPr>
+                        <a:t>MTWARA</a:t>
+                      </a:r>
+                      <a:endParaRPr lang="en-GB" sz="1200">
+                        <a:effectLst/>
+                        <a:latin typeface="Calibri" panose="020F0502020204030204" pitchFamily="34" charset="0"/>
+                        <a:ea typeface="Calibri" panose="020F0502020204030204" pitchFamily="34" charset="0"/>
+                        <a:cs typeface="Times New Roman" panose="02020603050405020304" pitchFamily="18" charset="0"/>
+                      </a:endParaRPr>
+                    </a:p>
+                  </a:txBody>
+                  <a:tcPr marL="68580" marR="68580" marT="0" marB="0" anchor="b"/>
+                </a:tc>
+                <a:tc>
+                  <a:txBody>
+                    <a:bodyPr/>
+                    <a:lstStyle/>
+                    <a:p>
+                      <a:r>
+                        <a:rPr lang="en-GB" sz="1200" dirty="0">
+                          <a:effectLst/>
+                        </a:rPr>
+                        <a:t>South (South-East). </a:t>
+                      </a:r>
+                      <a:r>
+                        <a:rPr lang="en-GB" sz="1200" b="1" dirty="0" err="1">
+                          <a:effectLst/>
+                        </a:rPr>
+                        <a:t>Masasi</a:t>
+                      </a:r>
+                      <a:r>
+                        <a:rPr lang="en-GB" sz="1200" dirty="0">
+                          <a:effectLst/>
+                        </a:rPr>
+                        <a:t> district in this region</a:t>
+                      </a:r>
+                      <a:endParaRPr lang="en-GB" sz="1200" dirty="0">
+                        <a:effectLst/>
+                        <a:latin typeface="Calibri" panose="020F0502020204030204" pitchFamily="34" charset="0"/>
+                        <a:ea typeface="Calibri" panose="020F0502020204030204" pitchFamily="34" charset="0"/>
+                        <a:cs typeface="Times New Roman" panose="02020603050405020304" pitchFamily="18" charset="0"/>
+                      </a:endParaRPr>
+                    </a:p>
+                  </a:txBody>
+                  <a:tcPr marL="68580" marR="68580" marT="0" marB="0"/>
+                </a:tc>
+                <a:extLst>
+                  <a:ext uri="{0D108BD9-81ED-4DB2-BD59-A6C34878D82A}">
+                    <a16:rowId xmlns:a16="http://schemas.microsoft.com/office/drawing/2014/main" val="1123012306"/>
+                  </a:ext>
+                </a:extLst>
+              </a:tr>
+              <a:tr h="203200">
+                <a:tc>
+                  <a:txBody>
+                    <a:bodyPr/>
+                    <a:lstStyle/>
+                    <a:p>
+                      <a:r>
+                        <a:rPr lang="en-GB" sz="1200">
+                          <a:effectLst/>
+                        </a:rPr>
+                        <a:t>MOROGORO</a:t>
+                      </a:r>
+                      <a:endParaRPr lang="en-GB" sz="1200">
+                        <a:effectLst/>
+                        <a:latin typeface="Calibri" panose="020F0502020204030204" pitchFamily="34" charset="0"/>
+                        <a:ea typeface="Calibri" panose="020F0502020204030204" pitchFamily="34" charset="0"/>
+                        <a:cs typeface="Times New Roman" panose="02020603050405020304" pitchFamily="18" charset="0"/>
+                      </a:endParaRPr>
+                    </a:p>
+                  </a:txBody>
+                  <a:tcPr marL="68580" marR="68580" marT="0" marB="0" anchor="b"/>
+                </a:tc>
+                <a:tc>
+                  <a:txBody>
+                    <a:bodyPr/>
+                    <a:lstStyle/>
+                    <a:p>
+                      <a:r>
+                        <a:rPr lang="en-GB" sz="1200" dirty="0">
+                          <a:effectLst/>
+                        </a:rPr>
+                        <a:t>Centre (Centre-East). </a:t>
+                      </a:r>
+                      <a:r>
+                        <a:rPr lang="en-GB" sz="1200" b="1" dirty="0" err="1">
+                          <a:effectLst/>
+                        </a:rPr>
+                        <a:t>Ulanga</a:t>
+                      </a:r>
+                      <a:r>
+                        <a:rPr lang="en-GB" sz="1200" dirty="0">
+                          <a:effectLst/>
+                        </a:rPr>
+                        <a:t> district in this region.</a:t>
+                      </a:r>
+                      <a:endParaRPr lang="en-GB" sz="1200" dirty="0">
+                        <a:effectLst/>
+                        <a:latin typeface="Calibri" panose="020F0502020204030204" pitchFamily="34" charset="0"/>
+                        <a:ea typeface="Calibri" panose="020F0502020204030204" pitchFamily="34" charset="0"/>
+                        <a:cs typeface="Times New Roman" panose="02020603050405020304" pitchFamily="18" charset="0"/>
+                      </a:endParaRPr>
+                    </a:p>
+                  </a:txBody>
+                  <a:tcPr marL="68580" marR="68580" marT="0" marB="0"/>
+                </a:tc>
+                <a:extLst>
+                  <a:ext uri="{0D108BD9-81ED-4DB2-BD59-A6C34878D82A}">
+                    <a16:rowId xmlns:a16="http://schemas.microsoft.com/office/drawing/2014/main" val="985764122"/>
+                  </a:ext>
+                </a:extLst>
+              </a:tr>
+              <a:tr h="203200">
+                <a:tc>
+                  <a:txBody>
+                    <a:bodyPr/>
+                    <a:lstStyle/>
+                    <a:p>
+                      <a:r>
+                        <a:rPr lang="en-GB" sz="1200">
+                          <a:effectLst/>
+                        </a:rPr>
+                        <a:t>DODOMA</a:t>
+                      </a:r>
+                      <a:endParaRPr lang="en-GB" sz="1200">
+                        <a:effectLst/>
+                        <a:latin typeface="Calibri" panose="020F0502020204030204" pitchFamily="34" charset="0"/>
+                        <a:ea typeface="Calibri" panose="020F0502020204030204" pitchFamily="34" charset="0"/>
+                        <a:cs typeface="Times New Roman" panose="02020603050405020304" pitchFamily="18" charset="0"/>
+                      </a:endParaRPr>
+                    </a:p>
+                  </a:txBody>
+                  <a:tcPr marL="68580" marR="68580" marT="0" marB="0" anchor="b"/>
+                </a:tc>
+                <a:tc>
+                  <a:txBody>
+                    <a:bodyPr/>
+                    <a:lstStyle/>
+                    <a:p>
+                      <a:r>
+                        <a:rPr lang="en-GB" sz="1200" dirty="0">
+                          <a:effectLst/>
+                        </a:rPr>
+                        <a:t>Centre (Centre-East). </a:t>
+                      </a:r>
+                      <a:r>
+                        <a:rPr lang="en-GB" sz="1200" b="1" dirty="0" err="1">
+                          <a:effectLst/>
+                        </a:rPr>
+                        <a:t>Bahi</a:t>
+                      </a:r>
+                      <a:r>
+                        <a:rPr lang="en-GB" sz="1200" dirty="0">
+                          <a:effectLst/>
+                        </a:rPr>
+                        <a:t> district in this region. </a:t>
+                      </a:r>
+                      <a:endParaRPr lang="en-GB" sz="1200" dirty="0">
+                        <a:effectLst/>
+                        <a:latin typeface="Calibri" panose="020F0502020204030204" pitchFamily="34" charset="0"/>
+                        <a:ea typeface="Calibri" panose="020F0502020204030204" pitchFamily="34" charset="0"/>
+                        <a:cs typeface="Times New Roman" panose="02020603050405020304" pitchFamily="18" charset="0"/>
+                      </a:endParaRPr>
+                    </a:p>
+                  </a:txBody>
+                  <a:tcPr marL="68580" marR="68580" marT="0" marB="0"/>
+                </a:tc>
+                <a:extLst>
+                  <a:ext uri="{0D108BD9-81ED-4DB2-BD59-A6C34878D82A}">
+                    <a16:rowId xmlns:a16="http://schemas.microsoft.com/office/drawing/2014/main" val="2191773331"/>
+                  </a:ext>
+                </a:extLst>
+              </a:tr>
+              <a:tr h="203200">
+                <a:tc>
+                  <a:txBody>
+                    <a:bodyPr/>
+                    <a:lstStyle/>
+                    <a:p>
+                      <a:r>
+                        <a:rPr lang="en-GB" sz="1200">
+                          <a:effectLst/>
+                        </a:rPr>
+                        <a:t>MWANZA</a:t>
+                      </a:r>
+                      <a:endParaRPr lang="en-GB" sz="1200">
+                        <a:effectLst/>
+                        <a:latin typeface="Calibri" panose="020F0502020204030204" pitchFamily="34" charset="0"/>
+                        <a:ea typeface="Calibri" panose="020F0502020204030204" pitchFamily="34" charset="0"/>
+                        <a:cs typeface="Times New Roman" panose="02020603050405020304" pitchFamily="18" charset="0"/>
+                      </a:endParaRPr>
+                    </a:p>
+                  </a:txBody>
+                  <a:tcPr marL="68580" marR="68580" marT="0" marB="0" anchor="b"/>
+                </a:tc>
+                <a:tc>
+                  <a:txBody>
+                    <a:bodyPr/>
+                    <a:lstStyle/>
+                    <a:p>
+                      <a:r>
+                        <a:rPr lang="en-GB" sz="1200" dirty="0">
+                          <a:effectLst/>
+                        </a:rPr>
+                        <a:t>North</a:t>
+                      </a:r>
+                      <a:endParaRPr lang="en-GB" sz="1200" dirty="0">
+                        <a:effectLst/>
+                        <a:latin typeface="Calibri" panose="020F0502020204030204" pitchFamily="34" charset="0"/>
+                        <a:ea typeface="Calibri" panose="020F0502020204030204" pitchFamily="34" charset="0"/>
+                        <a:cs typeface="Times New Roman" panose="02020603050405020304" pitchFamily="18" charset="0"/>
+                      </a:endParaRPr>
+                    </a:p>
+                  </a:txBody>
+                  <a:tcPr marL="68580" marR="68580" marT="0" marB="0"/>
+                </a:tc>
+                <a:extLst>
+                  <a:ext uri="{0D108BD9-81ED-4DB2-BD59-A6C34878D82A}">
+                    <a16:rowId xmlns:a16="http://schemas.microsoft.com/office/drawing/2014/main" val="953875343"/>
+                  </a:ext>
+                </a:extLst>
+              </a:tr>
+              <a:tr h="203200">
+                <a:tc>
+                  <a:txBody>
+                    <a:bodyPr/>
+                    <a:lstStyle/>
+                    <a:p>
+                      <a:r>
+                        <a:rPr lang="en-GB" sz="1200">
+                          <a:effectLst/>
+                        </a:rPr>
+                        <a:t>NJOMBE</a:t>
+                      </a:r>
+                      <a:endParaRPr lang="en-GB" sz="1200">
+                        <a:effectLst/>
+                        <a:latin typeface="Calibri" panose="020F0502020204030204" pitchFamily="34" charset="0"/>
+                        <a:ea typeface="Calibri" panose="020F0502020204030204" pitchFamily="34" charset="0"/>
+                        <a:cs typeface="Times New Roman" panose="02020603050405020304" pitchFamily="18" charset="0"/>
+                      </a:endParaRPr>
+                    </a:p>
+                  </a:txBody>
+                  <a:tcPr marL="68580" marR="68580" marT="0" marB="0" anchor="b"/>
+                </a:tc>
+                <a:tc>
+                  <a:txBody>
+                    <a:bodyPr/>
+                    <a:lstStyle/>
+                    <a:p>
+                      <a:r>
+                        <a:rPr lang="en-GB" sz="1200">
+                          <a:effectLst/>
+                        </a:rPr>
+                        <a:t>South (South-West).</a:t>
+                      </a:r>
+                      <a:endParaRPr lang="en-GB" sz="1200">
+                        <a:effectLst/>
+                        <a:latin typeface="Calibri" panose="020F0502020204030204" pitchFamily="34" charset="0"/>
+                        <a:ea typeface="Calibri" panose="020F0502020204030204" pitchFamily="34" charset="0"/>
+                        <a:cs typeface="Times New Roman" panose="02020603050405020304" pitchFamily="18" charset="0"/>
+                      </a:endParaRPr>
+                    </a:p>
+                  </a:txBody>
+                  <a:tcPr marL="68580" marR="68580" marT="0" marB="0"/>
+                </a:tc>
+                <a:extLst>
+                  <a:ext uri="{0D108BD9-81ED-4DB2-BD59-A6C34878D82A}">
+                    <a16:rowId xmlns:a16="http://schemas.microsoft.com/office/drawing/2014/main" val="3616154467"/>
+                  </a:ext>
+                </a:extLst>
+              </a:tr>
+              <a:tr h="203200">
+                <a:tc>
+                  <a:txBody>
+                    <a:bodyPr/>
+                    <a:lstStyle/>
+                    <a:p>
+                      <a:r>
+                        <a:rPr lang="en-GB" sz="1200">
+                          <a:effectLst/>
+                        </a:rPr>
+                        <a:t>RUKWA</a:t>
+                      </a:r>
+                      <a:endParaRPr lang="en-GB" sz="1200">
+                        <a:effectLst/>
+                        <a:latin typeface="Calibri" panose="020F0502020204030204" pitchFamily="34" charset="0"/>
+                        <a:ea typeface="Calibri" panose="020F0502020204030204" pitchFamily="34" charset="0"/>
+                        <a:cs typeface="Times New Roman" panose="02020603050405020304" pitchFamily="18" charset="0"/>
+                      </a:endParaRPr>
+                    </a:p>
+                  </a:txBody>
+                  <a:tcPr marL="68580" marR="68580" marT="0" marB="0" anchor="b"/>
+                </a:tc>
+                <a:tc>
+                  <a:txBody>
+                    <a:bodyPr/>
+                    <a:lstStyle/>
+                    <a:p>
+                      <a:r>
+                        <a:rPr lang="en-GB" sz="1200">
+                          <a:effectLst/>
+                        </a:rPr>
+                        <a:t>East (South-East). </a:t>
+                      </a:r>
+                      <a:endParaRPr lang="en-GB" sz="1200">
+                        <a:effectLst/>
+                        <a:latin typeface="Calibri" panose="020F0502020204030204" pitchFamily="34" charset="0"/>
+                        <a:ea typeface="Calibri" panose="020F0502020204030204" pitchFamily="34" charset="0"/>
+                        <a:cs typeface="Times New Roman" panose="02020603050405020304" pitchFamily="18" charset="0"/>
+                      </a:endParaRPr>
+                    </a:p>
+                  </a:txBody>
+                  <a:tcPr marL="68580" marR="68580" marT="0" marB="0"/>
+                </a:tc>
+                <a:extLst>
+                  <a:ext uri="{0D108BD9-81ED-4DB2-BD59-A6C34878D82A}">
+                    <a16:rowId xmlns:a16="http://schemas.microsoft.com/office/drawing/2014/main" val="2259689794"/>
+                  </a:ext>
+                </a:extLst>
+              </a:tr>
+              <a:tr h="203200">
+                <a:tc>
+                  <a:txBody>
+                    <a:bodyPr/>
+                    <a:lstStyle/>
+                    <a:p>
+                      <a:r>
+                        <a:rPr lang="en-GB" sz="1200">
+                          <a:effectLst/>
+                        </a:rPr>
+                        <a:t>SONGWE</a:t>
+                      </a:r>
+                      <a:endParaRPr lang="en-GB" sz="1200">
+                        <a:effectLst/>
+                        <a:latin typeface="Calibri" panose="020F0502020204030204" pitchFamily="34" charset="0"/>
+                        <a:ea typeface="Calibri" panose="020F0502020204030204" pitchFamily="34" charset="0"/>
+                        <a:cs typeface="Times New Roman" panose="02020603050405020304" pitchFamily="18" charset="0"/>
+                      </a:endParaRPr>
+                    </a:p>
+                  </a:txBody>
+                  <a:tcPr marL="68580" marR="68580" marT="0" marB="0" anchor="b"/>
+                </a:tc>
+                <a:tc>
+                  <a:txBody>
+                    <a:bodyPr/>
+                    <a:lstStyle/>
+                    <a:p>
+                      <a:r>
+                        <a:rPr lang="en-GB" sz="1200">
+                          <a:effectLst/>
+                        </a:rPr>
+                        <a:t>East (South-East).</a:t>
+                      </a:r>
+                      <a:endParaRPr lang="en-GB" sz="1200">
+                        <a:effectLst/>
+                        <a:latin typeface="Calibri" panose="020F0502020204030204" pitchFamily="34" charset="0"/>
+                        <a:ea typeface="Calibri" panose="020F0502020204030204" pitchFamily="34" charset="0"/>
+                        <a:cs typeface="Times New Roman" panose="02020603050405020304" pitchFamily="18" charset="0"/>
+                      </a:endParaRPr>
+                    </a:p>
+                  </a:txBody>
+                  <a:tcPr marL="68580" marR="68580" marT="0" marB="0"/>
+                </a:tc>
+                <a:extLst>
+                  <a:ext uri="{0D108BD9-81ED-4DB2-BD59-A6C34878D82A}">
+                    <a16:rowId xmlns:a16="http://schemas.microsoft.com/office/drawing/2014/main" val="1626437610"/>
+                  </a:ext>
+                </a:extLst>
+              </a:tr>
+              <a:tr h="203200">
+                <a:tc>
+                  <a:txBody>
+                    <a:bodyPr/>
+                    <a:lstStyle/>
+                    <a:p>
+                      <a:r>
+                        <a:rPr lang="en-GB" sz="1200">
+                          <a:effectLst/>
+                        </a:rPr>
+                        <a:t>IRINGA</a:t>
+                      </a:r>
+                      <a:endParaRPr lang="en-GB" sz="1200">
+                        <a:effectLst/>
+                        <a:latin typeface="Calibri" panose="020F0502020204030204" pitchFamily="34" charset="0"/>
+                        <a:ea typeface="Calibri" panose="020F0502020204030204" pitchFamily="34" charset="0"/>
+                        <a:cs typeface="Times New Roman" panose="02020603050405020304" pitchFamily="18" charset="0"/>
+                      </a:endParaRPr>
+                    </a:p>
+                  </a:txBody>
+                  <a:tcPr marL="68580" marR="68580" marT="0" marB="0" anchor="b"/>
+                </a:tc>
+                <a:tc>
+                  <a:txBody>
+                    <a:bodyPr/>
+                    <a:lstStyle/>
+                    <a:p>
+                      <a:r>
+                        <a:rPr lang="en-GB" sz="1200" dirty="0">
+                          <a:effectLst/>
+                        </a:rPr>
+                        <a:t>Centre</a:t>
+                      </a:r>
+                      <a:endParaRPr lang="en-GB" sz="1200" dirty="0">
+                        <a:effectLst/>
+                        <a:latin typeface="Calibri" panose="020F0502020204030204" pitchFamily="34" charset="0"/>
+                        <a:ea typeface="Calibri" panose="020F0502020204030204" pitchFamily="34" charset="0"/>
+                        <a:cs typeface="Times New Roman" panose="02020603050405020304" pitchFamily="18" charset="0"/>
+                      </a:endParaRPr>
+                    </a:p>
+                  </a:txBody>
+                  <a:tcPr marL="68580" marR="68580" marT="0" marB="0"/>
+                </a:tc>
+                <a:extLst>
+                  <a:ext uri="{0D108BD9-81ED-4DB2-BD59-A6C34878D82A}">
+                    <a16:rowId xmlns:a16="http://schemas.microsoft.com/office/drawing/2014/main" val="694460127"/>
+                  </a:ext>
+                </a:extLst>
+              </a:tr>
+            </a:tbl>
+          </a:graphicData>
+        </a:graphic>
+      </p:graphicFrame>
+      <p:sp>
+        <p:nvSpPr>
+          <p:cNvPr id="10" name="TextBox 9">
+            <a:extLst>
+              <a:ext uri="{FF2B5EF4-FFF2-40B4-BE49-F238E27FC236}">
+                <a16:creationId xmlns:a16="http://schemas.microsoft.com/office/drawing/2014/main" id="{3FE5550D-FF2F-E23E-B0B8-1DB1C4CBC63B}"/>
+              </a:ext>
+            </a:extLst>
+          </p:cNvPr>
+          <p:cNvSpPr txBox="1"/>
+          <p:nvPr/>
+        </p:nvSpPr>
+        <p:spPr>
+          <a:xfrm>
+            <a:off x="10023323" y="6307494"/>
+            <a:ext cx="1996751" cy="369332"/>
+          </a:xfrm>
+          <a:prstGeom prst="rect">
+            <a:avLst/>
+          </a:prstGeom>
+          <a:noFill/>
+        </p:spPr>
+        <p:txBody>
+          <a:bodyPr wrap="square" rtlCol="0">
+            <a:spAutoFit/>
+          </a:bodyPr>
+          <a:lstStyle/>
+          <a:p>
+            <a:r>
+              <a:rPr lang="en-US" dirty="0"/>
+              <a:t>Updated: 02/03/23</a:t>
+            </a:r>
+          </a:p>
+        </p:txBody>
+      </p:sp>
+      <p:pic>
+        <p:nvPicPr>
+          <p:cNvPr id="11" name="Picture 10">
+            <a:extLst>
+              <a:ext uri="{FF2B5EF4-FFF2-40B4-BE49-F238E27FC236}">
+                <a16:creationId xmlns:a16="http://schemas.microsoft.com/office/drawing/2014/main" id="{E80F9512-D09D-A71C-2CBB-204F2A4209AC}"/>
+              </a:ext>
+            </a:extLst>
+          </p:cNvPr>
+          <p:cNvPicPr>
+            <a:picLocks noChangeAspect="1"/>
+          </p:cNvPicPr>
+          <p:nvPr/>
+        </p:nvPicPr>
+        <p:blipFill>
+          <a:blip r:embed="rId3"/>
+          <a:stretch>
+            <a:fillRect/>
+          </a:stretch>
+        </p:blipFill>
+        <p:spPr>
+          <a:xfrm>
+            <a:off x="273354" y="1030041"/>
+            <a:ext cx="7772400" cy="4797918"/>
+          </a:xfrm>
+          <a:prstGeom prst="rect">
+            <a:avLst/>
+          </a:prstGeom>
+        </p:spPr>
+      </p:pic>
+      <p:sp>
+        <p:nvSpPr>
+          <p:cNvPr id="12" name="TextBox 11">
+            <a:extLst>
+              <a:ext uri="{FF2B5EF4-FFF2-40B4-BE49-F238E27FC236}">
+                <a16:creationId xmlns:a16="http://schemas.microsoft.com/office/drawing/2014/main" id="{58CD0C4D-21E1-0D8E-3D89-DB337FA4644C}"/>
+              </a:ext>
+            </a:extLst>
+          </p:cNvPr>
+          <p:cNvSpPr txBox="1"/>
+          <p:nvPr/>
+        </p:nvSpPr>
+        <p:spPr>
+          <a:xfrm>
+            <a:off x="273354" y="383710"/>
+            <a:ext cx="5822646" cy="369332"/>
+          </a:xfrm>
+          <a:prstGeom prst="rect">
+            <a:avLst/>
+          </a:prstGeom>
+          <a:noFill/>
+        </p:spPr>
+        <p:txBody>
+          <a:bodyPr wrap="square" rtlCol="0">
+            <a:spAutoFit/>
+          </a:bodyPr>
+          <a:lstStyle/>
+          <a:p>
+            <a:r>
+              <a:rPr lang="en-US" b="1" dirty="0"/>
+              <a:t>Districts targeted with markets surveyed indicated</a:t>
+            </a:r>
+          </a:p>
+        </p:txBody>
+      </p:sp>
+    </p:spTree>
+    <p:extLst>
+      <p:ext uri="{BB962C8B-B14F-4D97-AF65-F5344CB8AC3E}">
+        <p14:creationId xmlns:p14="http://schemas.microsoft.com/office/powerpoint/2010/main" val="3851111758"/>
+      </p:ext>
+    </p:extLst>
+  </p:cSld>
+  <p:clrMapOvr>
+    <a:masterClrMapping/>
+  </p:clrMapOvr>
+</p:sld>
+</file>
+
+<file path=ppt/slides/slide7.xml><?xml version="1.0" encoding="utf-8"?>
 <p:sld xmlns:a="http://schemas.openxmlformats.org/drawingml/2006/main" xmlns:r="http://schemas.openxmlformats.org/officeDocument/2006/relationships" xmlns:p="http://schemas.openxmlformats.org/presentationml/2006/main">
   <p:cSld>
     <p:spTree>
@@ -19427,7 +20753,7 @@
 </p:sld>
 </file>
 
-<file path=ppt/slides/slide7.xml><?xml version="1.0" encoding="utf-8"?>
+<file path=ppt/slides/slide8.xml><?xml version="1.0" encoding="utf-8"?>
 <p:sld xmlns:a="http://schemas.openxmlformats.org/drawingml/2006/main" xmlns:r="http://schemas.openxmlformats.org/officeDocument/2006/relationships" xmlns:p="http://schemas.openxmlformats.org/presentationml/2006/main">
   <p:cSld>
     <p:spTree>
@@ -19621,7 +20947,7 @@
 </p:sld>
 </file>
 
-<file path=ppt/slides/slide8.xml><?xml version="1.0" encoding="utf-8"?>
+<file path=ppt/slides/slide9.xml><?xml version="1.0" encoding="utf-8"?>
 <p:sld xmlns:a="http://schemas.openxmlformats.org/drawingml/2006/main" xmlns:r="http://schemas.openxmlformats.org/officeDocument/2006/relationships" xmlns:p="http://schemas.openxmlformats.org/presentationml/2006/main">
   <p:cSld>
     <p:spTree>
@@ -19695,220 +21021,6 @@
     <p:extLst>
       <p:ext uri="{BB962C8B-B14F-4D97-AF65-F5344CB8AC3E}">
         <p14:creationId xmlns:p14="http://schemas.microsoft.com/office/powerpoint/2010/main" val="1057101785"/>
-      </p:ext>
-    </p:extLst>
-  </p:cSld>
-  <p:clrMapOvr>
-    <a:masterClrMapping/>
-  </p:clrMapOvr>
-</p:sld>
-</file>
-
-<file path=ppt/slides/slide9.xml><?xml version="1.0" encoding="utf-8"?>
-<p:sld xmlns:a="http://schemas.openxmlformats.org/drawingml/2006/main" xmlns:r="http://schemas.openxmlformats.org/officeDocument/2006/relationships" xmlns:p="http://schemas.openxmlformats.org/presentationml/2006/main">
-  <p:cSld>
-    <p:spTree>
-      <p:nvGrpSpPr>
-        <p:cNvPr id="1" name=""/>
-        <p:cNvGrpSpPr/>
-        <p:nvPr/>
-      </p:nvGrpSpPr>
-      <p:grpSpPr>
-        <a:xfrm>
-          <a:off x="0" y="0"/>
-          <a:ext cx="0" cy="0"/>
-          <a:chOff x="0" y="0"/>
-          <a:chExt cx="0" cy="0"/>
-        </a:xfrm>
-      </p:grpSpPr>
-      <p:sp>
-        <p:nvSpPr>
-          <p:cNvPr id="2" name="Title 1">
-            <a:extLst>
-              <a:ext uri="{FF2B5EF4-FFF2-40B4-BE49-F238E27FC236}">
-                <a16:creationId xmlns:a16="http://schemas.microsoft.com/office/drawing/2014/main" id="{A7404919-255D-D502-BC6D-24A58C076AE5}"/>
-              </a:ext>
-            </a:extLst>
-          </p:cNvPr>
-          <p:cNvSpPr>
-            <a:spLocks noGrp="1"/>
-          </p:cNvSpPr>
-          <p:nvPr>
-            <p:ph type="title"/>
-          </p:nvPr>
-        </p:nvSpPr>
-        <p:spPr/>
-        <p:txBody>
-          <a:bodyPr/>
-          <a:lstStyle/>
-          <a:p>
-            <a:endParaRPr lang="en-US"/>
-          </a:p>
-        </p:txBody>
-      </p:sp>
-      <p:sp>
-        <p:nvSpPr>
-          <p:cNvPr id="3" name="Content Placeholder 2">
-            <a:extLst>
-              <a:ext uri="{FF2B5EF4-FFF2-40B4-BE49-F238E27FC236}">
-                <a16:creationId xmlns:a16="http://schemas.microsoft.com/office/drawing/2014/main" id="{4690B8C9-5459-EABC-AFFF-3122F9420A69}"/>
-              </a:ext>
-            </a:extLst>
-          </p:cNvPr>
-          <p:cNvSpPr>
-            <a:spLocks noGrp="1"/>
-          </p:cNvSpPr>
-          <p:nvPr>
-            <p:ph idx="1"/>
-          </p:nvPr>
-        </p:nvSpPr>
-        <p:spPr/>
-        <p:txBody>
-          <a:bodyPr>
-            <a:normAutofit/>
-          </a:bodyPr>
-          <a:lstStyle/>
-          <a:p>
-            <a:r>
-              <a:rPr lang="en-US" dirty="0"/>
-              <a:t>Overview: Market Survey C: </a:t>
-            </a:r>
-            <a:r>
-              <a:rPr lang="en-US" dirty="0" err="1"/>
-              <a:t>buyer&amp;seller</a:t>
-            </a:r>
-            <a:r>
-              <a:rPr lang="en-US" dirty="0"/>
-              <a:t> questionnaire</a:t>
-            </a:r>
-          </a:p>
-          <a:p>
-            <a:pPr marL="342900" lvl="0" indent="-342900">
-              <a:buFont typeface="Symbol" pitchFamily="2" charset="2"/>
-              <a:buChar char=""/>
-            </a:pPr>
-            <a:r>
-              <a:rPr lang="en-US" sz="1800" dirty="0">
-                <a:effectLst/>
-                <a:latin typeface="Calibri" panose="020F0502020204030204" pitchFamily="34" charset="0"/>
-                <a:ea typeface="Calibri" panose="020F0502020204030204" pitchFamily="34" charset="0"/>
-                <a:cs typeface="Calibri" panose="020F0502020204030204" pitchFamily="34" charset="0"/>
-              </a:rPr>
-              <a:t>The tool aims to collect individual data on trading practices and market networks</a:t>
-            </a:r>
-            <a:endParaRPr lang="en-GB" sz="1800" dirty="0">
-              <a:effectLst/>
-              <a:latin typeface="Calibri" panose="020F0502020204030204" pitchFamily="34" charset="0"/>
-              <a:ea typeface="Calibri" panose="020F0502020204030204" pitchFamily="34" charset="0"/>
-              <a:cs typeface="Arial" panose="020B0604020202020204" pitchFamily="34" charset="0"/>
-            </a:endParaRPr>
-          </a:p>
-          <a:p>
-            <a:pPr marL="342900" lvl="0" indent="-342900">
-              <a:buFont typeface="Symbol" pitchFamily="2" charset="2"/>
-              <a:buChar char=""/>
-            </a:pPr>
-            <a:r>
-              <a:rPr lang="en-US" sz="1800" dirty="0">
-                <a:effectLst/>
-                <a:latin typeface="Calibri" panose="020F0502020204030204" pitchFamily="34" charset="0"/>
-                <a:ea typeface="Calibri" panose="020F0502020204030204" pitchFamily="34" charset="0"/>
-                <a:cs typeface="Calibri" panose="020F0502020204030204" pitchFamily="34" charset="0"/>
-              </a:rPr>
-              <a:t>Participants: In each market </a:t>
-            </a:r>
-            <a:r>
-              <a:rPr lang="en-US" sz="1800" dirty="0">
-                <a:effectLst/>
-                <a:highlight>
-                  <a:srgbClr val="FFFF00"/>
-                </a:highlight>
-                <a:latin typeface="Calibri" panose="020F0502020204030204" pitchFamily="34" charset="0"/>
-                <a:ea typeface="Calibri" panose="020F0502020204030204" pitchFamily="34" charset="0"/>
-                <a:cs typeface="Calibri" panose="020F0502020204030204" pitchFamily="34" charset="0"/>
-              </a:rPr>
-              <a:t>a minimum of 20 people need to be interview, or 10% of people buying and/or selling</a:t>
-            </a:r>
-            <a:r>
-              <a:rPr lang="en-US" sz="1800" dirty="0">
-                <a:effectLst/>
-                <a:latin typeface="Calibri" panose="020F0502020204030204" pitchFamily="34" charset="0"/>
-                <a:ea typeface="Calibri" panose="020F0502020204030204" pitchFamily="34" charset="0"/>
-                <a:cs typeface="Calibri" panose="020F0502020204030204" pitchFamily="34" charset="0"/>
-              </a:rPr>
-              <a:t>, depending on the size of the market</a:t>
-            </a:r>
-            <a:endParaRPr lang="en-GB" sz="1800" dirty="0">
-              <a:effectLst/>
-              <a:latin typeface="Calibri" panose="020F0502020204030204" pitchFamily="34" charset="0"/>
-              <a:ea typeface="Calibri" panose="020F0502020204030204" pitchFamily="34" charset="0"/>
-              <a:cs typeface="Arial" panose="020B0604020202020204" pitchFamily="34" charset="0"/>
-            </a:endParaRPr>
-          </a:p>
-          <a:p>
-            <a:pPr marL="342900" lvl="0" indent="-342900">
-              <a:buFont typeface="Symbol" pitchFamily="2" charset="2"/>
-              <a:buChar char=""/>
-            </a:pPr>
-            <a:r>
-              <a:rPr lang="en-US" sz="1800" dirty="0">
-                <a:effectLst/>
-                <a:latin typeface="Calibri" panose="020F0502020204030204" pitchFamily="34" charset="0"/>
-                <a:ea typeface="Calibri" panose="020F0502020204030204" pitchFamily="34" charset="0"/>
-                <a:cs typeface="Calibri" panose="020F0502020204030204" pitchFamily="34" charset="0"/>
-              </a:rPr>
-              <a:t>Interviews takes 5-10 minutes and need to be carried out in the marketplace</a:t>
-            </a:r>
-            <a:endParaRPr lang="en-GB" sz="1800" dirty="0">
-              <a:effectLst/>
-              <a:latin typeface="Calibri" panose="020F0502020204030204" pitchFamily="34" charset="0"/>
-              <a:ea typeface="Calibri" panose="020F0502020204030204" pitchFamily="34" charset="0"/>
-              <a:cs typeface="Arial" panose="020B0604020202020204" pitchFamily="34" charset="0"/>
-            </a:endParaRPr>
-          </a:p>
-          <a:p>
-            <a:pPr marL="342900" lvl="0" indent="-342900">
-              <a:buFont typeface="Symbol" pitchFamily="2" charset="2"/>
-              <a:buChar char=""/>
-            </a:pPr>
-            <a:r>
-              <a:rPr lang="en-US" sz="1800" dirty="0">
-                <a:effectLst/>
-                <a:latin typeface="Calibri" panose="020F0502020204030204" pitchFamily="34" charset="0"/>
-                <a:ea typeface="Calibri" panose="020F0502020204030204" pitchFamily="34" charset="0"/>
-                <a:cs typeface="Calibri" panose="020F0502020204030204" pitchFamily="34" charset="0"/>
-              </a:rPr>
-              <a:t>Data collection in the market: The transect walk method:</a:t>
-            </a:r>
-          </a:p>
-          <a:p>
-            <a:pPr marL="800100" lvl="1" indent="-342900">
-              <a:buFont typeface="Symbol" pitchFamily="2" charset="2"/>
-              <a:buChar char=""/>
-            </a:pPr>
-            <a:r>
-              <a:rPr lang="en-GB" sz="800" i="1" dirty="0">
-                <a:effectLst/>
-              </a:rPr>
-              <a:t>The people to be interviewed should be selected randomly or systematically to obtain a representative sample of all types of buyer and sellers and to avoid bias. The research team for each country should discuss how their markets are laid out and make a plan of how to obtain an unbiased sample. If the markets are laid out in a rectangular enclosure, then the field team should walk a transect from one corner of the market, diagonally across the market area to the opposite corner, interviewing every person buying and selling that they meet along the transect. Having completed one transect, if more interviews are required, a second transect can be made starting in a different corner. However, if the market is circular with all the people buying and selling arranged around the edge with very few in the middle, then the team can start at one point and move around the edge of the circle, interviewing everyone that they meet. Having completed the transects or circle, it may become clear that some key types of buyers or sellers have been missed e.g. sometimes the commercial traders are very busy and moving quickly in the market place so the team has not managed to meet many during the transect. In this case, they can be purposively tracked down for interview in addition to the 20 people/10% people interviewed in the main market area. </a:t>
-            </a:r>
-            <a:endParaRPr lang="en-US" dirty="0"/>
-          </a:p>
-          <a:p>
-            <a:r>
-              <a:rPr lang="en-US" dirty="0"/>
-              <a:t>Total observations: 3310</a:t>
-            </a:r>
-          </a:p>
-          <a:p>
-            <a:endParaRPr lang="en-US" dirty="0"/>
-          </a:p>
-        </p:txBody>
-      </p:sp>
-    </p:spTree>
-    <p:extLst>
-      <p:ext uri="{BB962C8B-B14F-4D97-AF65-F5344CB8AC3E}">
-        <p14:creationId xmlns:p14="http://schemas.microsoft.com/office/powerpoint/2010/main" val="2322920798"/>
       </p:ext>
     </p:extLst>
   </p:cSld>

</xml_diff>

<commit_message>
adding .Rmd files for analysis of mrkta and mrktc surveys
</commit_message>
<xml_diff>
--- a/results-presentations/markets-descriptive-analysis.pptx
+++ b/results-presentations/markets-descriptive-analysis.pptx
@@ -5,7 +5,7 @@
     <p:sldMasterId id="2147483648" r:id="rId1"/>
   </p:sldMasterIdLst>
   <p:notesMasterIdLst>
-    <p:notesMasterId r:id="rId21"/>
+    <p:notesMasterId r:id="rId24"/>
   </p:notesMasterIdLst>
   <p:sldIdLst>
     <p:sldId id="256" r:id="rId2"/>
@@ -16,17 +16,20 @@
     <p:sldId id="275" r:id="rId7"/>
     <p:sldId id="274" r:id="rId8"/>
     <p:sldId id="258" r:id="rId9"/>
-    <p:sldId id="271" r:id="rId10"/>
-    <p:sldId id="260" r:id="rId11"/>
-    <p:sldId id="266" r:id="rId12"/>
-    <p:sldId id="268" r:id="rId13"/>
-    <p:sldId id="269" r:id="rId14"/>
-    <p:sldId id="265" r:id="rId15"/>
-    <p:sldId id="270" r:id="rId16"/>
-    <p:sldId id="264" r:id="rId17"/>
-    <p:sldId id="261" r:id="rId18"/>
-    <p:sldId id="262" r:id="rId19"/>
-    <p:sldId id="263" r:id="rId20"/>
+    <p:sldId id="277" r:id="rId10"/>
+    <p:sldId id="278" r:id="rId11"/>
+    <p:sldId id="271" r:id="rId12"/>
+    <p:sldId id="260" r:id="rId13"/>
+    <p:sldId id="266" r:id="rId14"/>
+    <p:sldId id="268" r:id="rId15"/>
+    <p:sldId id="269" r:id="rId16"/>
+    <p:sldId id="279" r:id="rId17"/>
+    <p:sldId id="265" r:id="rId18"/>
+    <p:sldId id="270" r:id="rId19"/>
+    <p:sldId id="264" r:id="rId20"/>
+    <p:sldId id="261" r:id="rId21"/>
+    <p:sldId id="262" r:id="rId22"/>
+    <p:sldId id="263" r:id="rId23"/>
   </p:sldIdLst>
   <p:sldSz cx="12192000" cy="6858000"/>
   <p:notesSz cx="6858000" cy="9144000"/>
@@ -136,7 +139,7 @@
 <file path=ppt/revisionInfo.xml><?xml version="1.0" encoding="utf-8"?>
 <p1510:revInfo xmlns:a="http://schemas.openxmlformats.org/drawingml/2006/main" xmlns:r="http://schemas.openxmlformats.org/officeDocument/2006/relationships" xmlns:p1510="http://schemas.microsoft.com/office/powerpoint/2015/10/main">
   <p1510:revLst>
-    <p1510:client id="{9FA17360-167E-9443-9251-DAE6C10F48BB}" v="62" dt="2023-03-02T22:09:45.632"/>
+    <p1510:client id="{9FA17360-167E-9443-9251-DAE6C10F48BB}" v="91" dt="2023-03-15T13:20:51.606"/>
   </p1510:revLst>
 </p1510:revInfo>
 </file>
@@ -146,10 +149,17 @@
   <pc:docChgLst>
     <pc:chgData name="Savagar, Bethan Alice" userId="dc0b6509-dca5-46f6-b355-e03f7348faa9" providerId="ADAL" clId="{9FA17360-167E-9443-9251-DAE6C10F48BB}"/>
     <pc:docChg chg="undo custSel addSld delSld modSld sldOrd">
-      <pc:chgData name="Savagar, Bethan Alice" userId="dc0b6509-dca5-46f6-b355-e03f7348faa9" providerId="ADAL" clId="{9FA17360-167E-9443-9251-DAE6C10F48BB}" dt="2023-03-02T22:11:26.227" v="2200" actId="113"/>
+      <pc:chgData name="Savagar, Bethan Alice" userId="dc0b6509-dca5-46f6-b355-e03f7348faa9" providerId="ADAL" clId="{9FA17360-167E-9443-9251-DAE6C10F48BB}" dt="2023-03-15T13:21:05.148" v="2799" actId="1076"/>
       <pc:docMkLst>
         <pc:docMk/>
       </pc:docMkLst>
+      <pc:sldChg chg="modNotesTx">
+        <pc:chgData name="Savagar, Bethan Alice" userId="dc0b6509-dca5-46f6-b355-e03f7348faa9" providerId="ADAL" clId="{9FA17360-167E-9443-9251-DAE6C10F48BB}" dt="2023-03-15T11:39:09.900" v="2241" actId="20577"/>
+        <pc:sldMkLst>
+          <pc:docMk/>
+          <pc:sldMk cId="1782833154" sldId="256"/>
+        </pc:sldMkLst>
+      </pc:sldChg>
       <pc:sldChg chg="addSp modSp mod modNotesTx">
         <pc:chgData name="Savagar, Bethan Alice" userId="dc0b6509-dca5-46f6-b355-e03f7348faa9" providerId="ADAL" clId="{9FA17360-167E-9443-9251-DAE6C10F48BB}" dt="2023-03-02T16:49:21.669" v="2041" actId="14100"/>
         <pc:sldMkLst>
@@ -222,13 +232,13 @@
         </pc:picChg>
       </pc:sldChg>
       <pc:sldChg chg="addSp delSp modSp mod modNotesTx">
-        <pc:chgData name="Savagar, Bethan Alice" userId="dc0b6509-dca5-46f6-b355-e03f7348faa9" providerId="ADAL" clId="{9FA17360-167E-9443-9251-DAE6C10F48BB}" dt="2023-03-02T15:51:43.998" v="1739" actId="1076"/>
+        <pc:chgData name="Savagar, Bethan Alice" userId="dc0b6509-dca5-46f6-b355-e03f7348faa9" providerId="ADAL" clId="{9FA17360-167E-9443-9251-DAE6C10F48BB}" dt="2023-03-15T11:58:26.128" v="2294" actId="21"/>
         <pc:sldMkLst>
           <pc:docMk/>
           <pc:sldMk cId="1511765249" sldId="258"/>
         </pc:sldMkLst>
         <pc:spChg chg="mod">
-          <ac:chgData name="Savagar, Bethan Alice" userId="dc0b6509-dca5-46f6-b355-e03f7348faa9" providerId="ADAL" clId="{9FA17360-167E-9443-9251-DAE6C10F48BB}" dt="2023-03-02T15:50:38.256" v="1729" actId="113"/>
+          <ac:chgData name="Savagar, Bethan Alice" userId="dc0b6509-dca5-46f6-b355-e03f7348faa9" providerId="ADAL" clId="{9FA17360-167E-9443-9251-DAE6C10F48BB}" dt="2023-03-15T11:47:34.318" v="2288" actId="1076"/>
           <ac:spMkLst>
             <pc:docMk/>
             <pc:sldMk cId="1511765249" sldId="258"/>
@@ -243,6 +253,30 @@
             <ac:spMk id="5" creationId="{3BB2320B-749D-5ADA-F07B-6AC3CE568262}"/>
           </ac:spMkLst>
         </pc:spChg>
+        <pc:spChg chg="add del mod">
+          <ac:chgData name="Savagar, Bethan Alice" userId="dc0b6509-dca5-46f6-b355-e03f7348faa9" providerId="ADAL" clId="{9FA17360-167E-9443-9251-DAE6C10F48BB}" dt="2023-03-15T11:58:26.128" v="2294" actId="21"/>
+          <ac:spMkLst>
+            <pc:docMk/>
+            <pc:sldMk cId="1511765249" sldId="258"/>
+            <ac:spMk id="9" creationId="{F3232DF3-F946-5502-6A95-BAC7F3E439E7}"/>
+          </ac:spMkLst>
+        </pc:spChg>
+        <pc:grpChg chg="add mod">
+          <ac:chgData name="Savagar, Bethan Alice" userId="dc0b6509-dca5-46f6-b355-e03f7348faa9" providerId="ADAL" clId="{9FA17360-167E-9443-9251-DAE6C10F48BB}" dt="2023-03-15T11:46:58.966" v="2254" actId="1076"/>
+          <ac:grpSpMkLst>
+            <pc:docMk/>
+            <pc:sldMk cId="1511765249" sldId="258"/>
+            <ac:grpSpMk id="7" creationId="{3EC226F9-5915-202A-D292-B93E3AE594A1}"/>
+          </ac:grpSpMkLst>
+        </pc:grpChg>
+        <pc:picChg chg="add del mod">
+          <ac:chgData name="Savagar, Bethan Alice" userId="dc0b6509-dca5-46f6-b355-e03f7348faa9" providerId="ADAL" clId="{9FA17360-167E-9443-9251-DAE6C10F48BB}" dt="2023-03-15T11:58:26.128" v="2294" actId="21"/>
+          <ac:picMkLst>
+            <pc:docMk/>
+            <pc:sldMk cId="1511765249" sldId="258"/>
+            <ac:picMk id="2" creationId="{4D5661ED-80C5-08A3-8500-3C3E7C1E2B0D}"/>
+          </ac:picMkLst>
+        </pc:picChg>
         <pc:picChg chg="del">
           <ac:chgData name="Savagar, Bethan Alice" userId="dc0b6509-dca5-46f6-b355-e03f7348faa9" providerId="ADAL" clId="{9FA17360-167E-9443-9251-DAE6C10F48BB}" dt="2023-03-02T15:34:53.516" v="874" actId="478"/>
           <ac:picMkLst>
@@ -252,7 +286,7 @@
           </ac:picMkLst>
         </pc:picChg>
         <pc:picChg chg="add mod">
-          <ac:chgData name="Savagar, Bethan Alice" userId="dc0b6509-dca5-46f6-b355-e03f7348faa9" providerId="ADAL" clId="{9FA17360-167E-9443-9251-DAE6C10F48BB}" dt="2023-03-02T15:50:11.239" v="1723" actId="1076"/>
+          <ac:chgData name="Savagar, Bethan Alice" userId="dc0b6509-dca5-46f6-b355-e03f7348faa9" providerId="ADAL" clId="{9FA17360-167E-9443-9251-DAE6C10F48BB}" dt="2023-03-15T11:47:08.639" v="2256" actId="1076"/>
           <ac:picMkLst>
             <pc:docMk/>
             <pc:sldMk cId="1511765249" sldId="258"/>
@@ -260,7 +294,7 @@
           </ac:picMkLst>
         </pc:picChg>
         <pc:picChg chg="add mod">
-          <ac:chgData name="Savagar, Bethan Alice" userId="dc0b6509-dca5-46f6-b355-e03f7348faa9" providerId="ADAL" clId="{9FA17360-167E-9443-9251-DAE6C10F48BB}" dt="2023-03-02T15:50:53.074" v="1732" actId="1076"/>
+          <ac:chgData name="Savagar, Bethan Alice" userId="dc0b6509-dca5-46f6-b355-e03f7348faa9" providerId="ADAL" clId="{9FA17360-167E-9443-9251-DAE6C10F48BB}" dt="2023-03-15T11:47:40.137" v="2289" actId="1076"/>
           <ac:picMkLst>
             <pc:docMk/>
             <pc:sldMk cId="1511765249" sldId="258"/>
@@ -276,7 +310,7 @@
           </ac:picMkLst>
         </pc:picChg>
         <pc:picChg chg="add mod">
-          <ac:chgData name="Savagar, Bethan Alice" userId="dc0b6509-dca5-46f6-b355-e03f7348faa9" providerId="ADAL" clId="{9FA17360-167E-9443-9251-DAE6C10F48BB}" dt="2023-03-02T15:51:43.998" v="1739" actId="1076"/>
+          <ac:chgData name="Savagar, Bethan Alice" userId="dc0b6509-dca5-46f6-b355-e03f7348faa9" providerId="ADAL" clId="{9FA17360-167E-9443-9251-DAE6C10F48BB}" dt="2023-03-15T11:47:47.052" v="2291" actId="1076"/>
           <ac:picMkLst>
             <pc:docMk/>
             <pc:sldMk cId="1511765249" sldId="258"/>
@@ -284,8 +318,8 @@
           </ac:picMkLst>
         </pc:picChg>
       </pc:sldChg>
-      <pc:sldChg chg="addSp modSp new mod ord modClrScheme chgLayout">
-        <pc:chgData name="Savagar, Bethan Alice" userId="dc0b6509-dca5-46f6-b355-e03f7348faa9" providerId="ADAL" clId="{9FA17360-167E-9443-9251-DAE6C10F48BB}" dt="2023-03-02T15:34:24.294" v="842" actId="20578"/>
+      <pc:sldChg chg="addSp modSp new mod ord modClrScheme chgLayout modNotesTx">
+        <pc:chgData name="Savagar, Bethan Alice" userId="dc0b6509-dca5-46f6-b355-e03f7348faa9" providerId="ADAL" clId="{9FA17360-167E-9443-9251-DAE6C10F48BB}" dt="2023-03-15T11:39:18.733" v="2243"/>
         <pc:sldMkLst>
           <pc:docMk/>
           <pc:sldMk cId="392625433" sldId="259"/>
@@ -299,7 +333,7 @@
           </ac:spMkLst>
         </pc:spChg>
         <pc:spChg chg="add mod">
-          <ac:chgData name="Savagar, Bethan Alice" userId="dc0b6509-dca5-46f6-b355-e03f7348faa9" providerId="ADAL" clId="{9FA17360-167E-9443-9251-DAE6C10F48BB}" dt="2023-02-22T10:51:47.286" v="3" actId="700"/>
+          <ac:chgData name="Savagar, Bethan Alice" userId="dc0b6509-dca5-46f6-b355-e03f7348faa9" providerId="ADAL" clId="{9FA17360-167E-9443-9251-DAE6C10F48BB}" dt="2023-03-15T11:39:18.733" v="2243"/>
           <ac:spMkLst>
             <pc:docMk/>
             <pc:sldMk cId="392625433" sldId="259"/>
@@ -633,7 +667,7 @@
         </pc:sldMkLst>
       </pc:sldChg>
       <pc:sldChg chg="addSp delSp modSp new mod setBg modClrScheme chgLayout">
-        <pc:chgData name="Savagar, Bethan Alice" userId="dc0b6509-dca5-46f6-b355-e03f7348faa9" providerId="ADAL" clId="{9FA17360-167E-9443-9251-DAE6C10F48BB}" dt="2023-02-22T16:24:41.962" v="630" actId="1076"/>
+        <pc:chgData name="Savagar, Bethan Alice" userId="dc0b6509-dca5-46f6-b355-e03f7348faa9" providerId="ADAL" clId="{9FA17360-167E-9443-9251-DAE6C10F48BB}" dt="2023-03-15T12:35:57.212" v="2687" actId="13926"/>
         <pc:sldMkLst>
           <pc:docMk/>
           <pc:sldMk cId="1308564865" sldId="268"/>
@@ -735,7 +769,7 @@
           </ac:graphicFrameMkLst>
         </pc:graphicFrameChg>
         <pc:graphicFrameChg chg="add mod modGraphic">
-          <ac:chgData name="Savagar, Bethan Alice" userId="dc0b6509-dca5-46f6-b355-e03f7348faa9" providerId="ADAL" clId="{9FA17360-167E-9443-9251-DAE6C10F48BB}" dt="2023-02-22T16:24:41.962" v="630" actId="1076"/>
+          <ac:chgData name="Savagar, Bethan Alice" userId="dc0b6509-dca5-46f6-b355-e03f7348faa9" providerId="ADAL" clId="{9FA17360-167E-9443-9251-DAE6C10F48BB}" dt="2023-03-15T12:35:57.212" v="2687" actId="13926"/>
           <ac:graphicFrameMkLst>
             <pc:docMk/>
             <pc:sldMk cId="1308564865" sldId="268"/>
@@ -1229,6 +1263,155 @@
           </ac:picMkLst>
         </pc:picChg>
       </pc:sldChg>
+      <pc:sldChg chg="addSp delSp modSp new mod">
+        <pc:chgData name="Savagar, Bethan Alice" userId="dc0b6509-dca5-46f6-b355-e03f7348faa9" providerId="ADAL" clId="{9FA17360-167E-9443-9251-DAE6C10F48BB}" dt="2023-03-15T11:59:55.648" v="2357" actId="20577"/>
+        <pc:sldMkLst>
+          <pc:docMk/>
+          <pc:sldMk cId="4052500796" sldId="277"/>
+        </pc:sldMkLst>
+        <pc:spChg chg="add mod">
+          <ac:chgData name="Savagar, Bethan Alice" userId="dc0b6509-dca5-46f6-b355-e03f7348faa9" providerId="ADAL" clId="{9FA17360-167E-9443-9251-DAE6C10F48BB}" dt="2023-03-15T11:58:31.910" v="2296" actId="1076"/>
+          <ac:spMkLst>
+            <pc:docMk/>
+            <pc:sldMk cId="4052500796" sldId="277"/>
+            <ac:spMk id="4" creationId="{2A3D1B9A-68F6-510B-162E-1BAB086EBD75}"/>
+          </ac:spMkLst>
+        </pc:spChg>
+        <pc:spChg chg="add mod">
+          <ac:chgData name="Savagar, Bethan Alice" userId="dc0b6509-dca5-46f6-b355-e03f7348faa9" providerId="ADAL" clId="{9FA17360-167E-9443-9251-DAE6C10F48BB}" dt="2023-03-15T11:58:52.889" v="2341" actId="20577"/>
+          <ac:spMkLst>
+            <pc:docMk/>
+            <pc:sldMk cId="4052500796" sldId="277"/>
+            <ac:spMk id="6" creationId="{5BC9AF28-CCE6-210D-C9E7-0E4055E29A40}"/>
+          </ac:spMkLst>
+        </pc:spChg>
+        <pc:spChg chg="add del">
+          <ac:chgData name="Savagar, Bethan Alice" userId="dc0b6509-dca5-46f6-b355-e03f7348faa9" providerId="ADAL" clId="{9FA17360-167E-9443-9251-DAE6C10F48BB}" dt="2023-03-15T11:58:58.104" v="2343" actId="478"/>
+          <ac:spMkLst>
+            <pc:docMk/>
+            <pc:sldMk cId="4052500796" sldId="277"/>
+            <ac:spMk id="8" creationId="{E4C5BBA3-946E-F874-34D3-962E0F970A1E}"/>
+          </ac:spMkLst>
+        </pc:spChg>
+        <pc:spChg chg="add mod">
+          <ac:chgData name="Savagar, Bethan Alice" userId="dc0b6509-dca5-46f6-b355-e03f7348faa9" providerId="ADAL" clId="{9FA17360-167E-9443-9251-DAE6C10F48BB}" dt="2023-03-15T11:59:55.648" v="2357" actId="20577"/>
+          <ac:spMkLst>
+            <pc:docMk/>
+            <pc:sldMk cId="4052500796" sldId="277"/>
+            <ac:spMk id="10" creationId="{A1CF92ED-A48D-1849-AB33-59FE95505F4F}"/>
+          </ac:spMkLst>
+        </pc:spChg>
+        <pc:picChg chg="add mod">
+          <ac:chgData name="Savagar, Bethan Alice" userId="dc0b6509-dca5-46f6-b355-e03f7348faa9" providerId="ADAL" clId="{9FA17360-167E-9443-9251-DAE6C10F48BB}" dt="2023-03-15T11:58:34.400" v="2297" actId="1076"/>
+          <ac:picMkLst>
+            <pc:docMk/>
+            <pc:sldMk cId="4052500796" sldId="277"/>
+            <ac:picMk id="2" creationId="{FF7E1392-F6C5-11ED-94B9-517EFACE9460}"/>
+          </ac:picMkLst>
+        </pc:picChg>
+        <pc:picChg chg="add mod">
+          <ac:chgData name="Savagar, Bethan Alice" userId="dc0b6509-dca5-46f6-b355-e03f7348faa9" providerId="ADAL" clId="{9FA17360-167E-9443-9251-DAE6C10F48BB}" dt="2023-03-15T11:58:31.910" v="2296" actId="1076"/>
+          <ac:picMkLst>
+            <pc:docMk/>
+            <pc:sldMk cId="4052500796" sldId="277"/>
+            <ac:picMk id="3" creationId="{40787AB1-45E0-E1C7-9CFC-17B47FC3FE05}"/>
+          </ac:picMkLst>
+        </pc:picChg>
+        <pc:cxnChg chg="add mod">
+          <ac:chgData name="Savagar, Bethan Alice" userId="dc0b6509-dca5-46f6-b355-e03f7348faa9" providerId="ADAL" clId="{9FA17360-167E-9443-9251-DAE6C10F48BB}" dt="2023-03-15T11:59:46.505" v="2352" actId="1582"/>
+          <ac:cxnSpMkLst>
+            <pc:docMk/>
+            <pc:sldMk cId="4052500796" sldId="277"/>
+            <ac:cxnSpMk id="12" creationId="{D5786A98-2399-5DD0-1F05-E93AD3D71B91}"/>
+          </ac:cxnSpMkLst>
+        </pc:cxnChg>
+      </pc:sldChg>
+      <pc:sldChg chg="addSp modSp new mod">
+        <pc:chgData name="Savagar, Bethan Alice" userId="dc0b6509-dca5-46f6-b355-e03f7348faa9" providerId="ADAL" clId="{9FA17360-167E-9443-9251-DAE6C10F48BB}" dt="2023-03-15T12:04:25.707" v="2683" actId="1076"/>
+        <pc:sldMkLst>
+          <pc:docMk/>
+          <pc:sldMk cId="134850671" sldId="278"/>
+        </pc:sldMkLst>
+        <pc:spChg chg="add mod">
+          <ac:chgData name="Savagar, Bethan Alice" userId="dc0b6509-dca5-46f6-b355-e03f7348faa9" providerId="ADAL" clId="{9FA17360-167E-9443-9251-DAE6C10F48BB}" dt="2023-03-15T12:03:11.188" v="2523" actId="14100"/>
+          <ac:spMkLst>
+            <pc:docMk/>
+            <pc:sldMk cId="134850671" sldId="278"/>
+            <ac:spMk id="3" creationId="{CB254387-5792-FAFB-5A14-7339AE9004E2}"/>
+          </ac:spMkLst>
+        </pc:spChg>
+        <pc:spChg chg="add mod">
+          <ac:chgData name="Savagar, Bethan Alice" userId="dc0b6509-dca5-46f6-b355-e03f7348faa9" providerId="ADAL" clId="{9FA17360-167E-9443-9251-DAE6C10F48BB}" dt="2023-03-15T12:04:25.707" v="2683" actId="1076"/>
+          <ac:spMkLst>
+            <pc:docMk/>
+            <pc:sldMk cId="134850671" sldId="278"/>
+            <ac:spMk id="4" creationId="{8EA56506-FAED-BDBC-8A0E-8B7869D36B06}"/>
+          </ac:spMkLst>
+        </pc:spChg>
+        <pc:picChg chg="add mod">
+          <ac:chgData name="Savagar, Bethan Alice" userId="dc0b6509-dca5-46f6-b355-e03f7348faa9" providerId="ADAL" clId="{9FA17360-167E-9443-9251-DAE6C10F48BB}" dt="2023-03-15T12:03:41.281" v="2551" actId="14100"/>
+          <ac:picMkLst>
+            <pc:docMk/>
+            <pc:sldMk cId="134850671" sldId="278"/>
+            <ac:picMk id="2" creationId="{D58F8751-FB4F-67B3-0CB9-8917A30562A1}"/>
+          </ac:picMkLst>
+        </pc:picChg>
+      </pc:sldChg>
+      <pc:sldChg chg="addSp modSp new mod">
+        <pc:chgData name="Savagar, Bethan Alice" userId="dc0b6509-dca5-46f6-b355-e03f7348faa9" providerId="ADAL" clId="{9FA17360-167E-9443-9251-DAE6C10F48BB}" dt="2023-03-15T13:21:05.148" v="2799" actId="1076"/>
+        <pc:sldMkLst>
+          <pc:docMk/>
+          <pc:sldMk cId="1856209872" sldId="279"/>
+        </pc:sldMkLst>
+        <pc:spChg chg="add mod">
+          <ac:chgData name="Savagar, Bethan Alice" userId="dc0b6509-dca5-46f6-b355-e03f7348faa9" providerId="ADAL" clId="{9FA17360-167E-9443-9251-DAE6C10F48BB}" dt="2023-03-15T13:17:55.215" v="2753" actId="20577"/>
+          <ac:spMkLst>
+            <pc:docMk/>
+            <pc:sldMk cId="1856209872" sldId="279"/>
+            <ac:spMk id="3" creationId="{6F78474F-D41A-CD64-6096-DF5BBF7162E5}"/>
+          </ac:spMkLst>
+        </pc:spChg>
+        <pc:spChg chg="add mod">
+          <ac:chgData name="Savagar, Bethan Alice" userId="dc0b6509-dca5-46f6-b355-e03f7348faa9" providerId="ADAL" clId="{9FA17360-167E-9443-9251-DAE6C10F48BB}" dt="2023-03-15T13:20:43.732" v="2790" actId="1076"/>
+          <ac:spMkLst>
+            <pc:docMk/>
+            <pc:sldMk cId="1856209872" sldId="279"/>
+            <ac:spMk id="5" creationId="{B1795920-FDEC-8DE7-9031-83DD845C42C6}"/>
+          </ac:spMkLst>
+        </pc:spChg>
+        <pc:spChg chg="add mod">
+          <ac:chgData name="Savagar, Bethan Alice" userId="dc0b6509-dca5-46f6-b355-e03f7348faa9" providerId="ADAL" clId="{9FA17360-167E-9443-9251-DAE6C10F48BB}" dt="2023-03-15T13:20:51.606" v="2793" actId="1076"/>
+          <ac:spMkLst>
+            <pc:docMk/>
+            <pc:sldMk cId="1856209872" sldId="279"/>
+            <ac:spMk id="6" creationId="{B28BB157-91B6-0D9C-AC79-025675DDA6BB}"/>
+          </ac:spMkLst>
+        </pc:spChg>
+        <pc:spChg chg="add mod">
+          <ac:chgData name="Savagar, Bethan Alice" userId="dc0b6509-dca5-46f6-b355-e03f7348faa9" providerId="ADAL" clId="{9FA17360-167E-9443-9251-DAE6C10F48BB}" dt="2023-03-15T13:20:54.253" v="2794" actId="1076"/>
+          <ac:spMkLst>
+            <pc:docMk/>
+            <pc:sldMk cId="1856209872" sldId="279"/>
+            <ac:spMk id="8" creationId="{B8092081-CD7F-20A8-F125-31E80DF8FF12}"/>
+          </ac:spMkLst>
+        </pc:spChg>
+        <pc:spChg chg="add mod">
+          <ac:chgData name="Savagar, Bethan Alice" userId="dc0b6509-dca5-46f6-b355-e03f7348faa9" providerId="ADAL" clId="{9FA17360-167E-9443-9251-DAE6C10F48BB}" dt="2023-03-15T13:21:05.148" v="2799" actId="1076"/>
+          <ac:spMkLst>
+            <pc:docMk/>
+            <pc:sldMk cId="1856209872" sldId="279"/>
+            <ac:spMk id="10" creationId="{FB9AEF80-B42B-5C71-9C14-BB832145C363}"/>
+          </ac:spMkLst>
+        </pc:spChg>
+        <pc:picChg chg="add mod">
+          <ac:chgData name="Savagar, Bethan Alice" userId="dc0b6509-dca5-46f6-b355-e03f7348faa9" providerId="ADAL" clId="{9FA17360-167E-9443-9251-DAE6C10F48BB}" dt="2023-03-15T13:18:01.129" v="2754" actId="1076"/>
+          <ac:picMkLst>
+            <pc:docMk/>
+            <pc:sldMk cId="1856209872" sldId="279"/>
+            <ac:picMk id="2" creationId="{640C60B0-DADD-56B9-63A7-BA7373975EA1}"/>
+          </ac:picMkLst>
+        </pc:picChg>
+      </pc:sldChg>
     </pc:docChg>
   </pc:docChgLst>
 </pc:chgInfo>
@@ -1652,7 +1835,7 @@
           <a:p>
             <a:fld id="{A68325C7-60EC-A242-9953-60CBBBD2270A}" type="datetimeFigureOut">
               <a:rPr lang="en-US" smtClean="0"/>
-              <a:t>3/2/23</a:t>
+              <a:t>3/15/23</a:t>
             </a:fld>
             <a:endParaRPr lang="en-US"/>
           </a:p>
@@ -1966,6 +2149,232 @@
           <a:p>
             <a:r>
               <a:rPr lang="en-US" dirty="0"/>
+              <a:t>NB See .</a:t>
+            </a:r>
+            <a:r>
+              <a:rPr lang="en-US" dirty="0" err="1"/>
+              <a:t>Rmd</a:t>
+            </a:r>
+            <a:r>
+              <a:rPr lang="en-US" dirty="0"/>
+              <a:t> file for </a:t>
+            </a:r>
+            <a:r>
+              <a:rPr lang="en-US" dirty="0" err="1"/>
+              <a:t>mrkta</a:t>
+            </a:r>
+            <a:r>
+              <a:rPr lang="en-US" dirty="0"/>
+              <a:t> survey - PDF</a:t>
+            </a:r>
+          </a:p>
+        </p:txBody>
+      </p:sp>
+      <p:sp>
+        <p:nvSpPr>
+          <p:cNvPr id="4" name="Slide Number Placeholder 3"/>
+          <p:cNvSpPr>
+            <a:spLocks noGrp="1"/>
+          </p:cNvSpPr>
+          <p:nvPr>
+            <p:ph type="sldNum" sz="quarter" idx="5"/>
+          </p:nvPr>
+        </p:nvSpPr>
+        <p:spPr/>
+        <p:txBody>
+          <a:bodyPr/>
+          <a:lstStyle/>
+          <a:p>
+            <a:fld id="{EDD5B931-01B2-7F4E-98D6-17CE49A98483}" type="slidenum">
+              <a:rPr lang="en-US" smtClean="0"/>
+              <a:t>1</a:t>
+            </a:fld>
+            <a:endParaRPr lang="en-US"/>
+          </a:p>
+        </p:txBody>
+      </p:sp>
+    </p:spTree>
+    <p:extLst>
+      <p:ext uri="{BB962C8B-B14F-4D97-AF65-F5344CB8AC3E}">
+        <p14:creationId xmlns:p14="http://schemas.microsoft.com/office/powerpoint/2010/main" val="1338738704"/>
+      </p:ext>
+    </p:extLst>
+  </p:cSld>
+  <p:clrMapOvr>
+    <a:masterClrMapping/>
+  </p:clrMapOvr>
+</p:notes>
+</file>
+
+<file path=ppt/notesSlides/notesSlide2.xml><?xml version="1.0" encoding="utf-8"?>
+<p:notes xmlns:a="http://schemas.openxmlformats.org/drawingml/2006/main" xmlns:r="http://schemas.openxmlformats.org/officeDocument/2006/relationships" xmlns:p="http://schemas.openxmlformats.org/presentationml/2006/main">
+  <p:cSld>
+    <p:spTree>
+      <p:nvGrpSpPr>
+        <p:cNvPr id="1" name=""/>
+        <p:cNvGrpSpPr/>
+        <p:nvPr/>
+      </p:nvGrpSpPr>
+      <p:grpSpPr>
+        <a:xfrm>
+          <a:off x="0" y="0"/>
+          <a:ext cx="0" cy="0"/>
+          <a:chOff x="0" y="0"/>
+          <a:chExt cx="0" cy="0"/>
+        </a:xfrm>
+      </p:grpSpPr>
+      <p:sp>
+        <p:nvSpPr>
+          <p:cNvPr id="2" name="Slide Image Placeholder 1"/>
+          <p:cNvSpPr>
+            <a:spLocks noGrp="1" noRot="1" noChangeAspect="1"/>
+          </p:cNvSpPr>
+          <p:nvPr>
+            <p:ph type="sldImg"/>
+          </p:nvPr>
+        </p:nvSpPr>
+        <p:spPr/>
+      </p:sp>
+      <p:sp>
+        <p:nvSpPr>
+          <p:cNvPr id="3" name="Notes Placeholder 2"/>
+          <p:cNvSpPr>
+            <a:spLocks noGrp="1"/>
+          </p:cNvSpPr>
+          <p:nvPr>
+            <p:ph type="body" idx="1"/>
+          </p:nvPr>
+        </p:nvSpPr>
+        <p:spPr/>
+        <p:txBody>
+          <a:bodyPr/>
+          <a:lstStyle/>
+          <a:p>
+            <a:pPr marL="0" marR="0" lvl="0" indent="0" algn="l" defTabSz="914400" rtl="0" eaLnBrk="1" fontAlgn="auto" latinLnBrk="0" hangingPunct="1">
+              <a:lnSpc>
+                <a:spcPct val="100000"/>
+              </a:lnSpc>
+              <a:spcBef>
+                <a:spcPts val="0"/>
+              </a:spcBef>
+              <a:spcAft>
+                <a:spcPts val="0"/>
+              </a:spcAft>
+              <a:buClrTx/>
+              <a:buSzTx/>
+              <a:buFontTx/>
+              <a:buNone/>
+              <a:tabLst/>
+              <a:defRPr/>
+            </a:pPr>
+            <a:r>
+              <a:rPr lang="en-US" dirty="0"/>
+              <a:t>NB See .</a:t>
+            </a:r>
+            <a:r>
+              <a:rPr lang="en-US" dirty="0" err="1"/>
+              <a:t>Rmd</a:t>
+            </a:r>
+            <a:r>
+              <a:rPr lang="en-US" dirty="0"/>
+              <a:t> file for </a:t>
+            </a:r>
+            <a:r>
+              <a:rPr lang="en-US" dirty="0" err="1"/>
+              <a:t>mrkta</a:t>
+            </a:r>
+            <a:r>
+              <a:rPr lang="en-US" dirty="0"/>
+              <a:t> survey - PDF</a:t>
+            </a:r>
+          </a:p>
+          <a:p>
+            <a:endParaRPr lang="en-US" dirty="0"/>
+          </a:p>
+        </p:txBody>
+      </p:sp>
+      <p:sp>
+        <p:nvSpPr>
+          <p:cNvPr id="4" name="Slide Number Placeholder 3"/>
+          <p:cNvSpPr>
+            <a:spLocks noGrp="1"/>
+          </p:cNvSpPr>
+          <p:nvPr>
+            <p:ph type="sldNum" sz="quarter" idx="5"/>
+          </p:nvPr>
+        </p:nvSpPr>
+        <p:spPr/>
+        <p:txBody>
+          <a:bodyPr/>
+          <a:lstStyle/>
+          <a:p>
+            <a:fld id="{EDD5B931-01B2-7F4E-98D6-17CE49A98483}" type="slidenum">
+              <a:rPr lang="en-US" smtClean="0"/>
+              <a:t>2</a:t>
+            </a:fld>
+            <a:endParaRPr lang="en-US"/>
+          </a:p>
+        </p:txBody>
+      </p:sp>
+    </p:spTree>
+    <p:extLst>
+      <p:ext uri="{BB962C8B-B14F-4D97-AF65-F5344CB8AC3E}">
+        <p14:creationId xmlns:p14="http://schemas.microsoft.com/office/powerpoint/2010/main" val="3428556472"/>
+      </p:ext>
+    </p:extLst>
+  </p:cSld>
+  <p:clrMapOvr>
+    <a:masterClrMapping/>
+  </p:clrMapOvr>
+</p:notes>
+</file>
+
+<file path=ppt/notesSlides/notesSlide3.xml><?xml version="1.0" encoding="utf-8"?>
+<p:notes xmlns:a="http://schemas.openxmlformats.org/drawingml/2006/main" xmlns:r="http://schemas.openxmlformats.org/officeDocument/2006/relationships" xmlns:p="http://schemas.openxmlformats.org/presentationml/2006/main">
+  <p:cSld>
+    <p:spTree>
+      <p:nvGrpSpPr>
+        <p:cNvPr id="1" name=""/>
+        <p:cNvGrpSpPr/>
+        <p:nvPr/>
+      </p:nvGrpSpPr>
+      <p:grpSpPr>
+        <a:xfrm>
+          <a:off x="0" y="0"/>
+          <a:ext cx="0" cy="0"/>
+          <a:chOff x="0" y="0"/>
+          <a:chExt cx="0" cy="0"/>
+        </a:xfrm>
+      </p:grpSpPr>
+      <p:sp>
+        <p:nvSpPr>
+          <p:cNvPr id="2" name="Slide Image Placeholder 1"/>
+          <p:cNvSpPr>
+            <a:spLocks noGrp="1" noRot="1" noChangeAspect="1"/>
+          </p:cNvSpPr>
+          <p:nvPr>
+            <p:ph type="sldImg"/>
+          </p:nvPr>
+        </p:nvSpPr>
+        <p:spPr/>
+      </p:sp>
+      <p:sp>
+        <p:nvSpPr>
+          <p:cNvPr id="3" name="Notes Placeholder 2"/>
+          <p:cNvSpPr>
+            <a:spLocks noGrp="1"/>
+          </p:cNvSpPr>
+          <p:nvPr>
+            <p:ph type="body" idx="1"/>
+          </p:nvPr>
+        </p:nvSpPr>
+        <p:spPr/>
+        <p:txBody>
+          <a:bodyPr/>
+          <a:lstStyle/>
+          <a:p>
+            <a:r>
+              <a:rPr lang="en-US" dirty="0"/>
               <a:t>Highlight districts surveyed – BS has done this crudely using info from field design and matching </a:t>
             </a:r>
             <a:r>
@@ -2021,7 +2430,7 @@
 </p:notes>
 </file>
 
-<file path=ppt/notesSlides/notesSlide2.xml><?xml version="1.0" encoding="utf-8"?>
+<file path=ppt/notesSlides/notesSlide4.xml><?xml version="1.0" encoding="utf-8"?>
 <p:notes xmlns:a="http://schemas.openxmlformats.org/drawingml/2006/main" xmlns:r="http://schemas.openxmlformats.org/officeDocument/2006/relationships" xmlns:p="http://schemas.openxmlformats.org/presentationml/2006/main">
   <p:cSld>
     <p:spTree>
@@ -2122,7 +2531,7 @@
 </p:notes>
 </file>
 
-<file path=ppt/notesSlides/notesSlide3.xml><?xml version="1.0" encoding="utf-8"?>
+<file path=ppt/notesSlides/notesSlide5.xml><?xml version="1.0" encoding="utf-8"?>
 <p:notes xmlns:a="http://schemas.openxmlformats.org/drawingml/2006/main" xmlns:r="http://schemas.openxmlformats.org/officeDocument/2006/relationships" xmlns:p="http://schemas.openxmlformats.org/presentationml/2006/main">
   <p:cSld>
     <p:spTree>
@@ -2206,7 +2615,7 @@
 </p:notes>
 </file>
 
-<file path=ppt/notesSlides/notesSlide4.xml><?xml version="1.0" encoding="utf-8"?>
+<file path=ppt/notesSlides/notesSlide6.xml><?xml version="1.0" encoding="utf-8"?>
 <p:notes xmlns:a="http://schemas.openxmlformats.org/drawingml/2006/main" xmlns:r="http://schemas.openxmlformats.org/officeDocument/2006/relationships" xmlns:p="http://schemas.openxmlformats.org/presentationml/2006/main">
   <p:cSld>
     <p:spTree>
@@ -2293,7 +2702,7 @@
 </p:notes>
 </file>
 
-<file path=ppt/notesSlides/notesSlide5.xml><?xml version="1.0" encoding="utf-8"?>
+<file path=ppt/notesSlides/notesSlide7.xml><?xml version="1.0" encoding="utf-8"?>
 <p:notes xmlns:a="http://schemas.openxmlformats.org/drawingml/2006/main" xmlns:r="http://schemas.openxmlformats.org/officeDocument/2006/relationships" xmlns:p="http://schemas.openxmlformats.org/presentationml/2006/main">
   <p:cSld>
     <p:spTree>
@@ -2401,7 +2810,7 @@
           <a:p>
             <a:fld id="{EDD5B931-01B2-7F4E-98D6-17CE49A98483}" type="slidenum">
               <a:rPr lang="en-US" smtClean="0"/>
-              <a:t>17</a:t>
+              <a:t>20</a:t>
             </a:fld>
             <a:endParaRPr lang="en-US"/>
           </a:p>
@@ -2420,7 +2829,7 @@
 </p:notes>
 </file>
 
-<file path=ppt/notesSlides/notesSlide6.xml><?xml version="1.0" encoding="utf-8"?>
+<file path=ppt/notesSlides/notesSlide8.xml><?xml version="1.0" encoding="utf-8"?>
 <p:notes xmlns:a="http://schemas.openxmlformats.org/drawingml/2006/main" xmlns:r="http://schemas.openxmlformats.org/officeDocument/2006/relationships" xmlns:p="http://schemas.openxmlformats.org/presentationml/2006/main">
   <p:cSld>
     <p:spTree>
@@ -2528,7 +2937,7 @@
           <a:p>
             <a:fld id="{EDD5B931-01B2-7F4E-98D6-17CE49A98483}" type="slidenum">
               <a:rPr lang="en-US" smtClean="0"/>
-              <a:t>18</a:t>
+              <a:t>21</a:t>
             </a:fld>
             <a:endParaRPr lang="en-US"/>
           </a:p>
@@ -2696,7 +3105,7 @@
           <a:p>
             <a:fld id="{DE2442DC-4320-1141-A657-9959529813FB}" type="datetimeFigureOut">
               <a:rPr lang="en-US" smtClean="0"/>
-              <a:t>3/2/23</a:t>
+              <a:t>3/15/23</a:t>
             </a:fld>
             <a:endParaRPr lang="en-US"/>
           </a:p>
@@ -2896,7 +3305,7 @@
           <a:p>
             <a:fld id="{DE2442DC-4320-1141-A657-9959529813FB}" type="datetimeFigureOut">
               <a:rPr lang="en-US" smtClean="0"/>
-              <a:t>3/2/23</a:t>
+              <a:t>3/15/23</a:t>
             </a:fld>
             <a:endParaRPr lang="en-US"/>
           </a:p>
@@ -3106,7 +3515,7 @@
           <a:p>
             <a:fld id="{DE2442DC-4320-1141-A657-9959529813FB}" type="datetimeFigureOut">
               <a:rPr lang="en-US" smtClean="0"/>
-              <a:t>3/2/23</a:t>
+              <a:t>3/15/23</a:t>
             </a:fld>
             <a:endParaRPr lang="en-US"/>
           </a:p>
@@ -3306,7 +3715,7 @@
           <a:p>
             <a:fld id="{DE2442DC-4320-1141-A657-9959529813FB}" type="datetimeFigureOut">
               <a:rPr lang="en-US" smtClean="0"/>
-              <a:t>3/2/23</a:t>
+              <a:t>3/15/23</a:t>
             </a:fld>
             <a:endParaRPr lang="en-US"/>
           </a:p>
@@ -3582,7 +3991,7 @@
           <a:p>
             <a:fld id="{DE2442DC-4320-1141-A657-9959529813FB}" type="datetimeFigureOut">
               <a:rPr lang="en-US" smtClean="0"/>
-              <a:t>3/2/23</a:t>
+              <a:t>3/15/23</a:t>
             </a:fld>
             <a:endParaRPr lang="en-US"/>
           </a:p>
@@ -3850,7 +4259,7 @@
           <a:p>
             <a:fld id="{DE2442DC-4320-1141-A657-9959529813FB}" type="datetimeFigureOut">
               <a:rPr lang="en-US" smtClean="0"/>
-              <a:t>3/2/23</a:t>
+              <a:t>3/15/23</a:t>
             </a:fld>
             <a:endParaRPr lang="en-US"/>
           </a:p>
@@ -4265,7 +4674,7 @@
           <a:p>
             <a:fld id="{DE2442DC-4320-1141-A657-9959529813FB}" type="datetimeFigureOut">
               <a:rPr lang="en-US" smtClean="0"/>
-              <a:t>3/2/23</a:t>
+              <a:t>3/15/23</a:t>
             </a:fld>
             <a:endParaRPr lang="en-US"/>
           </a:p>
@@ -4407,7 +4816,7 @@
           <a:p>
             <a:fld id="{DE2442DC-4320-1141-A657-9959529813FB}" type="datetimeFigureOut">
               <a:rPr lang="en-US" smtClean="0"/>
-              <a:t>3/2/23</a:t>
+              <a:t>3/15/23</a:t>
             </a:fld>
             <a:endParaRPr lang="en-US"/>
           </a:p>
@@ -4520,7 +4929,7 @@
           <a:p>
             <a:fld id="{DE2442DC-4320-1141-A657-9959529813FB}" type="datetimeFigureOut">
               <a:rPr lang="en-US" smtClean="0"/>
-              <a:t>3/2/23</a:t>
+              <a:t>3/15/23</a:t>
             </a:fld>
             <a:endParaRPr lang="en-US"/>
           </a:p>
@@ -4833,7 +5242,7 @@
           <a:p>
             <a:fld id="{DE2442DC-4320-1141-A657-9959529813FB}" type="datetimeFigureOut">
               <a:rPr lang="en-US" smtClean="0"/>
-              <a:t>3/2/23</a:t>
+              <a:t>3/15/23</a:t>
             </a:fld>
             <a:endParaRPr lang="en-US"/>
           </a:p>
@@ -5122,7 +5531,7 @@
           <a:p>
             <a:fld id="{DE2442DC-4320-1141-A657-9959529813FB}" type="datetimeFigureOut">
               <a:rPr lang="en-US" smtClean="0"/>
-              <a:t>3/2/23</a:t>
+              <a:t>3/15/23</a:t>
             </a:fld>
             <a:endParaRPr lang="en-US"/>
           </a:p>
@@ -5365,7 +5774,7 @@
           <a:p>
             <a:fld id="{DE2442DC-4320-1141-A657-9959529813FB}" type="datetimeFigureOut">
               <a:rPr lang="en-US" smtClean="0"/>
-              <a:t>3/2/23</a:t>
+              <a:t>3/15/23</a:t>
             </a:fld>
             <a:endParaRPr lang="en-US"/>
           </a:p>
@@ -5865,6 +6274,220 @@
           <a:chExt cx="0" cy="0"/>
         </a:xfrm>
       </p:grpSpPr>
+      <p:pic>
+        <p:nvPicPr>
+          <p:cNvPr id="2" name="Picture 1">
+            <a:extLst>
+              <a:ext uri="{FF2B5EF4-FFF2-40B4-BE49-F238E27FC236}">
+                <a16:creationId xmlns:a16="http://schemas.microsoft.com/office/drawing/2014/main" id="{D58F8751-FB4F-67B3-0CB9-8917A30562A1}"/>
+              </a:ext>
+            </a:extLst>
+          </p:cNvPr>
+          <p:cNvPicPr>
+            <a:picLocks noChangeAspect="1"/>
+          </p:cNvPicPr>
+          <p:nvPr/>
+        </p:nvPicPr>
+        <p:blipFill>
+          <a:blip r:embed="rId2"/>
+          <a:stretch>
+            <a:fillRect/>
+          </a:stretch>
+        </p:blipFill>
+        <p:spPr>
+          <a:xfrm>
+            <a:off x="1629101" y="1061486"/>
+            <a:ext cx="9659669" cy="5119748"/>
+          </a:xfrm>
+          <a:prstGeom prst="rect">
+            <a:avLst/>
+          </a:prstGeom>
+        </p:spPr>
+      </p:pic>
+      <p:sp>
+        <p:nvSpPr>
+          <p:cNvPr id="3" name="TextBox 2">
+            <a:extLst>
+              <a:ext uri="{FF2B5EF4-FFF2-40B4-BE49-F238E27FC236}">
+                <a16:creationId xmlns:a16="http://schemas.microsoft.com/office/drawing/2014/main" id="{CB254387-5792-FAFB-5A14-7339AE9004E2}"/>
+              </a:ext>
+            </a:extLst>
+          </p:cNvPr>
+          <p:cNvSpPr txBox="1"/>
+          <p:nvPr/>
+        </p:nvSpPr>
+        <p:spPr>
+          <a:xfrm>
+            <a:off x="322261" y="230491"/>
+            <a:ext cx="9902393" cy="369332"/>
+          </a:xfrm>
+          <a:prstGeom prst="rect">
+            <a:avLst/>
+          </a:prstGeom>
+          <a:noFill/>
+        </p:spPr>
+        <p:txBody>
+          <a:bodyPr wrap="square" rtlCol="0">
+            <a:spAutoFit/>
+          </a:bodyPr>
+          <a:lstStyle/>
+          <a:p>
+            <a:r>
+              <a:rPr lang="en-US" b="1" dirty="0"/>
+              <a:t>For Sheep and Goats sold in this market where are they brought from &amp; where are they taken to ? </a:t>
+            </a:r>
+            <a:endParaRPr lang="en-US" b="1" i="1" dirty="0"/>
+          </a:p>
+        </p:txBody>
+      </p:sp>
+      <p:sp>
+        <p:nvSpPr>
+          <p:cNvPr id="4" name="TextBox 3">
+            <a:extLst>
+              <a:ext uri="{FF2B5EF4-FFF2-40B4-BE49-F238E27FC236}">
+                <a16:creationId xmlns:a16="http://schemas.microsoft.com/office/drawing/2014/main" id="{8EA56506-FAED-BDBC-8A0E-8B7869D36B06}"/>
+              </a:ext>
+            </a:extLst>
+          </p:cNvPr>
+          <p:cNvSpPr txBox="1"/>
+          <p:nvPr/>
+        </p:nvSpPr>
+        <p:spPr>
+          <a:xfrm>
+            <a:off x="322261" y="615211"/>
+            <a:ext cx="9902393" cy="307777"/>
+          </a:xfrm>
+          <a:prstGeom prst="rect">
+            <a:avLst/>
+          </a:prstGeom>
+          <a:noFill/>
+        </p:spPr>
+        <p:txBody>
+          <a:bodyPr wrap="square" rtlCol="0">
+            <a:spAutoFit/>
+          </a:bodyPr>
+          <a:lstStyle/>
+          <a:p>
+            <a:r>
+              <a:rPr lang="en-US" sz="1400" i="1" dirty="0"/>
+              <a:t>Key Informant provides general overview of trends where animals travel from/to… Not for network analysis</a:t>
+            </a:r>
+          </a:p>
+        </p:txBody>
+      </p:sp>
+    </p:spTree>
+    <p:extLst>
+      <p:ext uri="{BB962C8B-B14F-4D97-AF65-F5344CB8AC3E}">
+        <p14:creationId xmlns:p14="http://schemas.microsoft.com/office/powerpoint/2010/main" val="134850671"/>
+      </p:ext>
+    </p:extLst>
+  </p:cSld>
+  <p:clrMapOvr>
+    <a:masterClrMapping/>
+  </p:clrMapOvr>
+</p:sld>
+</file>
+
+<file path=ppt/slides/slide11.xml><?xml version="1.0" encoding="utf-8"?>
+<p:sld xmlns:a="http://schemas.openxmlformats.org/drawingml/2006/main" xmlns:r="http://schemas.openxmlformats.org/officeDocument/2006/relationships" xmlns:p="http://schemas.openxmlformats.org/presentationml/2006/main">
+  <p:cSld>
+    <p:spTree>
+      <p:nvGrpSpPr>
+        <p:cNvPr id="1" name=""/>
+        <p:cNvGrpSpPr/>
+        <p:nvPr/>
+      </p:nvGrpSpPr>
+      <p:grpSpPr>
+        <a:xfrm>
+          <a:off x="0" y="0"/>
+          <a:ext cx="0" cy="0"/>
+          <a:chOff x="0" y="0"/>
+          <a:chExt cx="0" cy="0"/>
+        </a:xfrm>
+      </p:grpSpPr>
+      <p:sp>
+        <p:nvSpPr>
+          <p:cNvPr id="2" name="Title 1">
+            <a:extLst>
+              <a:ext uri="{FF2B5EF4-FFF2-40B4-BE49-F238E27FC236}">
+                <a16:creationId xmlns:a16="http://schemas.microsoft.com/office/drawing/2014/main" id="{2BAA5BAB-5857-7AE3-D092-2A52BA1D0C91}"/>
+              </a:ext>
+            </a:extLst>
+          </p:cNvPr>
+          <p:cNvSpPr>
+            <a:spLocks noGrp="1"/>
+          </p:cNvSpPr>
+          <p:nvPr>
+            <p:ph type="title"/>
+          </p:nvPr>
+        </p:nvSpPr>
+        <p:spPr/>
+        <p:txBody>
+          <a:bodyPr/>
+          <a:lstStyle/>
+          <a:p>
+            <a:r>
+              <a:rPr lang="en-US" dirty="0"/>
+              <a:t>Market Survey C: Buyer/Seller </a:t>
+            </a:r>
+          </a:p>
+        </p:txBody>
+      </p:sp>
+      <p:sp>
+        <p:nvSpPr>
+          <p:cNvPr id="3" name="Text Placeholder 2">
+            <a:extLst>
+              <a:ext uri="{FF2B5EF4-FFF2-40B4-BE49-F238E27FC236}">
+                <a16:creationId xmlns:a16="http://schemas.microsoft.com/office/drawing/2014/main" id="{C87E6E83-7EBD-C2D2-8C4A-5E79025FC239}"/>
+              </a:ext>
+            </a:extLst>
+          </p:cNvPr>
+          <p:cNvSpPr>
+            <a:spLocks noGrp="1"/>
+          </p:cNvSpPr>
+          <p:nvPr>
+            <p:ph type="body" idx="1"/>
+          </p:nvPr>
+        </p:nvSpPr>
+        <p:spPr/>
+        <p:txBody>
+          <a:bodyPr/>
+          <a:lstStyle/>
+          <a:p>
+            <a:endParaRPr lang="en-US"/>
+          </a:p>
+        </p:txBody>
+      </p:sp>
+    </p:spTree>
+    <p:extLst>
+      <p:ext uri="{BB962C8B-B14F-4D97-AF65-F5344CB8AC3E}">
+        <p14:creationId xmlns:p14="http://schemas.microsoft.com/office/powerpoint/2010/main" val="1057101785"/>
+      </p:ext>
+    </p:extLst>
+  </p:cSld>
+  <p:clrMapOvr>
+    <a:masterClrMapping/>
+  </p:clrMapOvr>
+</p:sld>
+</file>
+
+<file path=ppt/slides/slide12.xml><?xml version="1.0" encoding="utf-8"?>
+<p:sld xmlns:a="http://schemas.openxmlformats.org/drawingml/2006/main" xmlns:r="http://schemas.openxmlformats.org/officeDocument/2006/relationships" xmlns:p="http://schemas.openxmlformats.org/presentationml/2006/main">
+  <p:cSld>
+    <p:spTree>
+      <p:nvGrpSpPr>
+        <p:cNvPr id="1" name=""/>
+        <p:cNvGrpSpPr/>
+        <p:nvPr/>
+      </p:nvGrpSpPr>
+      <p:grpSpPr>
+        <a:xfrm>
+          <a:off x="0" y="0"/>
+          <a:ext cx="0" cy="0"/>
+          <a:chOff x="0" y="0"/>
+          <a:chExt cx="0" cy="0"/>
+        </a:xfrm>
+      </p:grpSpPr>
       <p:sp>
         <p:nvSpPr>
           <p:cNvPr id="2" name="Title 1">
@@ -6062,7 +6685,7 @@
 </p:sld>
 </file>
 
-<file path=ppt/slides/slide11.xml><?xml version="1.0" encoding="utf-8"?>
+<file path=ppt/slides/slide13.xml><?xml version="1.0" encoding="utf-8"?>
 <p:sld xmlns:a="http://schemas.openxmlformats.org/drawingml/2006/main" xmlns:r="http://schemas.openxmlformats.org/officeDocument/2006/relationships" xmlns:p="http://schemas.openxmlformats.org/presentationml/2006/main">
   <p:cSld>
     <p:spTree>
@@ -6145,7 +6768,7 @@
 </p:sld>
 </file>
 
-<file path=ppt/slides/slide12.xml><?xml version="1.0" encoding="utf-8"?>
+<file path=ppt/slides/slide14.xml><?xml version="1.0" encoding="utf-8"?>
 <p:sld xmlns:a="http://schemas.openxmlformats.org/drawingml/2006/main" xmlns:r="http://schemas.openxmlformats.org/officeDocument/2006/relationships" xmlns:p="http://schemas.openxmlformats.org/presentationml/2006/main">
   <p:cSld>
     <p:bg>
@@ -6734,7 +7357,7 @@
           <p:nvPr>
             <p:extLst>
               <p:ext uri="{D42A27DB-BD31-4B8C-83A1-F6EECF244321}">
-                <p14:modId xmlns:p14="http://schemas.microsoft.com/office/powerpoint/2010/main" val="1353026006"/>
+                <p14:modId xmlns:p14="http://schemas.microsoft.com/office/powerpoint/2010/main" val="3237441918"/>
               </p:ext>
             </p:extLst>
           </p:nvPr>
@@ -9116,6 +9739,9 @@
                             <a:srgbClr val="000000"/>
                           </a:solidFill>
                           <a:effectLst/>
+                          <a:highlight>
+                            <a:srgbClr val="00FF00"/>
+                          </a:highlight>
                           <a:latin typeface="Calibri" panose="020F0502020204030204" pitchFamily="34" charset="0"/>
                         </a:rPr>
                         <a:t>type.of.market.see.mrktc.lkpmrkt.type</a:t>
@@ -9126,12 +9752,18 @@
                             <a:srgbClr val="000000"/>
                           </a:solidFill>
                           <a:effectLst/>
+                          <a:highlight>
+                            <a:srgbClr val="00FF00"/>
+                          </a:highlight>
                           <a:latin typeface="Calibri" panose="020F0502020204030204" pitchFamily="34" charset="0"/>
                         </a:rPr>
                         <a:t>.</a:t>
                       </a:r>
                       <a:endParaRPr lang="en-GB" sz="2400" b="0" i="0" u="none" strike="noStrike" dirty="0">
                         <a:effectLst/>
+                        <a:highlight>
+                          <a:srgbClr val="00FF00"/>
+                        </a:highlight>
                         <a:latin typeface="Arial" panose="020B0604020202020204" pitchFamily="34" charset="0"/>
                       </a:endParaRPr>
                     </a:p>
@@ -9338,7 +9970,7 @@
                         </a:spcAft>
                       </a:pPr>
                       <a:r>
-                        <a:rPr lang="en-GB" sz="1200" b="0" i="0" u="none" strike="noStrike">
+                        <a:rPr lang="en-GB" sz="1200" b="0" i="0" u="none" strike="noStrike" dirty="0">
                           <a:solidFill>
                             <a:srgbClr val="000000"/>
                           </a:solidFill>
@@ -9347,7 +9979,7 @@
                         </a:rPr>
                         <a:t> </a:t>
                       </a:r>
-                      <a:endParaRPr lang="en-GB" sz="2400" b="0" i="0" u="none" strike="noStrike">
+                      <a:endParaRPr lang="en-GB" sz="2400" b="0" i="0" u="none" strike="noStrike" dirty="0">
                         <a:effectLst/>
                         <a:latin typeface="Arial" panose="020B0604020202020204" pitchFamily="34" charset="0"/>
                       </a:endParaRPr>
@@ -9710,12 +10342,18 @@
                             <a:srgbClr val="000000"/>
                           </a:solidFill>
                           <a:effectLst/>
+                          <a:highlight>
+                            <a:srgbClr val="00FF00"/>
+                          </a:highlight>
                           <a:latin typeface="Calibri" panose="020F0502020204030204" pitchFamily="34" charset="0"/>
                         </a:rPr>
                         <a:t>13.have.you.visited.other.markets.to.sell.or.buy.sheep.and.goats.in.the.past.one.month.</a:t>
                       </a:r>
                       <a:endParaRPr lang="en-GB" sz="2400" b="0" i="0" u="none" strike="noStrike" dirty="0">
                         <a:effectLst/>
+                        <a:highlight>
+                          <a:srgbClr val="00FF00"/>
+                        </a:highlight>
                         <a:latin typeface="Arial" panose="020B0604020202020204" pitchFamily="34" charset="0"/>
                       </a:endParaRPr>
                     </a:p>
@@ -12043,7 +12681,7 @@
 </p:sld>
 </file>
 
-<file path=ppt/slides/slide13.xml><?xml version="1.0" encoding="utf-8"?>
+<file path=ppt/slides/slide15.xml><?xml version="1.0" encoding="utf-8"?>
 <p:sld xmlns:a="http://schemas.openxmlformats.org/drawingml/2006/main" xmlns:r="http://schemas.openxmlformats.org/officeDocument/2006/relationships" xmlns:p="http://schemas.openxmlformats.org/presentationml/2006/main">
   <p:cSld>
     <p:spTree>
@@ -12239,7 +12877,456 @@
 </p:sld>
 </file>
 
-<file path=ppt/slides/slide14.xml><?xml version="1.0" encoding="utf-8"?>
+<file path=ppt/slides/slide16.xml><?xml version="1.0" encoding="utf-8"?>
+<p:sld xmlns:a="http://schemas.openxmlformats.org/drawingml/2006/main" xmlns:r="http://schemas.openxmlformats.org/officeDocument/2006/relationships" xmlns:p="http://schemas.openxmlformats.org/presentationml/2006/main">
+  <p:cSld>
+    <p:spTree>
+      <p:nvGrpSpPr>
+        <p:cNvPr id="1" name=""/>
+        <p:cNvGrpSpPr/>
+        <p:nvPr/>
+      </p:nvGrpSpPr>
+      <p:grpSpPr>
+        <a:xfrm>
+          <a:off x="0" y="0"/>
+          <a:ext cx="0" cy="0"/>
+          <a:chOff x="0" y="0"/>
+          <a:chExt cx="0" cy="0"/>
+        </a:xfrm>
+      </p:grpSpPr>
+      <p:pic>
+        <p:nvPicPr>
+          <p:cNvPr id="2" name="Picture 1">
+            <a:extLst>
+              <a:ext uri="{FF2B5EF4-FFF2-40B4-BE49-F238E27FC236}">
+                <a16:creationId xmlns:a16="http://schemas.microsoft.com/office/drawing/2014/main" id="{640C60B0-DADD-56B9-63A7-BA7373975EA1}"/>
+              </a:ext>
+            </a:extLst>
+          </p:cNvPr>
+          <p:cNvPicPr>
+            <a:picLocks noChangeAspect="1"/>
+          </p:cNvPicPr>
+          <p:nvPr/>
+        </p:nvPicPr>
+        <p:blipFill>
+          <a:blip r:embed="rId2"/>
+          <a:stretch>
+            <a:fillRect/>
+          </a:stretch>
+        </p:blipFill>
+        <p:spPr>
+          <a:xfrm>
+            <a:off x="945572" y="545754"/>
+            <a:ext cx="4648200" cy="6032500"/>
+          </a:xfrm>
+          <a:prstGeom prst="rect">
+            <a:avLst/>
+          </a:prstGeom>
+        </p:spPr>
+      </p:pic>
+      <p:sp>
+        <p:nvSpPr>
+          <p:cNvPr id="3" name="TextBox 2">
+            <a:extLst>
+              <a:ext uri="{FF2B5EF4-FFF2-40B4-BE49-F238E27FC236}">
+                <a16:creationId xmlns:a16="http://schemas.microsoft.com/office/drawing/2014/main" id="{6F78474F-D41A-CD64-6096-DF5BBF7162E5}"/>
+              </a:ext>
+            </a:extLst>
+          </p:cNvPr>
+          <p:cNvSpPr txBox="1"/>
+          <p:nvPr/>
+        </p:nvSpPr>
+        <p:spPr>
+          <a:xfrm>
+            <a:off x="199362" y="43418"/>
+            <a:ext cx="8970962" cy="369332"/>
+          </a:xfrm>
+          <a:prstGeom prst="rect">
+            <a:avLst/>
+          </a:prstGeom>
+          <a:noFill/>
+        </p:spPr>
+        <p:txBody>
+          <a:bodyPr wrap="square">
+            <a:spAutoFit/>
+          </a:bodyPr>
+          <a:lstStyle/>
+          <a:p>
+            <a:pPr algn="l" fontAlgn="t">
+              <a:spcBef>
+                <a:spcPts val="0"/>
+              </a:spcBef>
+              <a:spcAft>
+                <a:spcPts val="0"/>
+              </a:spcAft>
+            </a:pPr>
+            <a:r>
+              <a:rPr lang="en-GB" sz="1800" b="0" i="0" u="none" strike="noStrike" dirty="0">
+                <a:solidFill>
+                  <a:srgbClr val="000000"/>
+                </a:solidFill>
+                <a:effectLst/>
+                <a:latin typeface="Calibri" panose="020F0502020204030204" pitchFamily="34" charset="0"/>
+              </a:rPr>
+              <a:t>What is your usual pattern of trading? </a:t>
+            </a:r>
+            <a:endParaRPr lang="en-GB" sz="3600" b="0" i="0" u="none" strike="noStrike" dirty="0">
+              <a:effectLst/>
+              <a:latin typeface="Arial" panose="020B0604020202020204" pitchFamily="34" charset="0"/>
+            </a:endParaRPr>
+          </a:p>
+        </p:txBody>
+      </p:sp>
+      <p:sp>
+        <p:nvSpPr>
+          <p:cNvPr id="5" name="TextBox 4">
+            <a:extLst>
+              <a:ext uri="{FF2B5EF4-FFF2-40B4-BE49-F238E27FC236}">
+                <a16:creationId xmlns:a16="http://schemas.microsoft.com/office/drawing/2014/main" id="{B1795920-FDEC-8DE7-9031-83DD845C42C6}"/>
+              </a:ext>
+            </a:extLst>
+          </p:cNvPr>
+          <p:cNvSpPr txBox="1"/>
+          <p:nvPr/>
+        </p:nvSpPr>
+        <p:spPr>
+          <a:xfrm>
+            <a:off x="5891096" y="378075"/>
+            <a:ext cx="6101542" cy="276999"/>
+          </a:xfrm>
+          <a:prstGeom prst="rect">
+            <a:avLst/>
+          </a:prstGeom>
+          <a:noFill/>
+        </p:spPr>
+        <p:txBody>
+          <a:bodyPr wrap="square">
+            <a:spAutoFit/>
+          </a:bodyPr>
+          <a:lstStyle/>
+          <a:p>
+            <a:r>
+              <a:rPr lang="en-GB" sz="1200" b="0" i="0" dirty="0">
+                <a:effectLst/>
+              </a:rPr>
+              <a:t>Buy goats and sheep and sell</a:t>
+            </a:r>
+            <a:endParaRPr lang="en-US" sz="1200" dirty="0"/>
+          </a:p>
+        </p:txBody>
+      </p:sp>
+      <p:sp>
+        <p:nvSpPr>
+          <p:cNvPr id="6" name="Rectangle 1">
+            <a:extLst>
+              <a:ext uri="{FF2B5EF4-FFF2-40B4-BE49-F238E27FC236}">
+                <a16:creationId xmlns:a16="http://schemas.microsoft.com/office/drawing/2014/main" id="{B28BB157-91B6-0D9C-AC79-025675DDA6BB}"/>
+              </a:ext>
+            </a:extLst>
+          </p:cNvPr>
+          <p:cNvSpPr>
+            <a:spLocks noChangeArrowheads="1"/>
+          </p:cNvSpPr>
+          <p:nvPr/>
+        </p:nvSpPr>
+        <p:spPr bwMode="auto">
+          <a:xfrm>
+            <a:off x="5877042" y="734603"/>
+            <a:ext cx="5159258" cy="184666"/>
+          </a:xfrm>
+          <a:prstGeom prst="rect">
+            <a:avLst/>
+          </a:prstGeom>
+          <a:noFill/>
+          <a:ln>
+            <a:noFill/>
+          </a:ln>
+          <a:effectLst/>
+          <a:extLst>
+            <a:ext uri="{909E8E84-426E-40DD-AFC4-6F175D3DCCD1}">
+              <a14:hiddenFill xmlns:a14="http://schemas.microsoft.com/office/drawing/2010/main">
+                <a:solidFill>
+                  <a:schemeClr val="accent1"/>
+                </a:solidFill>
+              </a14:hiddenFill>
+            </a:ext>
+            <a:ext uri="{91240B29-F687-4F45-9708-019B960494DF}">
+              <a14:hiddenLine xmlns:a14="http://schemas.microsoft.com/office/drawing/2010/main" w="9525">
+                <a:solidFill>
+                  <a:schemeClr val="tx1"/>
+                </a:solidFill>
+                <a:miter lim="800000"/>
+                <a:headEnd/>
+                <a:tailEnd/>
+              </a14:hiddenLine>
+            </a:ext>
+            <a:ext uri="{AF507438-7753-43E0-B8FC-AC1667EBCBE1}">
+              <a14:hiddenEffects xmlns:a14="http://schemas.microsoft.com/office/drawing/2010/main">
+                <a:effectLst>
+                  <a:outerShdw dist="35921" dir="2700000" algn="ctr" rotWithShape="0">
+                    <a:schemeClr val="bg2"/>
+                  </a:outerShdw>
+                </a:effectLst>
+              </a14:hiddenEffects>
+            </a:ext>
+          </a:extLst>
+        </p:spPr>
+        <p:txBody>
+          <a:bodyPr vert="horz" wrap="square" lIns="0" tIns="0" rIns="0" bIns="0" numCol="1" anchor="ctr" anchorCtr="0" compatLnSpc="1">
+            <a:prstTxWarp prst="textNoShape">
+              <a:avLst/>
+            </a:prstTxWarp>
+            <a:spAutoFit/>
+          </a:bodyPr>
+          <a:lstStyle>
+            <a:lvl1pPr eaLnBrk="0" fontAlgn="base" hangingPunct="0">
+              <a:spcBef>
+                <a:spcPct val="0"/>
+              </a:spcBef>
+              <a:spcAft>
+                <a:spcPct val="0"/>
+              </a:spcAft>
+              <a:defRPr>
+                <a:solidFill>
+                  <a:schemeClr val="tx1"/>
+                </a:solidFill>
+                <a:latin typeface="Arial" panose="020B0604020202020204" pitchFamily="34" charset="0"/>
+              </a:defRPr>
+            </a:lvl1pPr>
+            <a:lvl2pPr eaLnBrk="0" fontAlgn="base" hangingPunct="0">
+              <a:spcBef>
+                <a:spcPct val="0"/>
+              </a:spcBef>
+              <a:spcAft>
+                <a:spcPct val="0"/>
+              </a:spcAft>
+              <a:defRPr>
+                <a:solidFill>
+                  <a:schemeClr val="tx1"/>
+                </a:solidFill>
+                <a:latin typeface="Arial" panose="020B0604020202020204" pitchFamily="34" charset="0"/>
+              </a:defRPr>
+            </a:lvl2pPr>
+            <a:lvl3pPr eaLnBrk="0" fontAlgn="base" hangingPunct="0">
+              <a:spcBef>
+                <a:spcPct val="0"/>
+              </a:spcBef>
+              <a:spcAft>
+                <a:spcPct val="0"/>
+              </a:spcAft>
+              <a:defRPr>
+                <a:solidFill>
+                  <a:schemeClr val="tx1"/>
+                </a:solidFill>
+                <a:latin typeface="Arial" panose="020B0604020202020204" pitchFamily="34" charset="0"/>
+              </a:defRPr>
+            </a:lvl3pPr>
+            <a:lvl4pPr eaLnBrk="0" fontAlgn="base" hangingPunct="0">
+              <a:spcBef>
+                <a:spcPct val="0"/>
+              </a:spcBef>
+              <a:spcAft>
+                <a:spcPct val="0"/>
+              </a:spcAft>
+              <a:defRPr>
+                <a:solidFill>
+                  <a:schemeClr val="tx1"/>
+                </a:solidFill>
+                <a:latin typeface="Arial" panose="020B0604020202020204" pitchFamily="34" charset="0"/>
+              </a:defRPr>
+            </a:lvl4pPr>
+            <a:lvl5pPr eaLnBrk="0" fontAlgn="base" hangingPunct="0">
+              <a:spcBef>
+                <a:spcPct val="0"/>
+              </a:spcBef>
+              <a:spcAft>
+                <a:spcPct val="0"/>
+              </a:spcAft>
+              <a:defRPr>
+                <a:solidFill>
+                  <a:schemeClr val="tx1"/>
+                </a:solidFill>
+                <a:latin typeface="Arial" panose="020B0604020202020204" pitchFamily="34" charset="0"/>
+              </a:defRPr>
+            </a:lvl5pPr>
+            <a:lvl6pPr eaLnBrk="0" fontAlgn="base" hangingPunct="0">
+              <a:spcBef>
+                <a:spcPct val="0"/>
+              </a:spcBef>
+              <a:spcAft>
+                <a:spcPct val="0"/>
+              </a:spcAft>
+              <a:defRPr>
+                <a:solidFill>
+                  <a:schemeClr val="tx1"/>
+                </a:solidFill>
+                <a:latin typeface="Arial" panose="020B0604020202020204" pitchFamily="34" charset="0"/>
+              </a:defRPr>
+            </a:lvl6pPr>
+            <a:lvl7pPr eaLnBrk="0" fontAlgn="base" hangingPunct="0">
+              <a:spcBef>
+                <a:spcPct val="0"/>
+              </a:spcBef>
+              <a:spcAft>
+                <a:spcPct val="0"/>
+              </a:spcAft>
+              <a:defRPr>
+                <a:solidFill>
+                  <a:schemeClr val="tx1"/>
+                </a:solidFill>
+                <a:latin typeface="Arial" panose="020B0604020202020204" pitchFamily="34" charset="0"/>
+              </a:defRPr>
+            </a:lvl7pPr>
+            <a:lvl8pPr eaLnBrk="0" fontAlgn="base" hangingPunct="0">
+              <a:spcBef>
+                <a:spcPct val="0"/>
+              </a:spcBef>
+              <a:spcAft>
+                <a:spcPct val="0"/>
+              </a:spcAft>
+              <a:defRPr>
+                <a:solidFill>
+                  <a:schemeClr val="tx1"/>
+                </a:solidFill>
+                <a:latin typeface="Arial" panose="020B0604020202020204" pitchFamily="34" charset="0"/>
+              </a:defRPr>
+            </a:lvl8pPr>
+            <a:lvl9pPr eaLnBrk="0" fontAlgn="base" hangingPunct="0">
+              <a:spcBef>
+                <a:spcPct val="0"/>
+              </a:spcBef>
+              <a:spcAft>
+                <a:spcPct val="0"/>
+              </a:spcAft>
+              <a:defRPr>
+                <a:solidFill>
+                  <a:schemeClr val="tx1"/>
+                </a:solidFill>
+                <a:latin typeface="Arial" panose="020B0604020202020204" pitchFamily="34" charset="0"/>
+              </a:defRPr>
+            </a:lvl9pPr>
+          </a:lstStyle>
+          <a:p>
+            <a:pPr marL="0" marR="0" lvl="0" indent="0" algn="l" defTabSz="914400" rtl="0" eaLnBrk="0" fontAlgn="base" latinLnBrk="0" hangingPunct="0">
+              <a:lnSpc>
+                <a:spcPct val="100000"/>
+              </a:lnSpc>
+              <a:spcBef>
+                <a:spcPct val="0"/>
+              </a:spcBef>
+              <a:spcAft>
+                <a:spcPct val="0"/>
+              </a:spcAft>
+              <a:buClrTx/>
+              <a:buSzTx/>
+              <a:buFontTx/>
+              <a:buNone/>
+              <a:tabLst/>
+            </a:pPr>
+            <a:r>
+              <a:rPr kumimoji="0" lang="en-US" altLang="en-US" sz="1200" b="0" i="0" u="none" strike="noStrike" cap="none" normalizeH="0" baseline="0" dirty="0">
+                <a:ln>
+                  <a:noFill/>
+                </a:ln>
+                <a:effectLst/>
+                <a:latin typeface="+mn-lt"/>
+              </a:rPr>
+              <a:t>Managing the sale of livestock between the owner and the seller</a:t>
+            </a:r>
+          </a:p>
+        </p:txBody>
+      </p:sp>
+      <p:sp>
+        <p:nvSpPr>
+          <p:cNvPr id="8" name="TextBox 7">
+            <a:extLst>
+              <a:ext uri="{FF2B5EF4-FFF2-40B4-BE49-F238E27FC236}">
+                <a16:creationId xmlns:a16="http://schemas.microsoft.com/office/drawing/2014/main" id="{B8092081-CD7F-20A8-F125-31E80DF8FF12}"/>
+              </a:ext>
+            </a:extLst>
+          </p:cNvPr>
+          <p:cNvSpPr txBox="1"/>
+          <p:nvPr/>
+        </p:nvSpPr>
+        <p:spPr>
+          <a:xfrm>
+            <a:off x="5735407" y="1053235"/>
+            <a:ext cx="5442528" cy="461665"/>
+          </a:xfrm>
+          <a:prstGeom prst="rect">
+            <a:avLst/>
+          </a:prstGeom>
+          <a:noFill/>
+        </p:spPr>
+        <p:txBody>
+          <a:bodyPr wrap="square">
+            <a:spAutoFit/>
+          </a:bodyPr>
+          <a:lstStyle/>
+          <a:p>
+            <a:r>
+              <a:rPr lang="en-GB" sz="1200" b="0" i="0" dirty="0">
+                <a:solidFill>
+                  <a:srgbClr val="202124"/>
+                </a:solidFill>
+                <a:effectLst/>
+              </a:rPr>
+              <a:t>I buy goats/sheep from other breeders and then I give them to people who ask me to take them to the auction to sell them</a:t>
+            </a:r>
+            <a:endParaRPr lang="en-US" sz="1200" dirty="0"/>
+          </a:p>
+        </p:txBody>
+      </p:sp>
+      <p:sp>
+        <p:nvSpPr>
+          <p:cNvPr id="10" name="TextBox 9">
+            <a:extLst>
+              <a:ext uri="{FF2B5EF4-FFF2-40B4-BE49-F238E27FC236}">
+                <a16:creationId xmlns:a16="http://schemas.microsoft.com/office/drawing/2014/main" id="{FB9AEF80-B42B-5C71-9C14-BB832145C363}"/>
+              </a:ext>
+            </a:extLst>
+          </p:cNvPr>
+          <p:cNvSpPr txBox="1"/>
+          <p:nvPr/>
+        </p:nvSpPr>
+        <p:spPr>
+          <a:xfrm>
+            <a:off x="5735407" y="1593216"/>
+            <a:ext cx="6101542" cy="461665"/>
+          </a:xfrm>
+          <a:prstGeom prst="rect">
+            <a:avLst/>
+          </a:prstGeom>
+          <a:noFill/>
+        </p:spPr>
+        <p:txBody>
+          <a:bodyPr wrap="square">
+            <a:spAutoFit/>
+          </a:bodyPr>
+          <a:lstStyle/>
+          <a:p>
+            <a:r>
+              <a:rPr lang="en-GB" sz="1200" dirty="0"/>
+              <a:t>I buy goats/sheep from breeders at their homes or before they arrive at the auction and then I take them to the auction that day and sell them at a profitable price</a:t>
+            </a:r>
+            <a:endParaRPr lang="en-US" sz="1200" dirty="0"/>
+          </a:p>
+        </p:txBody>
+      </p:sp>
+    </p:spTree>
+    <p:extLst>
+      <p:ext uri="{BB962C8B-B14F-4D97-AF65-F5344CB8AC3E}">
+        <p14:creationId xmlns:p14="http://schemas.microsoft.com/office/powerpoint/2010/main" val="1856209872"/>
+      </p:ext>
+    </p:extLst>
+  </p:cSld>
+  <p:clrMapOvr>
+    <a:masterClrMapping/>
+  </p:clrMapOvr>
+</p:sld>
+</file>
+
+<file path=ppt/slides/slide17.xml><?xml version="1.0" encoding="utf-8"?>
 <p:sld xmlns:a="http://schemas.openxmlformats.org/drawingml/2006/main" xmlns:r="http://schemas.openxmlformats.org/officeDocument/2006/relationships" xmlns:p="http://schemas.openxmlformats.org/presentationml/2006/main">
   <p:cSld>
     <p:spTree>
@@ -12322,7 +13409,7 @@
 </p:sld>
 </file>
 
-<file path=ppt/slides/slide15.xml><?xml version="1.0" encoding="utf-8"?>
+<file path=ppt/slides/slide18.xml><?xml version="1.0" encoding="utf-8"?>
 <p:sld xmlns:a="http://schemas.openxmlformats.org/drawingml/2006/main" xmlns:r="http://schemas.openxmlformats.org/officeDocument/2006/relationships" xmlns:p="http://schemas.openxmlformats.org/presentationml/2006/main">
   <p:cSld>
     <p:bg>
@@ -16149,7 +17236,7 @@
 </p:sld>
 </file>
 
-<file path=ppt/slides/slide16.xml><?xml version="1.0" encoding="utf-8"?>
+<file path=ppt/slides/slide19.xml><?xml version="1.0" encoding="utf-8"?>
 <p:sld xmlns:a="http://schemas.openxmlformats.org/drawingml/2006/main" xmlns:r="http://schemas.openxmlformats.org/officeDocument/2006/relationships" xmlns:p="http://schemas.openxmlformats.org/presentationml/2006/main">
   <p:cSld>
     <p:spTree>
@@ -16277,7 +17364,112 @@
 </p:sld>
 </file>
 
-<file path=ppt/slides/slide17.xml><?xml version="1.0" encoding="utf-8"?>
+<file path=ppt/slides/slide2.xml><?xml version="1.0" encoding="utf-8"?>
+<p:sld xmlns:a="http://schemas.openxmlformats.org/drawingml/2006/main" xmlns:r="http://schemas.openxmlformats.org/officeDocument/2006/relationships" xmlns:p="http://schemas.openxmlformats.org/presentationml/2006/main">
+  <p:cSld>
+    <p:spTree>
+      <p:nvGrpSpPr>
+        <p:cNvPr id="1" name=""/>
+        <p:cNvGrpSpPr/>
+        <p:nvPr/>
+      </p:nvGrpSpPr>
+      <p:grpSpPr>
+        <a:xfrm>
+          <a:off x="0" y="0"/>
+          <a:ext cx="0" cy="0"/>
+          <a:chOff x="0" y="0"/>
+          <a:chExt cx="0" cy="0"/>
+        </a:xfrm>
+      </p:grpSpPr>
+      <p:sp>
+        <p:nvSpPr>
+          <p:cNvPr id="2" name="Title 1">
+            <a:extLst>
+              <a:ext uri="{FF2B5EF4-FFF2-40B4-BE49-F238E27FC236}">
+                <a16:creationId xmlns:a16="http://schemas.microsoft.com/office/drawing/2014/main" id="{2BAA5BAB-5857-7AE3-D092-2A52BA1D0C91}"/>
+              </a:ext>
+            </a:extLst>
+          </p:cNvPr>
+          <p:cNvSpPr>
+            <a:spLocks noGrp="1"/>
+          </p:cNvSpPr>
+          <p:nvPr>
+            <p:ph type="title"/>
+          </p:nvPr>
+        </p:nvSpPr>
+        <p:spPr/>
+        <p:txBody>
+          <a:bodyPr/>
+          <a:lstStyle/>
+          <a:p>
+            <a:r>
+              <a:rPr lang="en-US" dirty="0"/>
+              <a:t>Market Survey A: General Info</a:t>
+            </a:r>
+          </a:p>
+        </p:txBody>
+      </p:sp>
+      <p:sp>
+        <p:nvSpPr>
+          <p:cNvPr id="3" name="Text Placeholder 2">
+            <a:extLst>
+              <a:ext uri="{FF2B5EF4-FFF2-40B4-BE49-F238E27FC236}">
+                <a16:creationId xmlns:a16="http://schemas.microsoft.com/office/drawing/2014/main" id="{C87E6E83-7EBD-C2D2-8C4A-5E79025FC239}"/>
+              </a:ext>
+            </a:extLst>
+          </p:cNvPr>
+          <p:cNvSpPr>
+            <a:spLocks noGrp="1"/>
+          </p:cNvSpPr>
+          <p:nvPr>
+            <p:ph type="body" idx="1"/>
+          </p:nvPr>
+        </p:nvSpPr>
+        <p:spPr/>
+        <p:txBody>
+          <a:bodyPr/>
+          <a:lstStyle/>
+          <a:p>
+            <a:r>
+              <a:rPr lang="en-US" dirty="0"/>
+              <a:t>NB See .</a:t>
+            </a:r>
+            <a:r>
+              <a:rPr lang="en-US" dirty="0" err="1"/>
+              <a:t>Rmd</a:t>
+            </a:r>
+            <a:r>
+              <a:rPr lang="en-US" dirty="0"/>
+              <a:t> file for </a:t>
+            </a:r>
+            <a:r>
+              <a:rPr lang="en-US" dirty="0" err="1"/>
+              <a:t>mrkta</a:t>
+            </a:r>
+            <a:r>
+              <a:rPr lang="en-US" dirty="0"/>
+              <a:t> survey - PDF</a:t>
+            </a:r>
+          </a:p>
+          <a:p>
+            <a:endParaRPr lang="en-US" dirty="0"/>
+          </a:p>
+        </p:txBody>
+      </p:sp>
+    </p:spTree>
+    <p:extLst>
+      <p:ext uri="{BB962C8B-B14F-4D97-AF65-F5344CB8AC3E}">
+        <p14:creationId xmlns:p14="http://schemas.microsoft.com/office/powerpoint/2010/main" val="392625433"/>
+      </p:ext>
+    </p:extLst>
+  </p:cSld>
+  <p:clrMapOvr>
+    <a:masterClrMapping/>
+  </p:clrMapOvr>
+</p:sld>
+</file>
+
+<file path=ppt/slides/slide20.xml><?xml version="1.0" encoding="utf-8"?>
 <p:sld xmlns:a="http://schemas.openxmlformats.org/drawingml/2006/main" xmlns:r="http://schemas.openxmlformats.org/officeDocument/2006/relationships" xmlns:p="http://schemas.openxmlformats.org/presentationml/2006/main">
   <p:cSld>
     <p:spTree>
@@ -16440,7 +17632,7 @@
 </p:sld>
 </file>
 
-<file path=ppt/slides/slide18.xml><?xml version="1.0" encoding="utf-8"?>
+<file path=ppt/slides/slide21.xml><?xml version="1.0" encoding="utf-8"?>
 <p:sld xmlns:a="http://schemas.openxmlformats.org/drawingml/2006/main" xmlns:r="http://schemas.openxmlformats.org/officeDocument/2006/relationships" xmlns:p="http://schemas.openxmlformats.org/presentationml/2006/main">
   <p:cSld>
     <p:spTree>
@@ -16732,7 +17924,7 @@
 </p:sld>
 </file>
 
-<file path=ppt/slides/slide19.xml><?xml version="1.0" encoding="utf-8"?>
+<file path=ppt/slides/slide22.xml><?xml version="1.0" encoding="utf-8"?>
 <p:sld xmlns:a="http://schemas.openxmlformats.org/drawingml/2006/main" xmlns:r="http://schemas.openxmlformats.org/officeDocument/2006/relationships" xmlns:p="http://schemas.openxmlformats.org/presentationml/2006/main">
   <p:cSld>
     <p:spTree>
@@ -16856,89 +18048,6 @@
     <p:extLst>
       <p:ext uri="{BB962C8B-B14F-4D97-AF65-F5344CB8AC3E}">
         <p14:creationId xmlns:p14="http://schemas.microsoft.com/office/powerpoint/2010/main" val="1754598004"/>
-      </p:ext>
-    </p:extLst>
-  </p:cSld>
-  <p:clrMapOvr>
-    <a:masterClrMapping/>
-  </p:clrMapOvr>
-</p:sld>
-</file>
-
-<file path=ppt/slides/slide2.xml><?xml version="1.0" encoding="utf-8"?>
-<p:sld xmlns:a="http://schemas.openxmlformats.org/drawingml/2006/main" xmlns:r="http://schemas.openxmlformats.org/officeDocument/2006/relationships" xmlns:p="http://schemas.openxmlformats.org/presentationml/2006/main">
-  <p:cSld>
-    <p:spTree>
-      <p:nvGrpSpPr>
-        <p:cNvPr id="1" name=""/>
-        <p:cNvGrpSpPr/>
-        <p:nvPr/>
-      </p:nvGrpSpPr>
-      <p:grpSpPr>
-        <a:xfrm>
-          <a:off x="0" y="0"/>
-          <a:ext cx="0" cy="0"/>
-          <a:chOff x="0" y="0"/>
-          <a:chExt cx="0" cy="0"/>
-        </a:xfrm>
-      </p:grpSpPr>
-      <p:sp>
-        <p:nvSpPr>
-          <p:cNvPr id="2" name="Title 1">
-            <a:extLst>
-              <a:ext uri="{FF2B5EF4-FFF2-40B4-BE49-F238E27FC236}">
-                <a16:creationId xmlns:a16="http://schemas.microsoft.com/office/drawing/2014/main" id="{2BAA5BAB-5857-7AE3-D092-2A52BA1D0C91}"/>
-              </a:ext>
-            </a:extLst>
-          </p:cNvPr>
-          <p:cNvSpPr>
-            <a:spLocks noGrp="1"/>
-          </p:cNvSpPr>
-          <p:nvPr>
-            <p:ph type="title"/>
-          </p:nvPr>
-        </p:nvSpPr>
-        <p:spPr/>
-        <p:txBody>
-          <a:bodyPr/>
-          <a:lstStyle/>
-          <a:p>
-            <a:r>
-              <a:rPr lang="en-US" dirty="0"/>
-              <a:t>Market Survey A: General Info</a:t>
-            </a:r>
-          </a:p>
-        </p:txBody>
-      </p:sp>
-      <p:sp>
-        <p:nvSpPr>
-          <p:cNvPr id="3" name="Text Placeholder 2">
-            <a:extLst>
-              <a:ext uri="{FF2B5EF4-FFF2-40B4-BE49-F238E27FC236}">
-                <a16:creationId xmlns:a16="http://schemas.microsoft.com/office/drawing/2014/main" id="{C87E6E83-7EBD-C2D2-8C4A-5E79025FC239}"/>
-              </a:ext>
-            </a:extLst>
-          </p:cNvPr>
-          <p:cNvSpPr>
-            <a:spLocks noGrp="1"/>
-          </p:cNvSpPr>
-          <p:nvPr>
-            <p:ph type="body" idx="1"/>
-          </p:nvPr>
-        </p:nvSpPr>
-        <p:spPr/>
-        <p:txBody>
-          <a:bodyPr/>
-          <a:lstStyle/>
-          <a:p>
-            <a:endParaRPr lang="en-US"/>
-          </a:p>
-        </p:txBody>
-      </p:sp>
-    </p:spTree>
-    <p:extLst>
-      <p:ext uri="{BB962C8B-B14F-4D97-AF65-F5344CB8AC3E}">
-        <p14:creationId xmlns:p14="http://schemas.microsoft.com/office/powerpoint/2010/main" val="392625433"/>
       </p:ext>
     </p:extLst>
   </p:cSld>
@@ -17100,8 +18209,8 @@
           </a:prstGeom>
         </p:spPr>
       </p:pic>
-      <mc:AlternateContent xmlns:mc="http://schemas.openxmlformats.org/markup-compatibility/2006">
-        <mc:Choice xmlns:p14="http://schemas.microsoft.com/office/powerpoint/2010/main" Requires="p14">
+      <mc:AlternateContent xmlns:mc="http://schemas.openxmlformats.org/markup-compatibility/2006" xmlns:p14="http://schemas.microsoft.com/office/powerpoint/2010/main">
+        <mc:Choice Requires="p14">
           <p:contentPart p14:bwMode="auto" r:id="rId3">
             <p14:nvContentPartPr>
               <p14:cNvPr id="9" name="Ink 8">
@@ -17120,7 +18229,7 @@
             </p14:xfrm>
           </p:contentPart>
         </mc:Choice>
-        <mc:Fallback>
+        <mc:Fallback xmlns="">
           <p:pic>
             <p:nvPicPr>
               <p:cNvPr id="9" name="Ink 8">
@@ -17151,8 +18260,8 @@
           </p:pic>
         </mc:Fallback>
       </mc:AlternateContent>
-      <mc:AlternateContent xmlns:mc="http://schemas.openxmlformats.org/markup-compatibility/2006">
-        <mc:Choice xmlns:p14="http://schemas.microsoft.com/office/powerpoint/2010/main" Requires="p14">
+      <mc:AlternateContent xmlns:mc="http://schemas.openxmlformats.org/markup-compatibility/2006" xmlns:p14="http://schemas.microsoft.com/office/powerpoint/2010/main">
+        <mc:Choice Requires="p14">
           <p:contentPart p14:bwMode="auto" r:id="rId5">
             <p14:nvContentPartPr>
               <p14:cNvPr id="12" name="Ink 11">
@@ -17171,7 +18280,7 @@
             </p14:xfrm>
           </p:contentPart>
         </mc:Choice>
-        <mc:Fallback>
+        <mc:Fallback xmlns="">
           <p:pic>
             <p:nvPicPr>
               <p:cNvPr id="12" name="Ink 11">
@@ -17202,8 +18311,8 @@
           </p:pic>
         </mc:Fallback>
       </mc:AlternateContent>
-      <mc:AlternateContent xmlns:mc="http://schemas.openxmlformats.org/markup-compatibility/2006">
-        <mc:Choice xmlns:p14="http://schemas.microsoft.com/office/powerpoint/2010/main" Requires="p14">
+      <mc:AlternateContent xmlns:mc="http://schemas.openxmlformats.org/markup-compatibility/2006" xmlns:p14="http://schemas.microsoft.com/office/powerpoint/2010/main">
+        <mc:Choice Requires="p14">
           <p:contentPart p14:bwMode="auto" r:id="rId7">
             <p14:nvContentPartPr>
               <p14:cNvPr id="13" name="Ink 12">
@@ -17222,7 +18331,7 @@
             </p14:xfrm>
           </p:contentPart>
         </mc:Choice>
-        <mc:Fallback>
+        <mc:Fallback xmlns="">
           <p:pic>
             <p:nvPicPr>
               <p:cNvPr id="13" name="Ink 12">
@@ -17253,8 +18362,8 @@
           </p:pic>
         </mc:Fallback>
       </mc:AlternateContent>
-      <mc:AlternateContent xmlns:mc="http://schemas.openxmlformats.org/markup-compatibility/2006">
-        <mc:Choice xmlns:p14="http://schemas.microsoft.com/office/powerpoint/2010/main" Requires="p14">
+      <mc:AlternateContent xmlns:mc="http://schemas.openxmlformats.org/markup-compatibility/2006" xmlns:p14="http://schemas.microsoft.com/office/powerpoint/2010/main">
+        <mc:Choice Requires="p14">
           <p:contentPart p14:bwMode="auto" r:id="rId9">
             <p14:nvContentPartPr>
               <p14:cNvPr id="14" name="Ink 13">
@@ -17273,7 +18382,7 @@
             </p14:xfrm>
           </p:contentPart>
         </mc:Choice>
-        <mc:Fallback>
+        <mc:Fallback xmlns="">
           <p:pic>
             <p:nvPicPr>
               <p:cNvPr id="14" name="Ink 13">
@@ -17304,8 +18413,8 @@
           </p:pic>
         </mc:Fallback>
       </mc:AlternateContent>
-      <mc:AlternateContent xmlns:mc="http://schemas.openxmlformats.org/markup-compatibility/2006">
-        <mc:Choice xmlns:p14="http://schemas.microsoft.com/office/powerpoint/2010/main" Requires="p14">
+      <mc:AlternateContent xmlns:mc="http://schemas.openxmlformats.org/markup-compatibility/2006" xmlns:p14="http://schemas.microsoft.com/office/powerpoint/2010/main">
+        <mc:Choice Requires="p14">
           <p:contentPart p14:bwMode="auto" r:id="rId11">
             <p14:nvContentPartPr>
               <p14:cNvPr id="15" name="Ink 14">
@@ -17324,7 +18433,7 @@
             </p14:xfrm>
           </p:contentPart>
         </mc:Choice>
-        <mc:Fallback>
+        <mc:Fallback xmlns="">
           <p:pic>
             <p:nvPicPr>
               <p:cNvPr id="15" name="Ink 14">
@@ -17355,8 +18464,8 @@
           </p:pic>
         </mc:Fallback>
       </mc:AlternateContent>
-      <mc:AlternateContent xmlns:mc="http://schemas.openxmlformats.org/markup-compatibility/2006">
-        <mc:Choice xmlns:p14="http://schemas.microsoft.com/office/powerpoint/2010/main" Requires="p14">
+      <mc:AlternateContent xmlns:mc="http://schemas.openxmlformats.org/markup-compatibility/2006" xmlns:p14="http://schemas.microsoft.com/office/powerpoint/2010/main">
+        <mc:Choice Requires="p14">
           <p:contentPart p14:bwMode="auto" r:id="rId13">
             <p14:nvContentPartPr>
               <p14:cNvPr id="16" name="Ink 15">
@@ -17375,7 +18484,7 @@
             </p14:xfrm>
           </p:contentPart>
         </mc:Choice>
-        <mc:Fallback>
+        <mc:Fallback xmlns="">
           <p:pic>
             <p:nvPicPr>
               <p:cNvPr id="16" name="Ink 15">
@@ -17406,8 +18515,8 @@
           </p:pic>
         </mc:Fallback>
       </mc:AlternateContent>
-      <mc:AlternateContent xmlns:mc="http://schemas.openxmlformats.org/markup-compatibility/2006">
-        <mc:Choice xmlns:p14="http://schemas.microsoft.com/office/powerpoint/2010/main" Requires="p14">
+      <mc:AlternateContent xmlns:mc="http://schemas.openxmlformats.org/markup-compatibility/2006" xmlns:p14="http://schemas.microsoft.com/office/powerpoint/2010/main">
+        <mc:Choice Requires="p14">
           <p:contentPart p14:bwMode="auto" r:id="rId15">
             <p14:nvContentPartPr>
               <p14:cNvPr id="17" name="Ink 16">
@@ -17426,7 +18535,7 @@
             </p14:xfrm>
           </p:contentPart>
         </mc:Choice>
-        <mc:Fallback>
+        <mc:Fallback xmlns="">
           <p:pic>
             <p:nvPicPr>
               <p:cNvPr id="17" name="Ink 16">
@@ -17457,8 +18566,8 @@
           </p:pic>
         </mc:Fallback>
       </mc:AlternateContent>
-      <mc:AlternateContent xmlns:mc="http://schemas.openxmlformats.org/markup-compatibility/2006">
-        <mc:Choice xmlns:p14="http://schemas.microsoft.com/office/powerpoint/2010/main" Requires="p14">
+      <mc:AlternateContent xmlns:mc="http://schemas.openxmlformats.org/markup-compatibility/2006" xmlns:p14="http://schemas.microsoft.com/office/powerpoint/2010/main">
+        <mc:Choice Requires="p14">
           <p:contentPart p14:bwMode="auto" r:id="rId17">
             <p14:nvContentPartPr>
               <p14:cNvPr id="18" name="Ink 17">
@@ -17477,7 +18586,7 @@
             </p14:xfrm>
           </p:contentPart>
         </mc:Choice>
-        <mc:Fallback>
+        <mc:Fallback xmlns="">
           <p:pic>
             <p:nvPicPr>
               <p:cNvPr id="18" name="Ink 17">
@@ -17508,8 +18617,8 @@
           </p:pic>
         </mc:Fallback>
       </mc:AlternateContent>
-      <mc:AlternateContent xmlns:mc="http://schemas.openxmlformats.org/markup-compatibility/2006">
-        <mc:Choice xmlns:p14="http://schemas.microsoft.com/office/powerpoint/2010/main" Requires="p14">
+      <mc:AlternateContent xmlns:mc="http://schemas.openxmlformats.org/markup-compatibility/2006" xmlns:p14="http://schemas.microsoft.com/office/powerpoint/2010/main">
+        <mc:Choice Requires="p14">
           <p:contentPart p14:bwMode="auto" r:id="rId19">
             <p14:nvContentPartPr>
               <p14:cNvPr id="19" name="Ink 18">
@@ -17528,7 +18637,7 @@
             </p14:xfrm>
           </p:contentPart>
         </mc:Choice>
-        <mc:Fallback>
+        <mc:Fallback xmlns="">
           <p:pic>
             <p:nvPicPr>
               <p:cNvPr id="19" name="Ink 18">
@@ -17559,8 +18668,8 @@
           </p:pic>
         </mc:Fallback>
       </mc:AlternateContent>
-      <mc:AlternateContent xmlns:mc="http://schemas.openxmlformats.org/markup-compatibility/2006">
-        <mc:Choice xmlns:p14="http://schemas.microsoft.com/office/powerpoint/2010/main" Requires="p14">
+      <mc:AlternateContent xmlns:mc="http://schemas.openxmlformats.org/markup-compatibility/2006" xmlns:p14="http://schemas.microsoft.com/office/powerpoint/2010/main">
+        <mc:Choice Requires="p14">
           <p:contentPart p14:bwMode="auto" r:id="rId21">
             <p14:nvContentPartPr>
               <p14:cNvPr id="20" name="Ink 19">
@@ -17579,7 +18688,7 @@
             </p14:xfrm>
           </p:contentPart>
         </mc:Choice>
-        <mc:Fallback>
+        <mc:Fallback xmlns="">
           <p:pic>
             <p:nvPicPr>
               <p:cNvPr id="20" name="Ink 19">
@@ -17610,8 +18719,8 @@
           </p:pic>
         </mc:Fallback>
       </mc:AlternateContent>
-      <mc:AlternateContent xmlns:mc="http://schemas.openxmlformats.org/markup-compatibility/2006">
-        <mc:Choice xmlns:p14="http://schemas.microsoft.com/office/powerpoint/2010/main" Requires="p14">
+      <mc:AlternateContent xmlns:mc="http://schemas.openxmlformats.org/markup-compatibility/2006" xmlns:p14="http://schemas.microsoft.com/office/powerpoint/2010/main">
+        <mc:Choice Requires="p14">
           <p:contentPart p14:bwMode="auto" r:id="rId23">
             <p14:nvContentPartPr>
               <p14:cNvPr id="21" name="Ink 20">
@@ -17630,7 +18739,7 @@
             </p14:xfrm>
           </p:contentPart>
         </mc:Choice>
-        <mc:Fallback>
+        <mc:Fallback xmlns="">
           <p:pic>
             <p:nvPicPr>
               <p:cNvPr id="21" name="Ink 20">
@@ -17661,8 +18770,8 @@
           </p:pic>
         </mc:Fallback>
       </mc:AlternateContent>
-      <mc:AlternateContent xmlns:mc="http://schemas.openxmlformats.org/markup-compatibility/2006">
-        <mc:Choice xmlns:p14="http://schemas.microsoft.com/office/powerpoint/2010/main" Requires="p14">
+      <mc:AlternateContent xmlns:mc="http://schemas.openxmlformats.org/markup-compatibility/2006" xmlns:p14="http://schemas.microsoft.com/office/powerpoint/2010/main">
+        <mc:Choice Requires="p14">
           <p:contentPart p14:bwMode="auto" r:id="rId25">
             <p14:nvContentPartPr>
               <p14:cNvPr id="22" name="Ink 21">
@@ -17681,7 +18790,7 @@
             </p14:xfrm>
           </p:contentPart>
         </mc:Choice>
-        <mc:Fallback>
+        <mc:Fallback xmlns="">
           <p:pic>
             <p:nvPicPr>
               <p:cNvPr id="22" name="Ink 21">
@@ -20770,41 +21879,6 @@
           <a:chExt cx="0" cy="0"/>
         </a:xfrm>
       </p:grpSpPr>
-      <p:sp>
-        <p:nvSpPr>
-          <p:cNvPr id="3" name="TextBox 2">
-            <a:extLst>
-              <a:ext uri="{FF2B5EF4-FFF2-40B4-BE49-F238E27FC236}">
-                <a16:creationId xmlns:a16="http://schemas.microsoft.com/office/drawing/2014/main" id="{A8C90FDC-FC4D-F865-BC11-0C79E2BBD37F}"/>
-              </a:ext>
-            </a:extLst>
-          </p:cNvPr>
-          <p:cNvSpPr txBox="1"/>
-          <p:nvPr/>
-        </p:nvSpPr>
-        <p:spPr>
-          <a:xfrm>
-            <a:off x="173829" y="1620321"/>
-            <a:ext cx="2969419" cy="369332"/>
-          </a:xfrm>
-          <a:prstGeom prst="rect">
-            <a:avLst/>
-          </a:prstGeom>
-          <a:noFill/>
-        </p:spPr>
-        <p:txBody>
-          <a:bodyPr wrap="square" rtlCol="0">
-            <a:spAutoFit/>
-          </a:bodyPr>
-          <a:lstStyle/>
-          <a:p>
-            <a:r>
-              <a:rPr lang="en-US" b="1" dirty="0"/>
-              <a:t>Sheep and goat sales per day</a:t>
-            </a:r>
-          </a:p>
-        </p:txBody>
-      </p:sp>
       <p:pic>
         <p:nvPicPr>
           <p:cNvPr id="4" name="Picture 3">
@@ -20827,7 +21901,7 @@
         </p:blipFill>
         <p:spPr>
           <a:xfrm>
-            <a:off x="1658538" y="507445"/>
+            <a:off x="670720" y="507445"/>
             <a:ext cx="2667000" cy="660400"/>
           </a:xfrm>
           <a:prstGeom prst="rect">
@@ -20876,10 +21950,10 @@
       </p:sp>
       <p:pic>
         <p:nvPicPr>
-          <p:cNvPr id="6" name="Picture 5">
+          <p:cNvPr id="8" name="Picture 7">
             <a:extLst>
               <a:ext uri="{FF2B5EF4-FFF2-40B4-BE49-F238E27FC236}">
-                <a16:creationId xmlns:a16="http://schemas.microsoft.com/office/drawing/2014/main" id="{84DB210A-214E-42FB-1F62-1957759D69C3}"/>
+                <a16:creationId xmlns:a16="http://schemas.microsoft.com/office/drawing/2014/main" id="{0A6D6C4E-E34D-C7F7-F5EF-5DB63C6B58E4}"/>
               </a:ext>
             </a:extLst>
           </p:cNvPr>
@@ -20896,44 +21970,100 @@
         </p:blipFill>
         <p:spPr>
           <a:xfrm>
-            <a:off x="298448" y="2200829"/>
-            <a:ext cx="2844800" cy="901700"/>
+            <a:off x="4181081" y="504931"/>
+            <a:ext cx="7335042" cy="4430563"/>
           </a:xfrm>
           <a:prstGeom prst="rect">
             <a:avLst/>
           </a:prstGeom>
         </p:spPr>
       </p:pic>
-      <p:pic>
-        <p:nvPicPr>
-          <p:cNvPr id="8" name="Picture 7">
+      <p:grpSp>
+        <p:nvGrpSpPr>
+          <p:cNvPr id="7" name="Group 6">
             <a:extLst>
               <a:ext uri="{FF2B5EF4-FFF2-40B4-BE49-F238E27FC236}">
-                <a16:creationId xmlns:a16="http://schemas.microsoft.com/office/drawing/2014/main" id="{0A6D6C4E-E34D-C7F7-F5EF-5DB63C6B58E4}"/>
+                <a16:creationId xmlns:a16="http://schemas.microsoft.com/office/drawing/2014/main" id="{3EC226F9-5915-202A-D292-B93E3AE594A1}"/>
               </a:ext>
             </a:extLst>
           </p:cNvPr>
-          <p:cNvPicPr>
-            <a:picLocks noChangeAspect="1"/>
-          </p:cNvPicPr>
+          <p:cNvGrpSpPr/>
           <p:nvPr/>
-        </p:nvPicPr>
-        <p:blipFill>
-          <a:blip r:embed="rId5"/>
-          <a:stretch>
-            <a:fillRect/>
-          </a:stretch>
-        </p:blipFill>
-        <p:spPr>
+        </p:nvGrpSpPr>
+        <p:grpSpPr>
           <a:xfrm>
-            <a:off x="3397249" y="1734620"/>
-            <a:ext cx="7847013" cy="4739807"/>
+            <a:off x="322262" y="1908385"/>
+            <a:ext cx="3104358" cy="1314411"/>
+            <a:chOff x="233362" y="1677484"/>
+            <a:chExt cx="3104358" cy="1271032"/>
           </a:xfrm>
-          <a:prstGeom prst="rect">
-            <a:avLst/>
-          </a:prstGeom>
-        </p:spPr>
-      </p:pic>
+        </p:grpSpPr>
+        <p:sp>
+          <p:nvSpPr>
+            <p:cNvPr id="3" name="TextBox 2">
+              <a:extLst>
+                <a:ext uri="{FF2B5EF4-FFF2-40B4-BE49-F238E27FC236}">
+                  <a16:creationId xmlns:a16="http://schemas.microsoft.com/office/drawing/2014/main" id="{A8C90FDC-FC4D-F865-BC11-0C79E2BBD37F}"/>
+                </a:ext>
+              </a:extLst>
+            </p:cNvPr>
+            <p:cNvSpPr txBox="1"/>
+            <p:nvPr/>
+          </p:nvSpPr>
+          <p:spPr>
+            <a:xfrm>
+              <a:off x="233362" y="1677484"/>
+              <a:ext cx="2969419" cy="369332"/>
+            </a:xfrm>
+            <a:prstGeom prst="rect">
+              <a:avLst/>
+            </a:prstGeom>
+            <a:noFill/>
+          </p:spPr>
+          <p:txBody>
+            <a:bodyPr wrap="square" rtlCol="0">
+              <a:spAutoFit/>
+            </a:bodyPr>
+            <a:lstStyle/>
+            <a:p>
+              <a:r>
+                <a:rPr lang="en-US" b="1" dirty="0"/>
+                <a:t>Sheep and goat sales per day</a:t>
+              </a:r>
+            </a:p>
+          </p:txBody>
+        </p:sp>
+        <p:pic>
+          <p:nvPicPr>
+            <p:cNvPr id="6" name="Picture 5">
+              <a:extLst>
+                <a:ext uri="{FF2B5EF4-FFF2-40B4-BE49-F238E27FC236}">
+                  <a16:creationId xmlns:a16="http://schemas.microsoft.com/office/drawing/2014/main" id="{84DB210A-214E-42FB-1F62-1957759D69C3}"/>
+                </a:ext>
+              </a:extLst>
+            </p:cNvPr>
+            <p:cNvPicPr>
+              <a:picLocks noChangeAspect="1"/>
+            </p:cNvPicPr>
+            <p:nvPr/>
+          </p:nvPicPr>
+          <p:blipFill>
+            <a:blip r:embed="rId5"/>
+            <a:stretch>
+              <a:fillRect/>
+            </a:stretch>
+          </p:blipFill>
+          <p:spPr>
+            <a:xfrm>
+              <a:off x="492920" y="2046816"/>
+              <a:ext cx="2844800" cy="901700"/>
+            </a:xfrm>
+            <a:prstGeom prst="rect">
+              <a:avLst/>
+            </a:prstGeom>
+          </p:spPr>
+        </p:pic>
+      </p:grpSp>
     </p:spTree>
     <p:extLst>
       <p:ext uri="{BB962C8B-B14F-4D97-AF65-F5344CB8AC3E}">
@@ -20964,63 +22094,219 @@
           <a:chExt cx="0" cy="0"/>
         </a:xfrm>
       </p:grpSpPr>
-      <p:sp>
-        <p:nvSpPr>
-          <p:cNvPr id="2" name="Title 1">
+      <p:pic>
+        <p:nvPicPr>
+          <p:cNvPr id="2" name="Picture 1">
             <a:extLst>
               <a:ext uri="{FF2B5EF4-FFF2-40B4-BE49-F238E27FC236}">
-                <a16:creationId xmlns:a16="http://schemas.microsoft.com/office/drawing/2014/main" id="{2BAA5BAB-5857-7AE3-D092-2A52BA1D0C91}"/>
+                <a16:creationId xmlns:a16="http://schemas.microsoft.com/office/drawing/2014/main" id="{FF7E1392-F6C5-11ED-94B9-517EFACE9460}"/>
               </a:ext>
             </a:extLst>
           </p:cNvPr>
-          <p:cNvSpPr>
-            <a:spLocks noGrp="1"/>
-          </p:cNvSpPr>
-          <p:nvPr>
-            <p:ph type="title"/>
-          </p:nvPr>
+          <p:cNvPicPr>
+            <a:picLocks noChangeAspect="1"/>
+          </p:cNvPicPr>
+          <p:nvPr/>
+        </p:nvPicPr>
+        <p:blipFill>
+          <a:blip r:embed="rId2"/>
+          <a:stretch>
+            <a:fillRect/>
+          </a:stretch>
+        </p:blipFill>
+        <p:spPr>
+          <a:xfrm>
+            <a:off x="431800" y="3429000"/>
+            <a:ext cx="7099300" cy="2159000"/>
+          </a:xfrm>
+          <a:prstGeom prst="rect">
+            <a:avLst/>
+          </a:prstGeom>
+        </p:spPr>
+      </p:pic>
+      <p:pic>
+        <p:nvPicPr>
+          <p:cNvPr id="3" name="Picture 2">
+            <a:extLst>
+              <a:ext uri="{FF2B5EF4-FFF2-40B4-BE49-F238E27FC236}">
+                <a16:creationId xmlns:a16="http://schemas.microsoft.com/office/drawing/2014/main" id="{40787AB1-45E0-E1C7-9CFC-17B47FC3FE05}"/>
+              </a:ext>
+            </a:extLst>
+          </p:cNvPr>
+          <p:cNvPicPr>
+            <a:picLocks noChangeAspect="1"/>
+          </p:cNvPicPr>
+          <p:nvPr/>
+        </p:nvPicPr>
+        <p:blipFill>
+          <a:blip r:embed="rId3"/>
+          <a:stretch>
+            <a:fillRect/>
+          </a:stretch>
+        </p:blipFill>
+        <p:spPr>
+          <a:xfrm>
+            <a:off x="431800" y="693052"/>
+            <a:ext cx="5664200" cy="952500"/>
+          </a:xfrm>
+          <a:prstGeom prst="rect">
+            <a:avLst/>
+          </a:prstGeom>
+        </p:spPr>
+      </p:pic>
+      <p:sp>
+        <p:nvSpPr>
+          <p:cNvPr id="4" name="TextBox 3">
+            <a:extLst>
+              <a:ext uri="{FF2B5EF4-FFF2-40B4-BE49-F238E27FC236}">
+                <a16:creationId xmlns:a16="http://schemas.microsoft.com/office/drawing/2014/main" id="{2A3D1B9A-68F6-510B-162E-1BAB086EBD75}"/>
+              </a:ext>
+            </a:extLst>
+          </p:cNvPr>
+          <p:cNvSpPr txBox="1"/>
+          <p:nvPr/>
         </p:nvSpPr>
-        <p:spPr/>
+        <p:spPr>
+          <a:xfrm>
+            <a:off x="322262" y="230491"/>
+            <a:ext cx="4186238" cy="369332"/>
+          </a:xfrm>
+          <a:prstGeom prst="rect">
+            <a:avLst/>
+          </a:prstGeom>
+          <a:noFill/>
+        </p:spPr>
         <p:txBody>
-          <a:bodyPr/>
+          <a:bodyPr wrap="square" rtlCol="0">
+            <a:spAutoFit/>
+          </a:bodyPr>
           <a:lstStyle/>
           <a:p>
             <a:r>
-              <a:rPr lang="en-US" dirty="0"/>
-              <a:t>Market Survey C: Buyer/Seller </a:t>
+              <a:rPr lang="en-US" b="1" dirty="0"/>
+              <a:t>Seasonal Variation in Trade?</a:t>
             </a:r>
+            <a:endParaRPr lang="en-US" b="1" i="1" dirty="0"/>
           </a:p>
         </p:txBody>
       </p:sp>
       <p:sp>
         <p:nvSpPr>
-          <p:cNvPr id="3" name="Text Placeholder 2">
+          <p:cNvPr id="6" name="TextBox 5">
             <a:extLst>
               <a:ext uri="{FF2B5EF4-FFF2-40B4-BE49-F238E27FC236}">
-                <a16:creationId xmlns:a16="http://schemas.microsoft.com/office/drawing/2014/main" id="{C87E6E83-7EBD-C2D2-8C4A-5E79025FC239}"/>
+                <a16:creationId xmlns:a16="http://schemas.microsoft.com/office/drawing/2014/main" id="{5BC9AF28-CCE6-210D-C9E7-0E4055E29A40}"/>
               </a:ext>
             </a:extLst>
           </p:cNvPr>
-          <p:cNvSpPr>
-            <a:spLocks noGrp="1"/>
-          </p:cNvSpPr>
-          <p:nvPr>
-            <p:ph type="body" idx="1"/>
-          </p:nvPr>
+          <p:cNvSpPr txBox="1"/>
+          <p:nvPr/>
         </p:nvSpPr>
-        <p:spPr/>
+        <p:spPr>
+          <a:xfrm>
+            <a:off x="431800" y="3059668"/>
+            <a:ext cx="6101542" cy="369332"/>
+          </a:xfrm>
+          <a:prstGeom prst="rect">
+            <a:avLst/>
+          </a:prstGeom>
+          <a:noFill/>
+        </p:spPr>
         <p:txBody>
-          <a:bodyPr/>
+          <a:bodyPr wrap="square">
+            <a:spAutoFit/>
+          </a:bodyPr>
           <a:lstStyle/>
           <a:p>
-            <a:endParaRPr lang="en-US"/>
+            <a:r>
+              <a:rPr lang="en-US" b="1" dirty="0"/>
+              <a:t>If yes, describe (top 6 responses)</a:t>
+            </a:r>
+            <a:endParaRPr lang="en-US" b="1" i="1" dirty="0"/>
           </a:p>
         </p:txBody>
       </p:sp>
+      <p:sp>
+        <p:nvSpPr>
+          <p:cNvPr id="10" name="TextBox 9">
+            <a:extLst>
+              <a:ext uri="{FF2B5EF4-FFF2-40B4-BE49-F238E27FC236}">
+                <a16:creationId xmlns:a16="http://schemas.microsoft.com/office/drawing/2014/main" id="{A1CF92ED-A48D-1849-AB33-59FE95505F4F}"/>
+              </a:ext>
+            </a:extLst>
+          </p:cNvPr>
+          <p:cNvSpPr txBox="1"/>
+          <p:nvPr/>
+        </p:nvSpPr>
+        <p:spPr>
+          <a:xfrm>
+            <a:off x="6096000" y="2413337"/>
+            <a:ext cx="6096000" cy="830997"/>
+          </a:xfrm>
+          <a:prstGeom prst="rect">
+            <a:avLst/>
+          </a:prstGeom>
+          <a:noFill/>
+        </p:spPr>
+        <p:txBody>
+          <a:bodyPr wrap="square">
+            <a:spAutoFit/>
+          </a:bodyPr>
+          <a:lstStyle/>
+          <a:p>
+            <a:r>
+              <a:rPr lang="en-GB" sz="1200" i="1" dirty="0"/>
+              <a:t>“ The difference is caused by the state of the market and the state of the economy of the people. Also, conflicting auction schedules lead to a decrease or increase in goats and sheep brought to this auction. Livestock are usually abundant during famine and decrease when people have food.”</a:t>
+            </a:r>
+            <a:endParaRPr lang="en-US" sz="1200" i="1" dirty="0"/>
+          </a:p>
+        </p:txBody>
+      </p:sp>
+      <p:cxnSp>
+        <p:nvCxnSpPr>
+          <p:cNvPr id="12" name="Straight Arrow Connector 11">
+            <a:extLst>
+              <a:ext uri="{FF2B5EF4-FFF2-40B4-BE49-F238E27FC236}">
+                <a16:creationId xmlns:a16="http://schemas.microsoft.com/office/drawing/2014/main" id="{D5786A98-2399-5DD0-1F05-E93AD3D71B91}"/>
+              </a:ext>
+            </a:extLst>
+          </p:cNvPr>
+          <p:cNvCxnSpPr>
+            <a:endCxn id="10" idx="1"/>
+          </p:cNvCxnSpPr>
+          <p:nvPr/>
+        </p:nvCxnSpPr>
+        <p:spPr>
+          <a:xfrm flipV="1">
+            <a:off x="4826000" y="2828836"/>
+            <a:ext cx="1270000" cy="1082764"/>
+          </a:xfrm>
+          <a:prstGeom prst="straightConnector1">
+            <a:avLst/>
+          </a:prstGeom>
+          <a:ln w="76200">
+            <a:tailEnd type="triangle"/>
+          </a:ln>
+        </p:spPr>
+        <p:style>
+          <a:lnRef idx="1">
+            <a:schemeClr val="accent1"/>
+          </a:lnRef>
+          <a:fillRef idx="0">
+            <a:schemeClr val="accent1"/>
+          </a:fillRef>
+          <a:effectRef idx="0">
+            <a:schemeClr val="accent1"/>
+          </a:effectRef>
+          <a:fontRef idx="minor">
+            <a:schemeClr val="tx1"/>
+          </a:fontRef>
+        </p:style>
+      </p:cxnSp>
     </p:spTree>
     <p:extLst>
       <p:ext uri="{BB962C8B-B14F-4D97-AF65-F5344CB8AC3E}">
-        <p14:creationId xmlns:p14="http://schemas.microsoft.com/office/powerpoint/2010/main" val="1057101785"/>
+        <p14:creationId xmlns:p14="http://schemas.microsoft.com/office/powerpoint/2010/main" val="4052500796"/>
       </p:ext>
     </p:extLst>
   </p:cSld>

</xml_diff>

<commit_message>
updating market survey A and C descriptive analyses
</commit_message>
<xml_diff>
--- a/results-presentations/markets-descriptive-analysis.pptx
+++ b/results-presentations/markets-descriptive-analysis.pptx
@@ -139,7 +139,7 @@
 <file path=ppt/revisionInfo.xml><?xml version="1.0" encoding="utf-8"?>
 <p1510:revInfo xmlns:a="http://schemas.openxmlformats.org/drawingml/2006/main" xmlns:r="http://schemas.openxmlformats.org/officeDocument/2006/relationships" xmlns:p1510="http://schemas.microsoft.com/office/powerpoint/2015/10/main">
   <p1510:revLst>
-    <p1510:client id="{9FA17360-167E-9443-9251-DAE6C10F48BB}" v="91" dt="2023-03-15T13:20:51.606"/>
+    <p1510:client id="{9FA17360-167E-9443-9251-DAE6C10F48BB}" v="92" dt="2023-03-21T09:36:19.073"/>
   </p1510:revLst>
 </p1510:revInfo>
 </file>
@@ -149,7 +149,7 @@
   <pc:docChgLst>
     <pc:chgData name="Savagar, Bethan Alice" userId="dc0b6509-dca5-46f6-b355-e03f7348faa9" providerId="ADAL" clId="{9FA17360-167E-9443-9251-DAE6C10F48BB}"/>
     <pc:docChg chg="undo custSel addSld delSld modSld sldOrd">
-      <pc:chgData name="Savagar, Bethan Alice" userId="dc0b6509-dca5-46f6-b355-e03f7348faa9" providerId="ADAL" clId="{9FA17360-167E-9443-9251-DAE6C10F48BB}" dt="2023-03-15T14:36:25.390" v="2802" actId="13926"/>
+      <pc:chgData name="Savagar, Bethan Alice" userId="dc0b6509-dca5-46f6-b355-e03f7348faa9" providerId="ADAL" clId="{9FA17360-167E-9443-9251-DAE6C10F48BB}" dt="2023-03-21T09:36:48.069" v="2882" actId="12"/>
       <pc:docMkLst>
         <pc:docMk/>
       </pc:docMkLst>
@@ -1138,7 +1138,7 @@
         </pc:picChg>
       </pc:sldChg>
       <pc:sldChg chg="addSp delSp modSp add mod">
-        <pc:chgData name="Savagar, Bethan Alice" userId="dc0b6509-dca5-46f6-b355-e03f7348faa9" providerId="ADAL" clId="{9FA17360-167E-9443-9251-DAE6C10F48BB}" dt="2023-03-02T22:11:21.548" v="2199" actId="113"/>
+        <pc:chgData name="Savagar, Bethan Alice" userId="dc0b6509-dca5-46f6-b355-e03f7348faa9" providerId="ADAL" clId="{9FA17360-167E-9443-9251-DAE6C10F48BB}" dt="2023-03-21T09:36:48.069" v="2882" actId="12"/>
         <pc:sldMkLst>
           <pc:docMk/>
           <pc:sldMk cId="3851111758" sldId="275"/>
@@ -1207,6 +1207,14 @@
             <ac:spMk id="12" creationId="{58CD0C4D-21E1-0D8E-3D89-DB337FA4644C}"/>
           </ac:spMkLst>
         </pc:spChg>
+        <pc:spChg chg="add mod">
+          <ac:chgData name="Savagar, Bethan Alice" userId="dc0b6509-dca5-46f6-b355-e03f7348faa9" providerId="ADAL" clId="{9FA17360-167E-9443-9251-DAE6C10F48BB}" dt="2023-03-21T09:36:48.069" v="2882" actId="12"/>
+          <ac:spMkLst>
+            <pc:docMk/>
+            <pc:sldMk cId="3851111758" sldId="275"/>
+            <ac:spMk id="29" creationId="{82B6DDBE-CD04-8FE9-F673-4FD5C37B5DBE}"/>
+          </ac:spMkLst>
+        </pc:spChg>
         <pc:graphicFrameChg chg="mod modGraphic">
           <ac:chgData name="Savagar, Bethan Alice" userId="dc0b6509-dca5-46f6-b355-e03f7348faa9" providerId="ADAL" clId="{9FA17360-167E-9443-9251-DAE6C10F48BB}" dt="2023-03-02T22:04:05.866" v="2069" actId="14100"/>
           <ac:graphicFrameMkLst>
@@ -1231,6 +1239,190 @@
             <ac:picMk id="11" creationId="{E80F9512-D09D-A71C-2CBB-204F2A4209AC}"/>
           </ac:picMkLst>
         </pc:picChg>
+        <pc:inkChg chg="add">
+          <ac:chgData name="Savagar, Bethan Alice" userId="dc0b6509-dca5-46f6-b355-e03f7348faa9" providerId="ADAL" clId="{9FA17360-167E-9443-9251-DAE6C10F48BB}" dt="2023-03-21T09:32:18.611" v="2803" actId="9405"/>
+          <ac:inkMkLst>
+            <pc:docMk/>
+            <pc:sldMk cId="3851111758" sldId="275"/>
+            <ac:inkMk id="3" creationId="{3A62F60B-95B8-195F-77C8-5A81820687E2}"/>
+          </ac:inkMkLst>
+        </pc:inkChg>
+        <pc:inkChg chg="add">
+          <ac:chgData name="Savagar, Bethan Alice" userId="dc0b6509-dca5-46f6-b355-e03f7348faa9" providerId="ADAL" clId="{9FA17360-167E-9443-9251-DAE6C10F48BB}" dt="2023-03-21T09:32:39.115" v="2804" actId="9405"/>
+          <ac:inkMkLst>
+            <pc:docMk/>
+            <pc:sldMk cId="3851111758" sldId="275"/>
+            <ac:inkMk id="4" creationId="{647173D6-18BB-7511-F7E8-5150D465B4B6}"/>
+          </ac:inkMkLst>
+        </pc:inkChg>
+        <pc:inkChg chg="add">
+          <ac:chgData name="Savagar, Bethan Alice" userId="dc0b6509-dca5-46f6-b355-e03f7348faa9" providerId="ADAL" clId="{9FA17360-167E-9443-9251-DAE6C10F48BB}" dt="2023-03-21T09:32:43.501" v="2805" actId="9405"/>
+          <ac:inkMkLst>
+            <pc:docMk/>
+            <pc:sldMk cId="3851111758" sldId="275"/>
+            <ac:inkMk id="5" creationId="{84DD1777-52F5-ED74-31B0-E4CBA6912C78}"/>
+          </ac:inkMkLst>
+        </pc:inkChg>
+        <pc:inkChg chg="add">
+          <ac:chgData name="Savagar, Bethan Alice" userId="dc0b6509-dca5-46f6-b355-e03f7348faa9" providerId="ADAL" clId="{9FA17360-167E-9443-9251-DAE6C10F48BB}" dt="2023-03-21T09:32:45.691" v="2806" actId="9405"/>
+          <ac:inkMkLst>
+            <pc:docMk/>
+            <pc:sldMk cId="3851111758" sldId="275"/>
+            <ac:inkMk id="6" creationId="{87ED54F3-D15C-AF14-D895-BE321A4320FF}"/>
+          </ac:inkMkLst>
+        </pc:inkChg>
+        <pc:inkChg chg="add del">
+          <ac:chgData name="Savagar, Bethan Alice" userId="dc0b6509-dca5-46f6-b355-e03f7348faa9" providerId="ADAL" clId="{9FA17360-167E-9443-9251-DAE6C10F48BB}" dt="2023-03-21T09:32:49.345" v="2808" actId="9405"/>
+          <ac:inkMkLst>
+            <pc:docMk/>
+            <pc:sldMk cId="3851111758" sldId="275"/>
+            <ac:inkMk id="7" creationId="{ECB8919C-3B28-C78C-9F7B-CC106D77A677}"/>
+          </ac:inkMkLst>
+        </pc:inkChg>
+        <pc:inkChg chg="add">
+          <ac:chgData name="Savagar, Bethan Alice" userId="dc0b6509-dca5-46f6-b355-e03f7348faa9" providerId="ADAL" clId="{9FA17360-167E-9443-9251-DAE6C10F48BB}" dt="2023-03-21T09:32:54.540" v="2809" actId="9405"/>
+          <ac:inkMkLst>
+            <pc:docMk/>
+            <pc:sldMk cId="3851111758" sldId="275"/>
+            <ac:inkMk id="8" creationId="{362E961F-9209-665D-9D65-B787D6B2E6E8}"/>
+          </ac:inkMkLst>
+        </pc:inkChg>
+        <pc:inkChg chg="add del">
+          <ac:chgData name="Savagar, Bethan Alice" userId="dc0b6509-dca5-46f6-b355-e03f7348faa9" providerId="ADAL" clId="{9FA17360-167E-9443-9251-DAE6C10F48BB}" dt="2023-03-21T09:33:40.475" v="2829" actId="9405"/>
+          <ac:inkMkLst>
+            <pc:docMk/>
+            <pc:sldMk cId="3851111758" sldId="275"/>
+            <ac:inkMk id="9" creationId="{7175D96A-0DCE-31B7-C71D-2E399D325592}"/>
+          </ac:inkMkLst>
+        </pc:inkChg>
+        <pc:inkChg chg="add del">
+          <ac:chgData name="Savagar, Bethan Alice" userId="dc0b6509-dca5-46f6-b355-e03f7348faa9" providerId="ADAL" clId="{9FA17360-167E-9443-9251-DAE6C10F48BB}" dt="2023-03-21T09:33:39.922" v="2828" actId="9405"/>
+          <ac:inkMkLst>
+            <pc:docMk/>
+            <pc:sldMk cId="3851111758" sldId="275"/>
+            <ac:inkMk id="13" creationId="{C9DB59C0-6477-09A5-2870-0B0311FC2756}"/>
+          </ac:inkMkLst>
+        </pc:inkChg>
+        <pc:inkChg chg="add del">
+          <ac:chgData name="Savagar, Bethan Alice" userId="dc0b6509-dca5-46f6-b355-e03f7348faa9" providerId="ADAL" clId="{9FA17360-167E-9443-9251-DAE6C10F48BB}" dt="2023-03-21T09:33:10.198" v="2817" actId="9405"/>
+          <ac:inkMkLst>
+            <pc:docMk/>
+            <pc:sldMk cId="3851111758" sldId="275"/>
+            <ac:inkMk id="14" creationId="{A1BD39AE-E9BD-F222-6AA3-4699B1A93631}"/>
+          </ac:inkMkLst>
+        </pc:inkChg>
+        <pc:inkChg chg="add del">
+          <ac:chgData name="Savagar, Bethan Alice" userId="dc0b6509-dca5-46f6-b355-e03f7348faa9" providerId="ADAL" clId="{9FA17360-167E-9443-9251-DAE6C10F48BB}" dt="2023-03-21T09:33:09.262" v="2816" actId="9405"/>
+          <ac:inkMkLst>
+            <pc:docMk/>
+            <pc:sldMk cId="3851111758" sldId="275"/>
+            <ac:inkMk id="15" creationId="{68FD8D7C-27A5-3C7D-A1D3-7AD9EE82035A}"/>
+          </ac:inkMkLst>
+        </pc:inkChg>
+        <pc:inkChg chg="add del">
+          <ac:chgData name="Savagar, Bethan Alice" userId="dc0b6509-dca5-46f6-b355-e03f7348faa9" providerId="ADAL" clId="{9FA17360-167E-9443-9251-DAE6C10F48BB}" dt="2023-03-21T09:33:08.858" v="2815" actId="9405"/>
+          <ac:inkMkLst>
+            <pc:docMk/>
+            <pc:sldMk cId="3851111758" sldId="275"/>
+            <ac:inkMk id="16" creationId="{10F83185-AF05-74BB-36E0-5E9FA7C4F5BA}"/>
+          </ac:inkMkLst>
+        </pc:inkChg>
+        <pc:inkChg chg="add del">
+          <ac:chgData name="Savagar, Bethan Alice" userId="dc0b6509-dca5-46f6-b355-e03f7348faa9" providerId="ADAL" clId="{9FA17360-167E-9443-9251-DAE6C10F48BB}" dt="2023-03-21T09:33:39.458" v="2827" actId="9405"/>
+          <ac:inkMkLst>
+            <pc:docMk/>
+            <pc:sldMk cId="3851111758" sldId="275"/>
+            <ac:inkMk id="17" creationId="{F50D4A33-9310-C380-7884-A61A3C613AA5}"/>
+          </ac:inkMkLst>
+        </pc:inkChg>
+        <pc:inkChg chg="add del">
+          <ac:chgData name="Savagar, Bethan Alice" userId="dc0b6509-dca5-46f6-b355-e03f7348faa9" providerId="ADAL" clId="{9FA17360-167E-9443-9251-DAE6C10F48BB}" dt="2023-03-21T09:33:38.483" v="2826" actId="9405"/>
+          <ac:inkMkLst>
+            <pc:docMk/>
+            <pc:sldMk cId="3851111758" sldId="275"/>
+            <ac:inkMk id="18" creationId="{9531F897-FC98-1264-CC25-2E62D2094FCA}"/>
+          </ac:inkMkLst>
+        </pc:inkChg>
+        <pc:inkChg chg="add del">
+          <ac:chgData name="Savagar, Bethan Alice" userId="dc0b6509-dca5-46f6-b355-e03f7348faa9" providerId="ADAL" clId="{9FA17360-167E-9443-9251-DAE6C10F48BB}" dt="2023-03-21T09:33:37.834" v="2825" actId="9405"/>
+          <ac:inkMkLst>
+            <pc:docMk/>
+            <pc:sldMk cId="3851111758" sldId="275"/>
+            <ac:inkMk id="19" creationId="{F0313B9D-8D68-73D2-5C92-862CF134E35E}"/>
+          </ac:inkMkLst>
+        </pc:inkChg>
+        <pc:inkChg chg="add del">
+          <ac:chgData name="Savagar, Bethan Alice" userId="dc0b6509-dca5-46f6-b355-e03f7348faa9" providerId="ADAL" clId="{9FA17360-167E-9443-9251-DAE6C10F48BB}" dt="2023-03-21T09:33:37.317" v="2824" actId="9405"/>
+          <ac:inkMkLst>
+            <pc:docMk/>
+            <pc:sldMk cId="3851111758" sldId="275"/>
+            <ac:inkMk id="20" creationId="{AD720B63-2260-CAD4-DC97-860D14794E1B}"/>
+          </ac:inkMkLst>
+        </pc:inkChg>
+        <pc:inkChg chg="add del">
+          <ac:chgData name="Savagar, Bethan Alice" userId="dc0b6509-dca5-46f6-b355-e03f7348faa9" providerId="ADAL" clId="{9FA17360-167E-9443-9251-DAE6C10F48BB}" dt="2023-03-21T09:33:37.071" v="2823" actId="9405"/>
+          <ac:inkMkLst>
+            <pc:docMk/>
+            <pc:sldMk cId="3851111758" sldId="275"/>
+            <ac:inkMk id="21" creationId="{F8F5047D-089B-9AEB-0E53-1C683D231D0D}"/>
+          </ac:inkMkLst>
+        </pc:inkChg>
+        <pc:inkChg chg="add del">
+          <ac:chgData name="Savagar, Bethan Alice" userId="dc0b6509-dca5-46f6-b355-e03f7348faa9" providerId="ADAL" clId="{9FA17360-167E-9443-9251-DAE6C10F48BB}" dt="2023-03-21T09:36:06.481" v="2843" actId="9405"/>
+          <ac:inkMkLst>
+            <pc:docMk/>
+            <pc:sldMk cId="3851111758" sldId="275"/>
+            <ac:inkMk id="22" creationId="{54B92210-2253-FC63-57D4-2C10D7A5DA3B}"/>
+          </ac:inkMkLst>
+        </pc:inkChg>
+        <pc:inkChg chg="add del">
+          <ac:chgData name="Savagar, Bethan Alice" userId="dc0b6509-dca5-46f6-b355-e03f7348faa9" providerId="ADAL" clId="{9FA17360-167E-9443-9251-DAE6C10F48BB}" dt="2023-03-21T09:36:06.040" v="2842" actId="9405"/>
+          <ac:inkMkLst>
+            <pc:docMk/>
+            <pc:sldMk cId="3851111758" sldId="275"/>
+            <ac:inkMk id="23" creationId="{505F811C-0B6A-8012-737B-69FFC3088B8A}"/>
+          </ac:inkMkLst>
+        </pc:inkChg>
+        <pc:inkChg chg="add del">
+          <ac:chgData name="Savagar, Bethan Alice" userId="dc0b6509-dca5-46f6-b355-e03f7348faa9" providerId="ADAL" clId="{9FA17360-167E-9443-9251-DAE6C10F48BB}" dt="2023-03-21T09:36:05.668" v="2841" actId="9405"/>
+          <ac:inkMkLst>
+            <pc:docMk/>
+            <pc:sldMk cId="3851111758" sldId="275"/>
+            <ac:inkMk id="24" creationId="{76FEF748-0779-6F71-3AC2-106BB5E23835}"/>
+          </ac:inkMkLst>
+        </pc:inkChg>
+        <pc:inkChg chg="add del">
+          <ac:chgData name="Savagar, Bethan Alice" userId="dc0b6509-dca5-46f6-b355-e03f7348faa9" providerId="ADAL" clId="{9FA17360-167E-9443-9251-DAE6C10F48BB}" dt="2023-03-21T09:36:05.207" v="2840" actId="9405"/>
+          <ac:inkMkLst>
+            <pc:docMk/>
+            <pc:sldMk cId="3851111758" sldId="275"/>
+            <ac:inkMk id="25" creationId="{82E0D1BC-649D-65E0-E808-C678496AE836}"/>
+          </ac:inkMkLst>
+        </pc:inkChg>
+        <pc:inkChg chg="add del">
+          <ac:chgData name="Savagar, Bethan Alice" userId="dc0b6509-dca5-46f6-b355-e03f7348faa9" providerId="ADAL" clId="{9FA17360-167E-9443-9251-DAE6C10F48BB}" dt="2023-03-21T09:36:04.705" v="2839" actId="9405"/>
+          <ac:inkMkLst>
+            <pc:docMk/>
+            <pc:sldMk cId="3851111758" sldId="275"/>
+            <ac:inkMk id="26" creationId="{8A93F246-AA7D-FD5E-2E87-F7E88646865C}"/>
+          </ac:inkMkLst>
+        </pc:inkChg>
+        <pc:inkChg chg="add del">
+          <ac:chgData name="Savagar, Bethan Alice" userId="dc0b6509-dca5-46f6-b355-e03f7348faa9" providerId="ADAL" clId="{9FA17360-167E-9443-9251-DAE6C10F48BB}" dt="2023-03-21T09:36:04.046" v="2838" actId="9405"/>
+          <ac:inkMkLst>
+            <pc:docMk/>
+            <pc:sldMk cId="3851111758" sldId="275"/>
+            <ac:inkMk id="27" creationId="{75C5AF83-D3F5-1EA9-AC7D-2221A2B7FF2E}"/>
+          </ac:inkMkLst>
+        </pc:inkChg>
+        <pc:inkChg chg="add del">
+          <ac:chgData name="Savagar, Bethan Alice" userId="dc0b6509-dca5-46f6-b355-e03f7348faa9" providerId="ADAL" clId="{9FA17360-167E-9443-9251-DAE6C10F48BB}" dt="2023-03-21T09:36:03.180" v="2837" actId="9405"/>
+          <ac:inkMkLst>
+            <pc:docMk/>
+            <pc:sldMk cId="3851111758" sldId="275"/>
+            <ac:inkMk id="28" creationId="{8E7C4638-8AD7-34A3-517D-07D57EC7F428}"/>
+          </ac:inkMkLst>
+        </pc:inkChg>
       </pc:sldChg>
       <pc:sldChg chg="addSp modSp new mod">
         <pc:chgData name="Savagar, Bethan Alice" userId="dc0b6509-dca5-46f6-b355-e03f7348faa9" providerId="ADAL" clId="{9FA17360-167E-9443-9251-DAE6C10F48BB}" dt="2023-03-02T22:11:26.227" v="2200" actId="113"/>
@@ -1526,6 +1718,146 @@
     </inkml:brush>
   </inkml:definitions>
   <inkml:trace contextRef="#ctx0" brushRef="#br0">0 42,'56'0,"-1"0,2 0,-1 0,-5 0,-2 0,2 1,-2 1,44 1,-17 1,-7-1,-6-3,-2 0,2 0,-8 0,0 0,-4 0,0 0,-4 0,-7 0,-3 0,-6 0,-1 0,-3 0,1 0,2 0,2-3,4 0,0-2,0-1,-2 3,1-2,-1 2,0 0,0 0,0 1,1-1,-1-1,3 0,0 1,-1 0,-2 1,-2 2,1 0,-2 0,0 0,0 0,-2 0,-1 0,-5 0,-4 0,-1 0,0 0,1 0,2 0,0 0,-3 0,-1 0,-2 0,1 0,0 0,1 0,-1 0,0 0,3 0,-7 0,5 0,-2 2,0 1,7 2,-1 0,-8-2,-1-1</inkml:trace>
+</inkml:ink>
+</file>
+
+<file path=ppt/ink/ink13.xml><?xml version="1.0" encoding="utf-8"?>
+<inkml:ink xmlns:inkml="http://www.w3.org/2003/InkML">
+  <inkml:definitions>
+    <inkml:context xml:id="ctx0">
+      <inkml:inkSource xml:id="inkSrc0">
+        <inkml:traceFormat>
+          <inkml:channel name="X" type="integer" min="-2.14748E9" max="2.14748E9" units="cm"/>
+          <inkml:channel name="Y" type="integer" min="-2.14748E9" max="2.14748E9" units="cm"/>
+        </inkml:traceFormat>
+        <inkml:channelProperties>
+          <inkml:channelProperty channel="X" name="resolution" value="1000" units="1/cm"/>
+          <inkml:channelProperty channel="Y" name="resolution" value="1000" units="1/cm"/>
+        </inkml:channelProperties>
+      </inkml:inkSource>
+      <inkml:timestamp xml:id="ts0" timeString="2023-03-21T09:32:18.596"/>
+    </inkml:context>
+    <inkml:brush xml:id="br0">
+      <inkml:brushProperty name="width" value="0.3" units="cm"/>
+      <inkml:brushProperty name="height" value="0.6" units="cm"/>
+      <inkml:brushProperty name="color" value="#FFFC00"/>
+      <inkml:brushProperty name="tip" value="rectangle"/>
+      <inkml:brushProperty name="rasterOp" value="maskPen"/>
+    </inkml:brush>
+  </inkml:definitions>
+  <inkml:trace contextRef="#ctx0" brushRef="#br0">1666 0,'-73'0,"-5"0,5 0,1 0,8 0,12 0,10 0,7 0,8 0,4 0,2 0,2 0,-2 0,-1 0,0 0,1 0,2 0,3 0,0 0,-1 0,2 0,0 0,-1 0,1 0,-3 0,5 0,-7 0,7 0,-4 0,0 0,1 0,-1 0,-4 0,8 0,-5 0,1 0,4 0,-8 2,9 1,-4-1,0 4,2-5,-4 3,3-4,0 1,-4 3,5 1,-2 0,-1-2,5-3,-7 0,4 0,0 0,-8 0,10 0,-7 0,3 0,4 0,-7 0,6 0,0 0,-5 0,5 0,-2 2,0 0,2 0,-4 1,4-3,-3 0,2 0,-2 0,0 0,1 1,-1 2,2-1,-1 1,2-3,-1 0</inkml:trace>
+</inkml:ink>
+</file>
+
+<file path=ppt/ink/ink14.xml><?xml version="1.0" encoding="utf-8"?>
+<inkml:ink xmlns:inkml="http://www.w3.org/2003/InkML">
+  <inkml:definitions>
+    <inkml:context xml:id="ctx0">
+      <inkml:inkSource xml:id="inkSrc0">
+        <inkml:traceFormat>
+          <inkml:channel name="X" type="integer" min="-2.14748E9" max="2.14748E9" units="cm"/>
+          <inkml:channel name="Y" type="integer" min="-2.14748E9" max="2.14748E9" units="cm"/>
+        </inkml:traceFormat>
+        <inkml:channelProperties>
+          <inkml:channelProperty channel="X" name="resolution" value="1000" units="1/cm"/>
+          <inkml:channelProperty channel="Y" name="resolution" value="1000" units="1/cm"/>
+        </inkml:channelProperties>
+      </inkml:inkSource>
+      <inkml:timestamp xml:id="ts0" timeString="2023-03-21T09:32:39.111"/>
+    </inkml:context>
+    <inkml:brush xml:id="br0">
+      <inkml:brushProperty name="width" value="0.3" units="cm"/>
+      <inkml:brushProperty name="height" value="0.6" units="cm"/>
+      <inkml:brushProperty name="color" value="#FFFC00"/>
+      <inkml:brushProperty name="tip" value="rectangle"/>
+      <inkml:brushProperty name="rasterOp" value="maskPen"/>
+    </inkml:brush>
+  </inkml:definitions>
+  <inkml:trace contextRef="#ctx0" brushRef="#br0">1941 21,'-59'0,"-1"0,0 0,1 0,6 0,1 0,-47 0,11 0,22-1,17-1,8-3,3 0,-1 0,3 3,0 2,1 0,-2 0,1 0,0 0,1 0,1 0,2 0,1 0,1 0,2 0,1 0,0 0,3 0,-3 0,3 0,2 0,1 0,2 0,1 0,-1 0,0 0,1 0,2 0,0 0,-1 0,0 0,-2 0,0 0,0 0,1 0,2 0,-1 0,3 0,-6 0,6 0,-3 0,1 0,4 0,-9 0,8 0,-7 0,7 0,-2 0,-2 0,4 0,-7 0,7 0,-7 0,5 0,1 0,-4 0,6 0,-4 0</inkml:trace>
+</inkml:ink>
+</file>
+
+<file path=ppt/ink/ink15.xml><?xml version="1.0" encoding="utf-8"?>
+<inkml:ink xmlns:inkml="http://www.w3.org/2003/InkML">
+  <inkml:definitions>
+    <inkml:context xml:id="ctx0">
+      <inkml:inkSource xml:id="inkSrc0">
+        <inkml:traceFormat>
+          <inkml:channel name="X" type="integer" min="-2.14748E9" max="2.14748E9" units="cm"/>
+          <inkml:channel name="Y" type="integer" min="-2.14748E9" max="2.14748E9" units="cm"/>
+        </inkml:traceFormat>
+        <inkml:channelProperties>
+          <inkml:channelProperty channel="X" name="resolution" value="1000" units="1/cm"/>
+          <inkml:channelProperty channel="Y" name="resolution" value="1000" units="1/cm"/>
+        </inkml:channelProperties>
+      </inkml:inkSource>
+      <inkml:timestamp xml:id="ts0" timeString="2023-03-21T09:32:43.499"/>
+    </inkml:context>
+    <inkml:brush xml:id="br0">
+      <inkml:brushProperty name="width" value="0.3" units="cm"/>
+      <inkml:brushProperty name="height" value="0.6" units="cm"/>
+      <inkml:brushProperty name="color" value="#FFFC00"/>
+      <inkml:brushProperty name="tip" value="rectangle"/>
+      <inkml:brushProperty name="rasterOp" value="maskPen"/>
+    </inkml:brush>
+  </inkml:definitions>
+  <inkml:trace contextRef="#ctx0" brushRef="#br0">1714 1,'-78'0,"-4"0,-7 0,-4 0,3 0,11 0,6 0,3 0,2 0,-6 0,7 0,5 0,7 0,3 0,3 2,4 3,3 1,6 1,3-2,3-3,1 2,0-1,3 0,-1-1,2-2,4 2,-1 1,1-1,-1 0,0-2,1 0,2 0,1 0,1 0,3 0,-4 0,5 0,-6 0,4 0,1 0,-4 0,1 0</inkml:trace>
+</inkml:ink>
+</file>
+
+<file path=ppt/ink/ink16.xml><?xml version="1.0" encoding="utf-8"?>
+<inkml:ink xmlns:inkml="http://www.w3.org/2003/InkML">
+  <inkml:definitions>
+    <inkml:context xml:id="ctx0">
+      <inkml:inkSource xml:id="inkSrc0">
+        <inkml:traceFormat>
+          <inkml:channel name="X" type="integer" min="-2.14748E9" max="2.14748E9" units="cm"/>
+          <inkml:channel name="Y" type="integer" min="-2.14748E9" max="2.14748E9" units="cm"/>
+        </inkml:traceFormat>
+        <inkml:channelProperties>
+          <inkml:channelProperty channel="X" name="resolution" value="1000" units="1/cm"/>
+          <inkml:channelProperty channel="Y" name="resolution" value="1000" units="1/cm"/>
+        </inkml:channelProperties>
+      </inkml:inkSource>
+      <inkml:timestamp xml:id="ts0" timeString="2023-03-21T09:32:45.688"/>
+    </inkml:context>
+    <inkml:brush xml:id="br0">
+      <inkml:brushProperty name="width" value="0.3" units="cm"/>
+      <inkml:brushProperty name="height" value="0.6" units="cm"/>
+      <inkml:brushProperty name="color" value="#FFFC00"/>
+      <inkml:brushProperty name="tip" value="rectangle"/>
+      <inkml:brushProperty name="rasterOp" value="maskPen"/>
+    </inkml:brush>
+  </inkml:definitions>
+  <inkml:trace contextRef="#ctx0" brushRef="#br0">1326 48,'-84'0,"-4"0,0 0,-3 0,6 0,13 0,9 0,8 0,3 0,-3 0,4-1,6-1,2-1,4-1,3 0,5 1,2-1,3 1,3 0,1 0,4 3,1 0,1 0,1-1,0-2,-6 1,4-1,-3 1,5-1,2 1,-3 0,0 2,1 0,-3 0,2 0</inkml:trace>
+</inkml:ink>
+</file>
+
+<file path=ppt/ink/ink17.xml><?xml version="1.0" encoding="utf-8"?>
+<inkml:ink xmlns:inkml="http://www.w3.org/2003/InkML">
+  <inkml:definitions>
+    <inkml:context xml:id="ctx0">
+      <inkml:inkSource xml:id="inkSrc0">
+        <inkml:traceFormat>
+          <inkml:channel name="X" type="integer" min="-2.14748E9" max="2.14748E9" units="cm"/>
+          <inkml:channel name="Y" type="integer" min="-2.14748E9" max="2.14748E9" units="cm"/>
+        </inkml:traceFormat>
+        <inkml:channelProperties>
+          <inkml:channelProperty channel="X" name="resolution" value="1000" units="1/cm"/>
+          <inkml:channelProperty channel="Y" name="resolution" value="1000" units="1/cm"/>
+        </inkml:channelProperties>
+      </inkml:inkSource>
+      <inkml:timestamp xml:id="ts0" timeString="2023-03-21T09:32:54.535"/>
+    </inkml:context>
+    <inkml:brush xml:id="br0">
+      <inkml:brushProperty name="width" value="0.3" units="cm"/>
+      <inkml:brushProperty name="height" value="0.6" units="cm"/>
+      <inkml:brushProperty name="color" value="#FFFC00"/>
+      <inkml:brushProperty name="tip" value="rectangle"/>
+      <inkml:brushProperty name="rasterOp" value="maskPen"/>
+    </inkml:brush>
+  </inkml:definitions>
+  <inkml:trace contextRef="#ctx0" brushRef="#br0">1852 56,'-53'0,"-1"0,-6 0,-1 0,-4 0,0 0,-3 0,1 0,1 0,2 0,13 0,2 0,-45 0,7 0,10 0,-4-1,22-1,14-1,8 0,8 2,3 1,7 0,3 0,-1 0,1 0,-3 0,0-2,1-1,-1 1,0-1,1 1,1 0,3-3,-3 1,2-2,-3 3,3-1,1 2,-1-1,-1 1,-2 0,2 2,0 0,2 0,-6 0,6 0,-5 0,5 0,0 0,-6 0,6 0,-2 0,-1 0,5 0,-10 0,11 0,-4 0</inkml:trace>
 </inkml:ink>
 </file>
 
@@ -1835,7 +2167,7 @@
           <a:p>
             <a:fld id="{A68325C7-60EC-A242-9953-60CBBBD2270A}" type="datetimeFigureOut">
               <a:rPr lang="en-US" smtClean="0"/>
-              <a:t>3/15/23</a:t>
+              <a:t>3/21/23</a:t>
             </a:fld>
             <a:endParaRPr lang="en-US"/>
           </a:p>
@@ -3105,7 +3437,7 @@
           <a:p>
             <a:fld id="{DE2442DC-4320-1141-A657-9959529813FB}" type="datetimeFigureOut">
               <a:rPr lang="en-US" smtClean="0"/>
-              <a:t>3/15/23</a:t>
+              <a:t>3/21/23</a:t>
             </a:fld>
             <a:endParaRPr lang="en-US"/>
           </a:p>
@@ -3305,7 +3637,7 @@
           <a:p>
             <a:fld id="{DE2442DC-4320-1141-A657-9959529813FB}" type="datetimeFigureOut">
               <a:rPr lang="en-US" smtClean="0"/>
-              <a:t>3/15/23</a:t>
+              <a:t>3/21/23</a:t>
             </a:fld>
             <a:endParaRPr lang="en-US"/>
           </a:p>
@@ -3515,7 +3847,7 @@
           <a:p>
             <a:fld id="{DE2442DC-4320-1141-A657-9959529813FB}" type="datetimeFigureOut">
               <a:rPr lang="en-US" smtClean="0"/>
-              <a:t>3/15/23</a:t>
+              <a:t>3/21/23</a:t>
             </a:fld>
             <a:endParaRPr lang="en-US"/>
           </a:p>
@@ -3715,7 +4047,7 @@
           <a:p>
             <a:fld id="{DE2442DC-4320-1141-A657-9959529813FB}" type="datetimeFigureOut">
               <a:rPr lang="en-US" smtClean="0"/>
-              <a:t>3/15/23</a:t>
+              <a:t>3/21/23</a:t>
             </a:fld>
             <a:endParaRPr lang="en-US"/>
           </a:p>
@@ -3991,7 +4323,7 @@
           <a:p>
             <a:fld id="{DE2442DC-4320-1141-A657-9959529813FB}" type="datetimeFigureOut">
               <a:rPr lang="en-US" smtClean="0"/>
-              <a:t>3/15/23</a:t>
+              <a:t>3/21/23</a:t>
             </a:fld>
             <a:endParaRPr lang="en-US"/>
           </a:p>
@@ -4259,7 +4591,7 @@
           <a:p>
             <a:fld id="{DE2442DC-4320-1141-A657-9959529813FB}" type="datetimeFigureOut">
               <a:rPr lang="en-US" smtClean="0"/>
-              <a:t>3/15/23</a:t>
+              <a:t>3/21/23</a:t>
             </a:fld>
             <a:endParaRPr lang="en-US"/>
           </a:p>
@@ -4674,7 +5006,7 @@
           <a:p>
             <a:fld id="{DE2442DC-4320-1141-A657-9959529813FB}" type="datetimeFigureOut">
               <a:rPr lang="en-US" smtClean="0"/>
-              <a:t>3/15/23</a:t>
+              <a:t>3/21/23</a:t>
             </a:fld>
             <a:endParaRPr lang="en-US"/>
           </a:p>
@@ -4816,7 +5148,7 @@
           <a:p>
             <a:fld id="{DE2442DC-4320-1141-A657-9959529813FB}" type="datetimeFigureOut">
               <a:rPr lang="en-US" smtClean="0"/>
-              <a:t>3/15/23</a:t>
+              <a:t>3/21/23</a:t>
             </a:fld>
             <a:endParaRPr lang="en-US"/>
           </a:p>
@@ -4929,7 +5261,7 @@
           <a:p>
             <a:fld id="{DE2442DC-4320-1141-A657-9959529813FB}" type="datetimeFigureOut">
               <a:rPr lang="en-US" smtClean="0"/>
-              <a:t>3/15/23</a:t>
+              <a:t>3/21/23</a:t>
             </a:fld>
             <a:endParaRPr lang="en-US"/>
           </a:p>
@@ -5242,7 +5574,7 @@
           <a:p>
             <a:fld id="{DE2442DC-4320-1141-A657-9959529813FB}" type="datetimeFigureOut">
               <a:rPr lang="en-US" smtClean="0"/>
-              <a:t>3/15/23</a:t>
+              <a:t>3/21/23</a:t>
             </a:fld>
             <a:endParaRPr lang="en-US"/>
           </a:p>
@@ -5531,7 +5863,7 @@
           <a:p>
             <a:fld id="{DE2442DC-4320-1141-A657-9959529813FB}" type="datetimeFigureOut">
               <a:rPr lang="en-US" smtClean="0"/>
-              <a:t>3/15/23</a:t>
+              <a:t>3/21/23</a:t>
             </a:fld>
             <a:endParaRPr lang="en-US"/>
           </a:p>
@@ -5774,7 +6106,7 @@
           <a:p>
             <a:fld id="{DE2442DC-4320-1141-A657-9959529813FB}" type="datetimeFigureOut">
               <a:rPr lang="en-US" smtClean="0"/>
-              <a:t>3/15/23</a:t>
+              <a:t>3/21/23</a:t>
             </a:fld>
             <a:endParaRPr lang="en-US"/>
           </a:p>
@@ -20879,6 +21211,304 @@
           </a:p>
         </p:txBody>
       </p:sp>
+      <mc:AlternateContent xmlns:mc="http://schemas.openxmlformats.org/markup-compatibility/2006">
+        <mc:Choice xmlns:p14="http://schemas.microsoft.com/office/powerpoint/2010/main" Requires="p14">
+          <p:contentPart p14:bwMode="auto" r:id="rId4">
+            <p14:nvContentPartPr>
+              <p14:cNvPr id="3" name="Ink 2">
+                <a:extLst>
+                  <a:ext uri="{FF2B5EF4-FFF2-40B4-BE49-F238E27FC236}">
+                    <a16:creationId xmlns:a16="http://schemas.microsoft.com/office/drawing/2014/main" id="{3A62F60B-95B8-195F-77C8-5A81820687E2}"/>
+                  </a:ext>
+                </a:extLst>
+              </p14:cNvPr>
+              <p14:cNvContentPartPr/>
+              <p14:nvPr/>
+            </p14:nvContentPartPr>
+            <p14:xfrm>
+              <a:off x="5793260" y="2411040"/>
+              <a:ext cx="599760" cy="19800"/>
+            </p14:xfrm>
+          </p:contentPart>
+        </mc:Choice>
+        <mc:Fallback>
+          <p:pic>
+            <p:nvPicPr>
+              <p:cNvPr id="3" name="Ink 2">
+                <a:extLst>
+                  <a:ext uri="{FF2B5EF4-FFF2-40B4-BE49-F238E27FC236}">
+                    <a16:creationId xmlns:a16="http://schemas.microsoft.com/office/drawing/2014/main" id="{3A62F60B-95B8-195F-77C8-5A81820687E2}"/>
+                  </a:ext>
+                </a:extLst>
+              </p:cNvPr>
+              <p:cNvPicPr/>
+              <p:nvPr/>
+            </p:nvPicPr>
+            <p:blipFill>
+              <a:blip r:embed="rId5"/>
+              <a:stretch>
+                <a:fillRect/>
+              </a:stretch>
+            </p:blipFill>
+            <p:spPr>
+              <a:xfrm>
+                <a:off x="5739620" y="2303040"/>
+                <a:ext cx="707400" cy="235440"/>
+              </a:xfrm>
+              <a:prstGeom prst="rect">
+                <a:avLst/>
+              </a:prstGeom>
+            </p:spPr>
+          </p:pic>
+        </mc:Fallback>
+      </mc:AlternateContent>
+      <mc:AlternateContent xmlns:mc="http://schemas.openxmlformats.org/markup-compatibility/2006">
+        <mc:Choice xmlns:p14="http://schemas.microsoft.com/office/powerpoint/2010/main" Requires="p14">
+          <p:contentPart p14:bwMode="auto" r:id="rId6">
+            <p14:nvContentPartPr>
+              <p14:cNvPr id="4" name="Ink 3">
+                <a:extLst>
+                  <a:ext uri="{FF2B5EF4-FFF2-40B4-BE49-F238E27FC236}">
+                    <a16:creationId xmlns:a16="http://schemas.microsoft.com/office/drawing/2014/main" id="{647173D6-18BB-7511-F7E8-5150D465B4B6}"/>
+                  </a:ext>
+                </a:extLst>
+              </p14:cNvPr>
+              <p14:cNvContentPartPr/>
+              <p14:nvPr/>
+            </p14:nvContentPartPr>
+            <p14:xfrm>
+              <a:off x="5789660" y="3723600"/>
+              <a:ext cx="699120" cy="7560"/>
+            </p14:xfrm>
+          </p:contentPart>
+        </mc:Choice>
+        <mc:Fallback>
+          <p:pic>
+            <p:nvPicPr>
+              <p:cNvPr id="4" name="Ink 3">
+                <a:extLst>
+                  <a:ext uri="{FF2B5EF4-FFF2-40B4-BE49-F238E27FC236}">
+                    <a16:creationId xmlns:a16="http://schemas.microsoft.com/office/drawing/2014/main" id="{647173D6-18BB-7511-F7E8-5150D465B4B6}"/>
+                  </a:ext>
+                </a:extLst>
+              </p:cNvPr>
+              <p:cNvPicPr/>
+              <p:nvPr/>
+            </p:nvPicPr>
+            <p:blipFill>
+              <a:blip r:embed="rId7"/>
+              <a:stretch>
+                <a:fillRect/>
+              </a:stretch>
+            </p:blipFill>
+            <p:spPr>
+              <a:xfrm>
+                <a:off x="5735660" y="3615960"/>
+                <a:ext cx="806760" cy="223200"/>
+              </a:xfrm>
+              <a:prstGeom prst="rect">
+                <a:avLst/>
+              </a:prstGeom>
+            </p:spPr>
+          </p:pic>
+        </mc:Fallback>
+      </mc:AlternateContent>
+      <mc:AlternateContent xmlns:mc="http://schemas.openxmlformats.org/markup-compatibility/2006">
+        <mc:Choice xmlns:p14="http://schemas.microsoft.com/office/powerpoint/2010/main" Requires="p14">
+          <p:contentPart p14:bwMode="auto" r:id="rId8">
+            <p14:nvContentPartPr>
+              <p14:cNvPr id="5" name="Ink 4">
+                <a:extLst>
+                  <a:ext uri="{FF2B5EF4-FFF2-40B4-BE49-F238E27FC236}">
+                    <a16:creationId xmlns:a16="http://schemas.microsoft.com/office/drawing/2014/main" id="{84DD1777-52F5-ED74-31B0-E4CBA6912C78}"/>
+                  </a:ext>
+                </a:extLst>
+              </p14:cNvPr>
+              <p14:cNvContentPartPr/>
+              <p14:nvPr/>
+            </p14:nvContentPartPr>
+            <p14:xfrm>
+              <a:off x="5779220" y="3970920"/>
+              <a:ext cx="617400" cy="17640"/>
+            </p14:xfrm>
+          </p:contentPart>
+        </mc:Choice>
+        <mc:Fallback>
+          <p:pic>
+            <p:nvPicPr>
+              <p:cNvPr id="5" name="Ink 4">
+                <a:extLst>
+                  <a:ext uri="{FF2B5EF4-FFF2-40B4-BE49-F238E27FC236}">
+                    <a16:creationId xmlns:a16="http://schemas.microsoft.com/office/drawing/2014/main" id="{84DD1777-52F5-ED74-31B0-E4CBA6912C78}"/>
+                  </a:ext>
+                </a:extLst>
+              </p:cNvPr>
+              <p:cNvPicPr/>
+              <p:nvPr/>
+            </p:nvPicPr>
+            <p:blipFill>
+              <a:blip r:embed="rId9"/>
+              <a:stretch>
+                <a:fillRect/>
+              </a:stretch>
+            </p:blipFill>
+            <p:spPr>
+              <a:xfrm>
+                <a:off x="5725220" y="3863280"/>
+                <a:ext cx="725040" cy="233280"/>
+              </a:xfrm>
+              <a:prstGeom prst="rect">
+                <a:avLst/>
+              </a:prstGeom>
+            </p:spPr>
+          </p:pic>
+        </mc:Fallback>
+      </mc:AlternateContent>
+      <mc:AlternateContent xmlns:mc="http://schemas.openxmlformats.org/markup-compatibility/2006">
+        <mc:Choice xmlns:p14="http://schemas.microsoft.com/office/powerpoint/2010/main" Requires="p14">
+          <p:contentPart p14:bwMode="auto" r:id="rId10">
+            <p14:nvContentPartPr>
+              <p14:cNvPr id="6" name="Ink 5">
+                <a:extLst>
+                  <a:ext uri="{FF2B5EF4-FFF2-40B4-BE49-F238E27FC236}">
+                    <a16:creationId xmlns:a16="http://schemas.microsoft.com/office/drawing/2014/main" id="{87ED54F3-D15C-AF14-D895-BE321A4320FF}"/>
+                  </a:ext>
+                </a:extLst>
+              </p14:cNvPr>
+              <p14:cNvContentPartPr/>
+              <p14:nvPr/>
+            </p14:nvContentPartPr>
+            <p14:xfrm>
+              <a:off x="5842940" y="4221840"/>
+              <a:ext cx="477720" cy="17640"/>
+            </p14:xfrm>
+          </p:contentPart>
+        </mc:Choice>
+        <mc:Fallback>
+          <p:pic>
+            <p:nvPicPr>
+              <p:cNvPr id="6" name="Ink 5">
+                <a:extLst>
+                  <a:ext uri="{FF2B5EF4-FFF2-40B4-BE49-F238E27FC236}">
+                    <a16:creationId xmlns:a16="http://schemas.microsoft.com/office/drawing/2014/main" id="{87ED54F3-D15C-AF14-D895-BE321A4320FF}"/>
+                  </a:ext>
+                </a:extLst>
+              </p:cNvPr>
+              <p:cNvPicPr/>
+              <p:nvPr/>
+            </p:nvPicPr>
+            <p:blipFill>
+              <a:blip r:embed="rId11"/>
+              <a:stretch>
+                <a:fillRect/>
+              </a:stretch>
+            </p:blipFill>
+            <p:spPr>
+              <a:xfrm>
+                <a:off x="5788940" y="4113840"/>
+                <a:ext cx="585360" cy="233280"/>
+              </a:xfrm>
+              <a:prstGeom prst="rect">
+                <a:avLst/>
+              </a:prstGeom>
+            </p:spPr>
+          </p:pic>
+        </mc:Fallback>
+      </mc:AlternateContent>
+      <mc:AlternateContent xmlns:mc="http://schemas.openxmlformats.org/markup-compatibility/2006">
+        <mc:Choice xmlns:p14="http://schemas.microsoft.com/office/powerpoint/2010/main" Requires="p14">
+          <p:contentPart p14:bwMode="auto" r:id="rId12">
+            <p14:nvContentPartPr>
+              <p14:cNvPr id="8" name="Ink 7">
+                <a:extLst>
+                  <a:ext uri="{FF2B5EF4-FFF2-40B4-BE49-F238E27FC236}">
+                    <a16:creationId xmlns:a16="http://schemas.microsoft.com/office/drawing/2014/main" id="{362E961F-9209-665D-9D65-B787D6B2E6E8}"/>
+                  </a:ext>
+                </a:extLst>
+              </p14:cNvPr>
+              <p14:cNvContentPartPr/>
+              <p14:nvPr/>
+            </p14:nvContentPartPr>
+            <p14:xfrm>
+              <a:off x="5798660" y="4761120"/>
+              <a:ext cx="667080" cy="20520"/>
+            </p14:xfrm>
+          </p:contentPart>
+        </mc:Choice>
+        <mc:Fallback>
+          <p:pic>
+            <p:nvPicPr>
+              <p:cNvPr id="8" name="Ink 7">
+                <a:extLst>
+                  <a:ext uri="{FF2B5EF4-FFF2-40B4-BE49-F238E27FC236}">
+                    <a16:creationId xmlns:a16="http://schemas.microsoft.com/office/drawing/2014/main" id="{362E961F-9209-665D-9D65-B787D6B2E6E8}"/>
+                  </a:ext>
+                </a:extLst>
+              </p:cNvPr>
+              <p:cNvPicPr/>
+              <p:nvPr/>
+            </p:nvPicPr>
+            <p:blipFill>
+              <a:blip r:embed="rId13"/>
+              <a:stretch>
+                <a:fillRect/>
+              </a:stretch>
+            </p:blipFill>
+            <p:spPr>
+              <a:xfrm>
+                <a:off x="5745020" y="4653480"/>
+                <a:ext cx="774720" cy="236160"/>
+              </a:xfrm>
+              <a:prstGeom prst="rect">
+                <a:avLst/>
+              </a:prstGeom>
+            </p:spPr>
+          </p:pic>
+        </mc:Fallback>
+      </mc:AlternateContent>
+      <p:sp>
+        <p:nvSpPr>
+          <p:cNvPr id="29" name="TextBox 28">
+            <a:extLst>
+              <a:ext uri="{FF2B5EF4-FFF2-40B4-BE49-F238E27FC236}">
+                <a16:creationId xmlns:a16="http://schemas.microsoft.com/office/drawing/2014/main" id="{82B6DDBE-CD04-8FE9-F673-4FD5C37B5DBE}"/>
+              </a:ext>
+            </a:extLst>
+          </p:cNvPr>
+          <p:cNvSpPr txBox="1"/>
+          <p:nvPr/>
+        </p:nvSpPr>
+        <p:spPr>
+          <a:xfrm>
+            <a:off x="5500443" y="5012040"/>
+            <a:ext cx="1976673" cy="276999"/>
+          </a:xfrm>
+          <a:prstGeom prst="rect">
+            <a:avLst/>
+          </a:prstGeom>
+          <a:noFill/>
+        </p:spPr>
+        <p:txBody>
+          <a:bodyPr wrap="square" rtlCol="0">
+            <a:spAutoFit/>
+          </a:bodyPr>
+          <a:lstStyle/>
+          <a:p>
+            <a:pPr marL="171450" indent="-171450">
+              <a:buFont typeface="Arial" panose="020B0604020202020204" pitchFamily="34" charset="0"/>
+              <a:buChar char="•"/>
+            </a:pPr>
+            <a:r>
+              <a:rPr lang="en-US" sz="1200" dirty="0">
+                <a:highlight>
+                  <a:srgbClr val="FFFF00"/>
+                </a:highlight>
+              </a:rPr>
+              <a:t>Not targeted district</a:t>
+            </a:r>
+          </a:p>
+        </p:txBody>
+      </p:sp>
     </p:spTree>
     <p:extLst>
       <p:ext uri="{BB962C8B-B14F-4D97-AF65-F5344CB8AC3E}">

</xml_diff>